<commit_message>
modified:   home.html 	modified:   index.html 	modified:   mp1images/carousel pics.pptx 	new file:   mp1images/causesofdeath.jpg 	new file:   mp1images/goalsetting.jpg 	modified:   mp1images/lifeexpectancy.jpg 	new file:   mp1images/stagesoflife.jpg
</commit_message>
<xml_diff>
--- a/mp1images/carousel pics.pptx
+++ b/mp1images/carousel pics.pptx
@@ -6,6 +6,8 @@
   </p:sldMasterIdLst>
   <p:sldIdLst>
     <p:sldId id="256" r:id="rId2"/>
+    <p:sldId id="257" r:id="rId3"/>
+    <p:sldId id="258" r:id="rId4"/>
   </p:sldIdLst>
   <p:sldSz cx="12192000" cy="6858000"/>
   <p:notesSz cx="6858000" cy="9144000"/>
@@ -104,6 +106,11 @@
       </a:defRPr>
     </a:lvl9pPr>
   </p:defaultTextStyle>
+  <p:extLst>
+    <p:ext uri="{EFAFB233-063F-42B5-8137-9DF3F51BA10A}">
+      <p15:sldGuideLst xmlns:p15="http://schemas.microsoft.com/office/powerpoint/2012/main"/>
+    </p:ext>
+  </p:extLst>
 </p:presentation>
 </file>
 
@@ -111,8 +118,8 @@
 <pc:chgInfo xmlns:a="http://schemas.openxmlformats.org/drawingml/2006/main" xmlns:r="http://schemas.openxmlformats.org/officeDocument/2006/relationships" xmlns:ac="http://schemas.microsoft.com/office/drawing/2013/main/command" xmlns:pc="http://schemas.microsoft.com/office/powerpoint/2013/main/command">
   <pc:docChgLst>
     <pc:chgData name="Rose Joy Angeline Padilla" userId="ecdd412207c6b092" providerId="LiveId" clId="{8A8653A4-EEE4-480C-A831-A23D8E4BA8F6}"/>
-    <pc:docChg chg="undo custSel modSld">
-      <pc:chgData name="Rose Joy Angeline Padilla" userId="ecdd412207c6b092" providerId="LiveId" clId="{8A8653A4-EEE4-480C-A831-A23D8E4BA8F6}" dt="2023-05-31T03:28:36.488" v="175" actId="14100"/>
+    <pc:docChg chg="undo redo custSel addSld modSld">
+      <pc:chgData name="Rose Joy Angeline Padilla" userId="ecdd412207c6b092" providerId="LiveId" clId="{8A8653A4-EEE4-480C-A831-A23D8E4BA8F6}" dt="2023-06-03T22:54:09.082" v="2504" actId="1076"/>
       <pc:docMkLst>
         <pc:docMk/>
       </pc:docMkLst>
@@ -218,6 +225,516 @@
             <ac:picMk id="23" creationId="{C12246F2-8358-CA2C-B8C5-68BF0A438E91}"/>
           </ac:picMkLst>
         </pc:picChg>
+      </pc:sldChg>
+      <pc:sldChg chg="addSp delSp modSp add mod">
+        <pc:chgData name="Rose Joy Angeline Padilla" userId="ecdd412207c6b092" providerId="LiveId" clId="{8A8653A4-EEE4-480C-A831-A23D8E4BA8F6}" dt="2023-06-03T22:53:45.963" v="2502" actId="21"/>
+        <pc:sldMkLst>
+          <pc:docMk/>
+          <pc:sldMk cId="900757665" sldId="257"/>
+        </pc:sldMkLst>
+        <pc:spChg chg="add mod topLvl">
+          <ac:chgData name="Rose Joy Angeline Padilla" userId="ecdd412207c6b092" providerId="LiveId" clId="{8A8653A4-EEE4-480C-A831-A23D8E4BA8F6}" dt="2023-06-03T22:38:08.685" v="2086" actId="1076"/>
+          <ac:spMkLst>
+            <pc:docMk/>
+            <pc:sldMk cId="900757665" sldId="257"/>
+            <ac:spMk id="4" creationId="{55293C82-9B5F-DC86-5006-7253D2B111DF}"/>
+          </ac:spMkLst>
+        </pc:spChg>
+        <pc:spChg chg="mod">
+          <ac:chgData name="Rose Joy Angeline Padilla" userId="ecdd412207c6b092" providerId="LiveId" clId="{8A8653A4-EEE4-480C-A831-A23D8E4BA8F6}" dt="2023-06-03T21:39:02.073" v="221" actId="27803"/>
+          <ac:spMkLst>
+            <pc:docMk/>
+            <pc:sldMk cId="900757665" sldId="257"/>
+            <ac:spMk id="11" creationId="{F556BB79-AF2C-3487-3D52-2D2EF0E32810}"/>
+          </ac:spMkLst>
+        </pc:spChg>
+        <pc:spChg chg="mod">
+          <ac:chgData name="Rose Joy Angeline Padilla" userId="ecdd412207c6b092" providerId="LiveId" clId="{8A8653A4-EEE4-480C-A831-A23D8E4BA8F6}" dt="2023-06-03T21:39:02.073" v="221" actId="27803"/>
+          <ac:spMkLst>
+            <pc:docMk/>
+            <pc:sldMk cId="900757665" sldId="257"/>
+            <ac:spMk id="12" creationId="{7990DE4B-ED99-037D-D57E-C834DD1FFEA3}"/>
+          </ac:spMkLst>
+        </pc:spChg>
+        <pc:spChg chg="mod">
+          <ac:chgData name="Rose Joy Angeline Padilla" userId="ecdd412207c6b092" providerId="LiveId" clId="{8A8653A4-EEE4-480C-A831-A23D8E4BA8F6}" dt="2023-06-03T21:39:02.073" v="221" actId="27803"/>
+          <ac:spMkLst>
+            <pc:docMk/>
+            <pc:sldMk cId="900757665" sldId="257"/>
+            <ac:spMk id="13" creationId="{DD89B0FC-8F8C-BA8F-49BF-AF3944CC891F}"/>
+          </ac:spMkLst>
+        </pc:spChg>
+        <pc:spChg chg="mod">
+          <ac:chgData name="Rose Joy Angeline Padilla" userId="ecdd412207c6b092" providerId="LiveId" clId="{8A8653A4-EEE4-480C-A831-A23D8E4BA8F6}" dt="2023-06-03T21:39:02.073" v="221" actId="27803"/>
+          <ac:spMkLst>
+            <pc:docMk/>
+            <pc:sldMk cId="900757665" sldId="257"/>
+            <ac:spMk id="14" creationId="{C358717F-BB03-4322-C979-D05CE27BC81A}"/>
+          </ac:spMkLst>
+        </pc:spChg>
+        <pc:spChg chg="add del mod">
+          <ac:chgData name="Rose Joy Angeline Padilla" userId="ecdd412207c6b092" providerId="LiveId" clId="{8A8653A4-EEE4-480C-A831-A23D8E4BA8F6}" dt="2023-06-03T21:53:09.459" v="818" actId="478"/>
+          <ac:spMkLst>
+            <pc:docMk/>
+            <pc:sldMk cId="900757665" sldId="257"/>
+            <ac:spMk id="15" creationId="{6107E97F-BB4A-DC34-02D4-B8CCC3819454}"/>
+          </ac:spMkLst>
+        </pc:spChg>
+        <pc:spChg chg="add del mod">
+          <ac:chgData name="Rose Joy Angeline Padilla" userId="ecdd412207c6b092" providerId="LiveId" clId="{8A8653A4-EEE4-480C-A831-A23D8E4BA8F6}" dt="2023-06-03T21:42:25.562" v="290" actId="478"/>
+          <ac:spMkLst>
+            <pc:docMk/>
+            <pc:sldMk cId="900757665" sldId="257"/>
+            <ac:spMk id="16" creationId="{B35754F6-2F91-B90A-155E-6F757C8C1AE2}"/>
+          </ac:spMkLst>
+        </pc:spChg>
+        <pc:spChg chg="add del mod">
+          <ac:chgData name="Rose Joy Angeline Padilla" userId="ecdd412207c6b092" providerId="LiveId" clId="{8A8653A4-EEE4-480C-A831-A23D8E4BA8F6}" dt="2023-06-03T21:53:07.096" v="817" actId="478"/>
+          <ac:spMkLst>
+            <pc:docMk/>
+            <pc:sldMk cId="900757665" sldId="257"/>
+            <ac:spMk id="18" creationId="{BF3D5750-21CB-E191-B949-55503DFB19D0}"/>
+          </ac:spMkLst>
+        </pc:spChg>
+        <pc:spChg chg="add mod">
+          <ac:chgData name="Rose Joy Angeline Padilla" userId="ecdd412207c6b092" providerId="LiveId" clId="{8A8653A4-EEE4-480C-A831-A23D8E4BA8F6}" dt="2023-06-03T21:41:13.702" v="273" actId="164"/>
+          <ac:spMkLst>
+            <pc:docMk/>
+            <pc:sldMk cId="900757665" sldId="257"/>
+            <ac:spMk id="23" creationId="{9101069B-83AA-1B9C-D083-23B43534EDE7}"/>
+          </ac:spMkLst>
+        </pc:spChg>
+        <pc:spChg chg="del mod">
+          <ac:chgData name="Rose Joy Angeline Padilla" userId="ecdd412207c6b092" providerId="LiveId" clId="{8A8653A4-EEE4-480C-A831-A23D8E4BA8F6}" dt="2023-06-03T22:45:03.803" v="2391" actId="478"/>
+          <ac:spMkLst>
+            <pc:docMk/>
+            <pc:sldMk cId="900757665" sldId="257"/>
+            <ac:spMk id="26" creationId="{E1F36DEA-5B95-968F-F716-EBBB97DBF400}"/>
+          </ac:spMkLst>
+        </pc:spChg>
+        <pc:spChg chg="add mod topLvl">
+          <ac:chgData name="Rose Joy Angeline Padilla" userId="ecdd412207c6b092" providerId="LiveId" clId="{8A8653A4-EEE4-480C-A831-A23D8E4BA8F6}" dt="2023-06-03T22:30:59.781" v="1810" actId="164"/>
+          <ac:spMkLst>
+            <pc:docMk/>
+            <pc:sldMk cId="900757665" sldId="257"/>
+            <ac:spMk id="45" creationId="{194AE3F0-18DC-2F33-3074-BAEDF2EE3988}"/>
+          </ac:spMkLst>
+        </pc:spChg>
+        <pc:spChg chg="add mod topLvl">
+          <ac:chgData name="Rose Joy Angeline Padilla" userId="ecdd412207c6b092" providerId="LiveId" clId="{8A8653A4-EEE4-480C-A831-A23D8E4BA8F6}" dt="2023-06-03T22:31:52.602" v="1940" actId="164"/>
+          <ac:spMkLst>
+            <pc:docMk/>
+            <pc:sldMk cId="900757665" sldId="257"/>
+            <ac:spMk id="60" creationId="{85DE82DB-603B-6227-18B8-0798996FDC4D}"/>
+          </ac:spMkLst>
+        </pc:spChg>
+        <pc:spChg chg="add mod topLvl">
+          <ac:chgData name="Rose Joy Angeline Padilla" userId="ecdd412207c6b092" providerId="LiveId" clId="{8A8653A4-EEE4-480C-A831-A23D8E4BA8F6}" dt="2023-06-03T22:31:52.602" v="1940" actId="164"/>
+          <ac:spMkLst>
+            <pc:docMk/>
+            <pc:sldMk cId="900757665" sldId="257"/>
+            <ac:spMk id="61" creationId="{DBB05038-6DBF-9AF0-5AD4-1C196BB3A3EB}"/>
+          </ac:spMkLst>
+        </pc:spChg>
+        <pc:spChg chg="add mod topLvl">
+          <ac:chgData name="Rose Joy Angeline Padilla" userId="ecdd412207c6b092" providerId="LiveId" clId="{8A8653A4-EEE4-480C-A831-A23D8E4BA8F6}" dt="2023-06-03T22:31:52.602" v="1940" actId="164"/>
+          <ac:spMkLst>
+            <pc:docMk/>
+            <pc:sldMk cId="900757665" sldId="257"/>
+            <ac:spMk id="62" creationId="{786A2140-4326-FF7A-6942-09F9F4FA68D1}"/>
+          </ac:spMkLst>
+        </pc:spChg>
+        <pc:spChg chg="add mod topLvl">
+          <ac:chgData name="Rose Joy Angeline Padilla" userId="ecdd412207c6b092" providerId="LiveId" clId="{8A8653A4-EEE4-480C-A831-A23D8E4BA8F6}" dt="2023-06-03T22:31:52.602" v="1940" actId="164"/>
+          <ac:spMkLst>
+            <pc:docMk/>
+            <pc:sldMk cId="900757665" sldId="257"/>
+            <ac:spMk id="63" creationId="{E3354032-9571-8CA1-6755-DADBE53C4C25}"/>
+          </ac:spMkLst>
+        </pc:spChg>
+        <pc:spChg chg="add mod">
+          <ac:chgData name="Rose Joy Angeline Padilla" userId="ecdd412207c6b092" providerId="LiveId" clId="{8A8653A4-EEE4-480C-A831-A23D8E4BA8F6}" dt="2023-06-03T22:26:17.472" v="1614" actId="571"/>
+          <ac:spMkLst>
+            <pc:docMk/>
+            <pc:sldMk cId="900757665" sldId="257"/>
+            <ac:spMk id="65" creationId="{78D1C030-4D03-4923-6476-4633BBAA7F7B}"/>
+          </ac:spMkLst>
+        </pc:spChg>
+        <pc:spChg chg="add mod topLvl">
+          <ac:chgData name="Rose Joy Angeline Padilla" userId="ecdd412207c6b092" providerId="LiveId" clId="{8A8653A4-EEE4-480C-A831-A23D8E4BA8F6}" dt="2023-06-03T22:31:52.602" v="1940" actId="164"/>
+          <ac:spMkLst>
+            <pc:docMk/>
+            <pc:sldMk cId="900757665" sldId="257"/>
+            <ac:spMk id="66" creationId="{73EB994D-99F7-8A1B-A79A-1BD6471287A5}"/>
+          </ac:spMkLst>
+        </pc:spChg>
+        <pc:spChg chg="mod">
+          <ac:chgData name="Rose Joy Angeline Padilla" userId="ecdd412207c6b092" providerId="LiveId" clId="{8A8653A4-EEE4-480C-A831-A23D8E4BA8F6}" dt="2023-06-03T22:31:02.567" v="1811"/>
+          <ac:spMkLst>
+            <pc:docMk/>
+            <pc:sldMk cId="900757665" sldId="257"/>
+            <ac:spMk id="71" creationId="{0B9F62E4-69D3-3B25-2218-86866B0DC928}"/>
+          </ac:spMkLst>
+        </pc:spChg>
+        <pc:spChg chg="add mod ord">
+          <ac:chgData name="Rose Joy Angeline Padilla" userId="ecdd412207c6b092" providerId="LiveId" clId="{8A8653A4-EEE4-480C-A831-A23D8E4BA8F6}" dt="2023-06-03T22:46:03.787" v="2394" actId="164"/>
+          <ac:spMkLst>
+            <pc:docMk/>
+            <pc:sldMk cId="900757665" sldId="257"/>
+            <ac:spMk id="74" creationId="{0F385419-8445-4148-EBC0-46222A220333}"/>
+          </ac:spMkLst>
+        </pc:spChg>
+        <pc:grpChg chg="add del mod">
+          <ac:chgData name="Rose Joy Angeline Padilla" userId="ecdd412207c6b092" providerId="LiveId" clId="{8A8653A4-EEE4-480C-A831-A23D8E4BA8F6}" dt="2023-06-03T21:37:09.900" v="214" actId="165"/>
+          <ac:grpSpMkLst>
+            <pc:docMk/>
+            <pc:sldMk cId="900757665" sldId="257"/>
+            <ac:grpSpMk id="6" creationId="{E438D86F-003F-200C-ECD3-6FFB28ADE251}"/>
+          </ac:grpSpMkLst>
+        </pc:grpChg>
+        <pc:grpChg chg="add del mod">
+          <ac:chgData name="Rose Joy Angeline Padilla" userId="ecdd412207c6b092" providerId="LiveId" clId="{8A8653A4-EEE4-480C-A831-A23D8E4BA8F6}" dt="2023-06-03T21:39:02.073" v="221" actId="27803"/>
+          <ac:grpSpMkLst>
+            <pc:docMk/>
+            <pc:sldMk cId="900757665" sldId="257"/>
+            <ac:grpSpMk id="10" creationId="{AAFF79F0-A1A4-FB1F-1C90-80F3AE1A108D}"/>
+          </ac:grpSpMkLst>
+        </pc:grpChg>
+        <pc:grpChg chg="del mod">
+          <ac:chgData name="Rose Joy Angeline Padilla" userId="ecdd412207c6b092" providerId="LiveId" clId="{8A8653A4-EEE4-480C-A831-A23D8E4BA8F6}" dt="2023-06-03T21:47:00.783" v="603" actId="165"/>
+          <ac:grpSpMkLst>
+            <pc:docMk/>
+            <pc:sldMk cId="900757665" sldId="257"/>
+            <ac:grpSpMk id="17" creationId="{2932514E-B95A-4C18-474E-BB158D2C692C}"/>
+          </ac:grpSpMkLst>
+        </pc:grpChg>
+        <pc:grpChg chg="add mod">
+          <ac:chgData name="Rose Joy Angeline Padilla" userId="ecdd412207c6b092" providerId="LiveId" clId="{8A8653A4-EEE4-480C-A831-A23D8E4BA8F6}" dt="2023-06-03T21:39:50.882" v="232" actId="164"/>
+          <ac:grpSpMkLst>
+            <pc:docMk/>
+            <pc:sldMk cId="900757665" sldId="257"/>
+            <ac:grpSpMk id="20" creationId="{7BA25ECF-12DC-48FA-244B-EC9733CD4BD0}"/>
+          </ac:grpSpMkLst>
+        </pc:grpChg>
+        <pc:grpChg chg="add del mod ord">
+          <ac:chgData name="Rose Joy Angeline Padilla" userId="ecdd412207c6b092" providerId="LiveId" clId="{8A8653A4-EEE4-480C-A831-A23D8E4BA8F6}" dt="2023-06-03T22:44:44.858" v="2387" actId="478"/>
+          <ac:grpSpMkLst>
+            <pc:docMk/>
+            <pc:sldMk cId="900757665" sldId="257"/>
+            <ac:grpSpMk id="24" creationId="{9B950E11-BC1F-998F-5FA5-79B618FE629F}"/>
+          </ac:grpSpMkLst>
+        </pc:grpChg>
+        <pc:grpChg chg="del mod">
+          <ac:chgData name="Rose Joy Angeline Padilla" userId="ecdd412207c6b092" providerId="LiveId" clId="{8A8653A4-EEE4-480C-A831-A23D8E4BA8F6}" dt="2023-06-03T22:53:45.963" v="2502" actId="21"/>
+          <ac:grpSpMkLst>
+            <pc:docMk/>
+            <pc:sldMk cId="900757665" sldId="257"/>
+            <ac:grpSpMk id="25" creationId="{50528A1E-2A20-4094-78E2-AD33CC89DC3C}"/>
+          </ac:grpSpMkLst>
+        </pc:grpChg>
+        <pc:grpChg chg="add mod">
+          <ac:chgData name="Rose Joy Angeline Padilla" userId="ecdd412207c6b092" providerId="LiveId" clId="{8A8653A4-EEE4-480C-A831-A23D8E4BA8F6}" dt="2023-06-03T21:46:44.794" v="602" actId="164"/>
+          <ac:grpSpMkLst>
+            <pc:docMk/>
+            <pc:sldMk cId="900757665" sldId="257"/>
+            <ac:grpSpMk id="27" creationId="{5EB4911B-A899-DC89-63B8-1CDD0CB7E6AF}"/>
+          </ac:grpSpMkLst>
+        </pc:grpChg>
+        <pc:grpChg chg="add del mod">
+          <ac:chgData name="Rose Joy Angeline Padilla" userId="ecdd412207c6b092" providerId="LiveId" clId="{8A8653A4-EEE4-480C-A831-A23D8E4BA8F6}" dt="2023-06-03T21:55:04.038" v="821" actId="165"/>
+          <ac:grpSpMkLst>
+            <pc:docMk/>
+            <pc:sldMk cId="900757665" sldId="257"/>
+            <ac:grpSpMk id="28" creationId="{26F2BA2E-96E5-C59C-C2E9-8610C95EFA92}"/>
+          </ac:grpSpMkLst>
+        </pc:grpChg>
+        <pc:grpChg chg="add mod">
+          <ac:chgData name="Rose Joy Angeline Padilla" userId="ecdd412207c6b092" providerId="LiveId" clId="{8A8653A4-EEE4-480C-A831-A23D8E4BA8F6}" dt="2023-06-03T22:29:54.575" v="1697" actId="165"/>
+          <ac:grpSpMkLst>
+            <pc:docMk/>
+            <pc:sldMk cId="900757665" sldId="257"/>
+            <ac:grpSpMk id="37" creationId="{0116B90B-D058-5059-CC0D-190AD76EDA3A}"/>
+          </ac:grpSpMkLst>
+        </pc:grpChg>
+        <pc:grpChg chg="add mod topLvl">
+          <ac:chgData name="Rose Joy Angeline Padilla" userId="ecdd412207c6b092" providerId="LiveId" clId="{8A8653A4-EEE4-480C-A831-A23D8E4BA8F6}" dt="2023-06-03T22:31:52.602" v="1940" actId="164"/>
+          <ac:grpSpMkLst>
+            <pc:docMk/>
+            <pc:sldMk cId="900757665" sldId="257"/>
+            <ac:grpSpMk id="42" creationId="{C7E56B02-81A6-FF26-3EE7-63AE9723E2A4}"/>
+          </ac:grpSpMkLst>
+        </pc:grpChg>
+        <pc:grpChg chg="add del mod">
+          <ac:chgData name="Rose Joy Angeline Padilla" userId="ecdd412207c6b092" providerId="LiveId" clId="{8A8653A4-EEE4-480C-A831-A23D8E4BA8F6}" dt="2023-06-03T22:30:33.307" v="1807" actId="165"/>
+          <ac:grpSpMkLst>
+            <pc:docMk/>
+            <pc:sldMk cId="900757665" sldId="257"/>
+            <ac:grpSpMk id="46" creationId="{39B3760A-E14E-2FA8-C58F-D00443C0C25E}"/>
+          </ac:grpSpMkLst>
+        </pc:grpChg>
+        <pc:grpChg chg="add mod topLvl">
+          <ac:chgData name="Rose Joy Angeline Padilla" userId="ecdd412207c6b092" providerId="LiveId" clId="{8A8653A4-EEE4-480C-A831-A23D8E4BA8F6}" dt="2023-06-03T22:31:52.602" v="1940" actId="164"/>
+          <ac:grpSpMkLst>
+            <pc:docMk/>
+            <pc:sldMk cId="900757665" sldId="257"/>
+            <ac:grpSpMk id="59" creationId="{6DAE5E8A-CD96-6ADD-BA05-5E9008751A36}"/>
+          </ac:grpSpMkLst>
+        </pc:grpChg>
+        <pc:grpChg chg="add del mod">
+          <ac:chgData name="Rose Joy Angeline Padilla" userId="ecdd412207c6b092" providerId="LiveId" clId="{8A8653A4-EEE4-480C-A831-A23D8E4BA8F6}" dt="2023-06-03T22:29:54.575" v="1697" actId="165"/>
+          <ac:grpSpMkLst>
+            <pc:docMk/>
+            <pc:sldMk cId="900757665" sldId="257"/>
+            <ac:grpSpMk id="67" creationId="{ABFDF6DE-1C27-5B87-574E-16EF972B5736}"/>
+          </ac:grpSpMkLst>
+        </pc:grpChg>
+        <pc:grpChg chg="add mod ord">
+          <ac:chgData name="Rose Joy Angeline Padilla" userId="ecdd412207c6b092" providerId="LiveId" clId="{8A8653A4-EEE4-480C-A831-A23D8E4BA8F6}" dt="2023-06-03T22:46:03.787" v="2394" actId="164"/>
+          <ac:grpSpMkLst>
+            <pc:docMk/>
+            <pc:sldMk cId="900757665" sldId="257"/>
+            <ac:grpSpMk id="68" creationId="{37F85369-EC0C-BFBB-E697-2645F6897737}"/>
+          </ac:grpSpMkLst>
+        </pc:grpChg>
+        <pc:grpChg chg="add del mod">
+          <ac:chgData name="Rose Joy Angeline Padilla" userId="ecdd412207c6b092" providerId="LiveId" clId="{8A8653A4-EEE4-480C-A831-A23D8E4BA8F6}" dt="2023-06-03T22:31:07.217" v="1814"/>
+          <ac:grpSpMkLst>
+            <pc:docMk/>
+            <pc:sldMk cId="900757665" sldId="257"/>
+            <ac:grpSpMk id="69" creationId="{CDAB437C-4A2A-E3A7-6BA7-3A2F3F6BFBA4}"/>
+          </ac:grpSpMkLst>
+        </pc:grpChg>
+        <pc:grpChg chg="add mod">
+          <ac:chgData name="Rose Joy Angeline Padilla" userId="ecdd412207c6b092" providerId="LiveId" clId="{8A8653A4-EEE4-480C-A831-A23D8E4BA8F6}" dt="2023-06-03T22:38:13.462" v="2089" actId="1076"/>
+          <ac:grpSpMkLst>
+            <pc:docMk/>
+            <pc:sldMk cId="900757665" sldId="257"/>
+            <ac:grpSpMk id="73" creationId="{3E5B5ADC-CFAE-5F45-70EB-A6BDB89AE105}"/>
+          </ac:grpSpMkLst>
+        </pc:grpChg>
+        <pc:grpChg chg="add mod">
+          <ac:chgData name="Rose Joy Angeline Padilla" userId="ecdd412207c6b092" providerId="LiveId" clId="{8A8653A4-EEE4-480C-A831-A23D8E4BA8F6}" dt="2023-06-03T22:52:03.722" v="2501" actId="164"/>
+          <ac:grpSpMkLst>
+            <pc:docMk/>
+            <pc:sldMk cId="900757665" sldId="257"/>
+            <ac:grpSpMk id="75" creationId="{1AC56FFE-0E44-ACAA-2F09-9CB36B2822AC}"/>
+          </ac:grpSpMkLst>
+        </pc:grpChg>
+        <pc:grpChg chg="add mod">
+          <ac:chgData name="Rose Joy Angeline Padilla" userId="ecdd412207c6b092" providerId="LiveId" clId="{8A8653A4-EEE4-480C-A831-A23D8E4BA8F6}" dt="2023-06-03T22:52:03.722" v="2501" actId="164"/>
+          <ac:grpSpMkLst>
+            <pc:docMk/>
+            <pc:sldMk cId="900757665" sldId="257"/>
+            <ac:grpSpMk id="80" creationId="{EE4AA5E3-0369-4E86-0F28-FFCC0A053BE8}"/>
+          </ac:grpSpMkLst>
+        </pc:grpChg>
+        <pc:picChg chg="add del mod topLvl">
+          <ac:chgData name="Rose Joy Angeline Padilla" userId="ecdd412207c6b092" providerId="LiveId" clId="{8A8653A4-EEE4-480C-A831-A23D8E4BA8F6}" dt="2023-06-03T22:03:40.289" v="920" actId="478"/>
+          <ac:picMkLst>
+            <pc:docMk/>
+            <pc:sldMk cId="900757665" sldId="257"/>
+            <ac:picMk id="3" creationId="{EE8B29B5-A606-BE16-CF92-2A027A0F38C8}"/>
+          </ac:picMkLst>
+        </pc:picChg>
+        <pc:picChg chg="del mod topLvl">
+          <ac:chgData name="Rose Joy Angeline Padilla" userId="ecdd412207c6b092" providerId="LiveId" clId="{8A8653A4-EEE4-480C-A831-A23D8E4BA8F6}" dt="2023-06-03T22:37:27.950" v="2084" actId="478"/>
+          <ac:picMkLst>
+            <pc:docMk/>
+            <pc:sldMk cId="900757665" sldId="257"/>
+            <ac:picMk id="5" creationId="{907824E4-9E3D-43CD-C106-333AACD876A9}"/>
+          </ac:picMkLst>
+        </pc:picChg>
+        <pc:picChg chg="del mod topLvl">
+          <ac:chgData name="Rose Joy Angeline Padilla" userId="ecdd412207c6b092" providerId="LiveId" clId="{8A8653A4-EEE4-480C-A831-A23D8E4BA8F6}" dt="2023-06-03T21:47:03.513" v="604" actId="478"/>
+          <ac:picMkLst>
+            <pc:docMk/>
+            <pc:sldMk cId="900757665" sldId="257"/>
+            <ac:picMk id="7" creationId="{DAD80A57-0AB4-0C83-50CF-4487C7E86293}"/>
+          </ac:picMkLst>
+        </pc:picChg>
+        <pc:picChg chg="add del mod ord topLvl">
+          <ac:chgData name="Rose Joy Angeline Padilla" userId="ecdd412207c6b092" providerId="LiveId" clId="{8A8653A4-EEE4-480C-A831-A23D8E4BA8F6}" dt="2023-06-03T21:55:06.850" v="822" actId="478"/>
+          <ac:picMkLst>
+            <pc:docMk/>
+            <pc:sldMk cId="900757665" sldId="257"/>
+            <ac:picMk id="9" creationId="{A0131655-D1C2-A1A9-B639-9217AAEFD1F8}"/>
+          </ac:picMkLst>
+        </pc:picChg>
+        <pc:picChg chg="add mod">
+          <ac:chgData name="Rose Joy Angeline Padilla" userId="ecdd412207c6b092" providerId="LiveId" clId="{8A8653A4-EEE4-480C-A831-A23D8E4BA8F6}" dt="2023-06-03T21:41:13.702" v="273" actId="164"/>
+          <ac:picMkLst>
+            <pc:docMk/>
+            <pc:sldMk cId="900757665" sldId="257"/>
+            <ac:picMk id="22" creationId="{AB0046DC-481D-1130-4861-4A3D56A5F073}"/>
+          </ac:picMkLst>
+        </pc:picChg>
+        <pc:picChg chg="add mod">
+          <ac:chgData name="Rose Joy Angeline Padilla" userId="ecdd412207c6b092" providerId="LiveId" clId="{8A8653A4-EEE4-480C-A831-A23D8E4BA8F6}" dt="2023-06-03T22:29:54.575" v="1697" actId="165"/>
+          <ac:picMkLst>
+            <pc:docMk/>
+            <pc:sldMk cId="900757665" sldId="257"/>
+            <ac:picMk id="30" creationId="{5EDC206C-91E3-8E5D-CC6C-41BA5E36D1E7}"/>
+          </ac:picMkLst>
+        </pc:picChg>
+        <pc:picChg chg="add del mod">
+          <ac:chgData name="Rose Joy Angeline Padilla" userId="ecdd412207c6b092" providerId="LiveId" clId="{8A8653A4-EEE4-480C-A831-A23D8E4BA8F6}" dt="2023-06-03T21:59:04.193" v="887" actId="478"/>
+          <ac:picMkLst>
+            <pc:docMk/>
+            <pc:sldMk cId="900757665" sldId="257"/>
+            <ac:picMk id="32" creationId="{9E119BF2-F7EA-F791-2301-F30BEC70CDE3}"/>
+          </ac:picMkLst>
+        </pc:picChg>
+        <pc:picChg chg="add mod">
+          <ac:chgData name="Rose Joy Angeline Padilla" userId="ecdd412207c6b092" providerId="LiveId" clId="{8A8653A4-EEE4-480C-A831-A23D8E4BA8F6}" dt="2023-06-03T22:29:54.575" v="1697" actId="165"/>
+          <ac:picMkLst>
+            <pc:docMk/>
+            <pc:sldMk cId="900757665" sldId="257"/>
+            <ac:picMk id="34" creationId="{22C573B1-DA24-07B6-6E5C-596469B07AC7}"/>
+          </ac:picMkLst>
+        </pc:picChg>
+        <pc:picChg chg="add mod">
+          <ac:chgData name="Rose Joy Angeline Padilla" userId="ecdd412207c6b092" providerId="LiveId" clId="{8A8653A4-EEE4-480C-A831-A23D8E4BA8F6}" dt="2023-06-03T21:59:40.341" v="900" actId="571"/>
+          <ac:picMkLst>
+            <pc:docMk/>
+            <pc:sldMk cId="900757665" sldId="257"/>
+            <ac:picMk id="35" creationId="{62553AA7-D6F4-1EE6-F246-3FC1CDEE54FA}"/>
+          </ac:picMkLst>
+        </pc:picChg>
+        <pc:picChg chg="add mod">
+          <ac:chgData name="Rose Joy Angeline Padilla" userId="ecdd412207c6b092" providerId="LiveId" clId="{8A8653A4-EEE4-480C-A831-A23D8E4BA8F6}" dt="2023-06-03T21:59:40.341" v="900" actId="571"/>
+          <ac:picMkLst>
+            <pc:docMk/>
+            <pc:sldMk cId="900757665" sldId="257"/>
+            <ac:picMk id="36" creationId="{C01F3302-FDBD-1C7F-0055-771966060C80}"/>
+          </ac:picMkLst>
+        </pc:picChg>
+        <pc:picChg chg="add mod">
+          <ac:chgData name="Rose Joy Angeline Padilla" userId="ecdd412207c6b092" providerId="LiveId" clId="{8A8653A4-EEE4-480C-A831-A23D8E4BA8F6}" dt="2023-06-03T22:29:54.575" v="1697" actId="165"/>
+          <ac:picMkLst>
+            <pc:docMk/>
+            <pc:sldMk cId="900757665" sldId="257"/>
+            <ac:picMk id="39" creationId="{18339F49-92EF-B92D-176D-83FDA51EA667}"/>
+          </ac:picMkLst>
+        </pc:picChg>
+        <pc:picChg chg="add mod">
+          <ac:chgData name="Rose Joy Angeline Padilla" userId="ecdd412207c6b092" providerId="LiveId" clId="{8A8653A4-EEE4-480C-A831-A23D8E4BA8F6}" dt="2023-06-03T22:29:54.575" v="1697" actId="165"/>
+          <ac:picMkLst>
+            <pc:docMk/>
+            <pc:sldMk cId="900757665" sldId="257"/>
+            <ac:picMk id="41" creationId="{EED70979-92E4-31CA-B815-56217BDEF4EE}"/>
+          </ac:picMkLst>
+        </pc:picChg>
+        <pc:picChg chg="add mod topLvl">
+          <ac:chgData name="Rose Joy Angeline Padilla" userId="ecdd412207c6b092" providerId="LiveId" clId="{8A8653A4-EEE4-480C-A831-A23D8E4BA8F6}" dt="2023-06-03T22:30:59.781" v="1810" actId="164"/>
+          <ac:picMkLst>
+            <pc:docMk/>
+            <pc:sldMk cId="900757665" sldId="257"/>
+            <ac:picMk id="44" creationId="{BEAB5C5C-D88A-F81B-B11A-016EF7831D55}"/>
+          </ac:picMkLst>
+        </pc:picChg>
+        <pc:picChg chg="add mod">
+          <ac:chgData name="Rose Joy Angeline Padilla" userId="ecdd412207c6b092" providerId="LiveId" clId="{8A8653A4-EEE4-480C-A831-A23D8E4BA8F6}" dt="2023-06-03T22:09:52.829" v="1055" actId="1076"/>
+          <ac:picMkLst>
+            <pc:docMk/>
+            <pc:sldMk cId="900757665" sldId="257"/>
+            <ac:picMk id="48" creationId="{9960A429-2085-71B2-AC9B-A756F94E851B}"/>
+          </ac:picMkLst>
+        </pc:picChg>
+        <pc:picChg chg="add mod">
+          <ac:chgData name="Rose Joy Angeline Padilla" userId="ecdd412207c6b092" providerId="LiveId" clId="{8A8653A4-EEE4-480C-A831-A23D8E4BA8F6}" dt="2023-06-03T22:09:50.905" v="1054" actId="1076"/>
+          <ac:picMkLst>
+            <pc:docMk/>
+            <pc:sldMk cId="900757665" sldId="257"/>
+            <ac:picMk id="50" creationId="{930A53EC-5EBE-86E9-AFC5-6F1741EE1A72}"/>
+          </ac:picMkLst>
+        </pc:picChg>
+        <pc:picChg chg="add mod">
+          <ac:chgData name="Rose Joy Angeline Padilla" userId="ecdd412207c6b092" providerId="LiveId" clId="{8A8653A4-EEE4-480C-A831-A23D8E4BA8F6}" dt="2023-06-03T22:09:49.041" v="1053" actId="1076"/>
+          <ac:picMkLst>
+            <pc:docMk/>
+            <pc:sldMk cId="900757665" sldId="257"/>
+            <ac:picMk id="52" creationId="{1782260A-73F5-3526-70E9-7BC73513DA77}"/>
+          </ac:picMkLst>
+        </pc:picChg>
+        <pc:picChg chg="add mod">
+          <ac:chgData name="Rose Joy Angeline Padilla" userId="ecdd412207c6b092" providerId="LiveId" clId="{8A8653A4-EEE4-480C-A831-A23D8E4BA8F6}" dt="2023-06-03T22:09:47.242" v="1052" actId="1076"/>
+          <ac:picMkLst>
+            <pc:docMk/>
+            <pc:sldMk cId="900757665" sldId="257"/>
+            <ac:picMk id="54" creationId="{A8680BD8-AEF2-8082-5237-CFF2A6C35B5F}"/>
+          </ac:picMkLst>
+        </pc:picChg>
+        <pc:picChg chg="add mod topLvl">
+          <ac:chgData name="Rose Joy Angeline Padilla" userId="ecdd412207c6b092" providerId="LiveId" clId="{8A8653A4-EEE4-480C-A831-A23D8E4BA8F6}" dt="2023-06-03T22:31:52.602" v="1940" actId="164"/>
+          <ac:picMkLst>
+            <pc:docMk/>
+            <pc:sldMk cId="900757665" sldId="257"/>
+            <ac:picMk id="56" creationId="{F37977D1-2847-C0F7-7541-5C3A37DCA779}"/>
+          </ac:picMkLst>
+        </pc:picChg>
+        <pc:picChg chg="add mod">
+          <ac:chgData name="Rose Joy Angeline Padilla" userId="ecdd412207c6b092" providerId="LiveId" clId="{8A8653A4-EEE4-480C-A831-A23D8E4BA8F6}" dt="2023-06-03T22:29:54.575" v="1697" actId="165"/>
+          <ac:picMkLst>
+            <pc:docMk/>
+            <pc:sldMk cId="900757665" sldId="257"/>
+            <ac:picMk id="58" creationId="{CE8A0943-F23B-276D-43FC-7187A5F87617}"/>
+          </ac:picMkLst>
+        </pc:picChg>
+        <pc:picChg chg="add mod">
+          <ac:chgData name="Rose Joy Angeline Padilla" userId="ecdd412207c6b092" providerId="LiveId" clId="{8A8653A4-EEE4-480C-A831-A23D8E4BA8F6}" dt="2023-06-03T22:26:17.472" v="1614" actId="571"/>
+          <ac:picMkLst>
+            <pc:docMk/>
+            <pc:sldMk cId="900757665" sldId="257"/>
+            <ac:picMk id="64" creationId="{E27E0B55-57D5-BBF3-EB81-75FAD8E74E7D}"/>
+          </ac:picMkLst>
+        </pc:picChg>
+        <pc:picChg chg="mod">
+          <ac:chgData name="Rose Joy Angeline Padilla" userId="ecdd412207c6b092" providerId="LiveId" clId="{8A8653A4-EEE4-480C-A831-A23D8E4BA8F6}" dt="2023-06-03T22:31:02.567" v="1811"/>
+          <ac:picMkLst>
+            <pc:docMk/>
+            <pc:sldMk cId="900757665" sldId="257"/>
+            <ac:picMk id="70" creationId="{2FCA6E23-6E6A-B500-949A-5094B3431793}"/>
+          </ac:picMkLst>
+        </pc:picChg>
+        <pc:picChg chg="add mod ord">
+          <ac:chgData name="Rose Joy Angeline Padilla" userId="ecdd412207c6b092" providerId="LiveId" clId="{8A8653A4-EEE4-480C-A831-A23D8E4BA8F6}" dt="2023-06-03T22:31:52.602" v="1940" actId="164"/>
+          <ac:picMkLst>
+            <pc:docMk/>
+            <pc:sldMk cId="900757665" sldId="257"/>
+            <ac:picMk id="72" creationId="{2FCEE5F4-77E2-27C4-6462-898FDE47A0C3}"/>
+          </ac:picMkLst>
+        </pc:picChg>
+        <pc:picChg chg="add mod">
+          <ac:chgData name="Rose Joy Angeline Padilla" userId="ecdd412207c6b092" providerId="LiveId" clId="{8A8653A4-EEE4-480C-A831-A23D8E4BA8F6}" dt="2023-06-03T22:52:03.722" v="2501" actId="164"/>
+          <ac:picMkLst>
+            <pc:docMk/>
+            <pc:sldMk cId="900757665" sldId="257"/>
+            <ac:picMk id="77" creationId="{60029FD9-737C-AE5E-DBD0-D63E71F9927C}"/>
+          </ac:picMkLst>
+        </pc:picChg>
+        <pc:picChg chg="add mod">
+          <ac:chgData name="Rose Joy Angeline Padilla" userId="ecdd412207c6b092" providerId="LiveId" clId="{8A8653A4-EEE4-480C-A831-A23D8E4BA8F6}" dt="2023-06-03T22:52:03.722" v="2501" actId="164"/>
+          <ac:picMkLst>
+            <pc:docMk/>
+            <pc:sldMk cId="900757665" sldId="257"/>
+            <ac:picMk id="79" creationId="{4C712D11-F68B-9B08-62D6-E72A13145CF0}"/>
+          </ac:picMkLst>
+        </pc:picChg>
+      </pc:sldChg>
+      <pc:sldChg chg="modSp add mod">
+        <pc:chgData name="Rose Joy Angeline Padilla" userId="ecdd412207c6b092" providerId="LiveId" clId="{8A8653A4-EEE4-480C-A831-A23D8E4BA8F6}" dt="2023-06-03T22:54:09.082" v="2504" actId="1076"/>
+        <pc:sldMkLst>
+          <pc:docMk/>
+          <pc:sldMk cId="3486530727" sldId="258"/>
+        </pc:sldMkLst>
+        <pc:grpChg chg="mod">
+          <ac:chgData name="Rose Joy Angeline Padilla" userId="ecdd412207c6b092" providerId="LiveId" clId="{8A8653A4-EEE4-480C-A831-A23D8E4BA8F6}" dt="2023-06-03T22:54:09.082" v="2504" actId="1076"/>
+          <ac:grpSpMkLst>
+            <pc:docMk/>
+            <pc:sldMk cId="3486530727" sldId="258"/>
+            <ac:grpSpMk id="80" creationId="{EE4AA5E3-0369-4E86-0F28-FFCC0A053BE8}"/>
+          </ac:grpSpMkLst>
+        </pc:grpChg>
       </pc:sldChg>
     </pc:docChg>
   </pc:docChgLst>
@@ -373,7 +890,7 @@
           <a:p>
             <a:fld id="{3928D824-A091-4A9A-8C33-DAD4A4AAC48F}" type="datetimeFigureOut">
               <a:rPr lang="en-PH" smtClean="0"/>
-              <a:t>31/05/2023</a:t>
+              <a:t>04/06/2023</a:t>
             </a:fld>
             <a:endParaRPr lang="en-PH"/>
           </a:p>
@@ -573,7 +1090,7 @@
           <a:p>
             <a:fld id="{3928D824-A091-4A9A-8C33-DAD4A4AAC48F}" type="datetimeFigureOut">
               <a:rPr lang="en-PH" smtClean="0"/>
-              <a:t>31/05/2023</a:t>
+              <a:t>04/06/2023</a:t>
             </a:fld>
             <a:endParaRPr lang="en-PH"/>
           </a:p>
@@ -783,7 +1300,7 @@
           <a:p>
             <a:fld id="{3928D824-A091-4A9A-8C33-DAD4A4AAC48F}" type="datetimeFigureOut">
               <a:rPr lang="en-PH" smtClean="0"/>
-              <a:t>31/05/2023</a:t>
+              <a:t>04/06/2023</a:t>
             </a:fld>
             <a:endParaRPr lang="en-PH"/>
           </a:p>
@@ -983,7 +1500,7 @@
           <a:p>
             <a:fld id="{3928D824-A091-4A9A-8C33-DAD4A4AAC48F}" type="datetimeFigureOut">
               <a:rPr lang="en-PH" smtClean="0"/>
-              <a:t>31/05/2023</a:t>
+              <a:t>04/06/2023</a:t>
             </a:fld>
             <a:endParaRPr lang="en-PH"/>
           </a:p>
@@ -1259,7 +1776,7 @@
           <a:p>
             <a:fld id="{3928D824-A091-4A9A-8C33-DAD4A4AAC48F}" type="datetimeFigureOut">
               <a:rPr lang="en-PH" smtClean="0"/>
-              <a:t>31/05/2023</a:t>
+              <a:t>04/06/2023</a:t>
             </a:fld>
             <a:endParaRPr lang="en-PH"/>
           </a:p>
@@ -1527,7 +2044,7 @@
           <a:p>
             <a:fld id="{3928D824-A091-4A9A-8C33-DAD4A4AAC48F}" type="datetimeFigureOut">
               <a:rPr lang="en-PH" smtClean="0"/>
-              <a:t>31/05/2023</a:t>
+              <a:t>04/06/2023</a:t>
             </a:fld>
             <a:endParaRPr lang="en-PH"/>
           </a:p>
@@ -1942,7 +2459,7 @@
           <a:p>
             <a:fld id="{3928D824-A091-4A9A-8C33-DAD4A4AAC48F}" type="datetimeFigureOut">
               <a:rPr lang="en-PH" smtClean="0"/>
-              <a:t>31/05/2023</a:t>
+              <a:t>04/06/2023</a:t>
             </a:fld>
             <a:endParaRPr lang="en-PH"/>
           </a:p>
@@ -2084,7 +2601,7 @@
           <a:p>
             <a:fld id="{3928D824-A091-4A9A-8C33-DAD4A4AAC48F}" type="datetimeFigureOut">
               <a:rPr lang="en-PH" smtClean="0"/>
-              <a:t>31/05/2023</a:t>
+              <a:t>04/06/2023</a:t>
             </a:fld>
             <a:endParaRPr lang="en-PH"/>
           </a:p>
@@ -2197,7 +2714,7 @@
           <a:p>
             <a:fld id="{3928D824-A091-4A9A-8C33-DAD4A4AAC48F}" type="datetimeFigureOut">
               <a:rPr lang="en-PH" smtClean="0"/>
-              <a:t>31/05/2023</a:t>
+              <a:t>04/06/2023</a:t>
             </a:fld>
             <a:endParaRPr lang="en-PH"/>
           </a:p>
@@ -2510,7 +3027,7 @@
           <a:p>
             <a:fld id="{3928D824-A091-4A9A-8C33-DAD4A4AAC48F}" type="datetimeFigureOut">
               <a:rPr lang="en-PH" smtClean="0"/>
-              <a:t>31/05/2023</a:t>
+              <a:t>04/06/2023</a:t>
             </a:fld>
             <a:endParaRPr lang="en-PH"/>
           </a:p>
@@ -2799,7 +3316,7 @@
           <a:p>
             <a:fld id="{3928D824-A091-4A9A-8C33-DAD4A4AAC48F}" type="datetimeFigureOut">
               <a:rPr lang="en-PH" smtClean="0"/>
-              <a:t>31/05/2023</a:t>
+              <a:t>04/06/2023</a:t>
             </a:fld>
             <a:endParaRPr lang="en-PH"/>
           </a:p>
@@ -3042,7 +3559,7 @@
           <a:p>
             <a:fld id="{3928D824-A091-4A9A-8C33-DAD4A4AAC48F}" type="datetimeFigureOut">
               <a:rPr lang="en-PH" smtClean="0"/>
-              <a:t>31/05/2023</a:t>
+              <a:t>04/06/2023</a:t>
             </a:fld>
             <a:endParaRPr lang="en-PH"/>
           </a:p>
@@ -3692,6 +4209,2642 @@
 </p:sld>
 </file>
 
+<file path=ppt/slides/slide2.xml><?xml version="1.0" encoding="utf-8"?>
+<p:sld xmlns:a="http://schemas.openxmlformats.org/drawingml/2006/main" xmlns:r="http://schemas.openxmlformats.org/officeDocument/2006/relationships" xmlns:p="http://schemas.openxmlformats.org/presentationml/2006/main">
+  <p:cSld>
+    <p:spTree>
+      <p:nvGrpSpPr>
+        <p:cNvPr id="1" name=""/>
+        <p:cNvGrpSpPr/>
+        <p:nvPr/>
+      </p:nvGrpSpPr>
+      <p:grpSpPr>
+        <a:xfrm>
+          <a:off x="0" y="0"/>
+          <a:ext cx="0" cy="0"/>
+          <a:chOff x="0" y="0"/>
+          <a:chExt cx="0" cy="0"/>
+        </a:xfrm>
+      </p:grpSpPr>
+      <p:pic>
+        <p:nvPicPr>
+          <p:cNvPr id="48" name="Graphic 47" descr="Lightbulb">
+            <a:extLst>
+              <a:ext uri="{FF2B5EF4-FFF2-40B4-BE49-F238E27FC236}">
+                <a16:creationId xmlns:a16="http://schemas.microsoft.com/office/drawing/2014/main" id="{9960A429-2085-71B2-AC9B-A756F94E851B}"/>
+              </a:ext>
+            </a:extLst>
+          </p:cNvPr>
+          <p:cNvPicPr>
+            <a:picLocks noChangeAspect="1"/>
+          </p:cNvPicPr>
+          <p:nvPr/>
+        </p:nvPicPr>
+        <p:blipFill>
+          <a:blip r:embed="rId2">
+            <a:extLst>
+              <a:ext uri="{28A0092B-C50C-407E-A947-70E740481C1C}">
+                <a14:useLocalDpi xmlns:a14="http://schemas.microsoft.com/office/drawing/2010/main" val="0"/>
+              </a:ext>
+              <a:ext uri="{96DAC541-7B7A-43D3-8B79-37D633B846F1}">
+                <asvg:svgBlip xmlns:asvg="http://schemas.microsoft.com/office/drawing/2016/SVG/main" r:embed="rId3"/>
+              </a:ext>
+            </a:extLst>
+          </a:blip>
+          <a:stretch>
+            <a:fillRect/>
+          </a:stretch>
+        </p:blipFill>
+        <p:spPr>
+          <a:xfrm>
+            <a:off x="13730160" y="293399"/>
+            <a:ext cx="914400" cy="914400"/>
+          </a:xfrm>
+          <a:prstGeom prst="rect">
+            <a:avLst/>
+          </a:prstGeom>
+        </p:spPr>
+      </p:pic>
+      <p:pic>
+        <p:nvPicPr>
+          <p:cNvPr id="50" name="Graphic 49" descr="Bar chart RTL">
+            <a:extLst>
+              <a:ext uri="{FF2B5EF4-FFF2-40B4-BE49-F238E27FC236}">
+                <a16:creationId xmlns:a16="http://schemas.microsoft.com/office/drawing/2014/main" id="{930A53EC-5EBE-86E9-AFC5-6F1741EE1A72}"/>
+              </a:ext>
+            </a:extLst>
+          </p:cNvPr>
+          <p:cNvPicPr>
+            <a:picLocks noChangeAspect="1"/>
+          </p:cNvPicPr>
+          <p:nvPr/>
+        </p:nvPicPr>
+        <p:blipFill>
+          <a:blip r:embed="rId4">
+            <a:extLst>
+              <a:ext uri="{28A0092B-C50C-407E-A947-70E740481C1C}">
+                <a14:useLocalDpi xmlns:a14="http://schemas.microsoft.com/office/drawing/2010/main" val="0"/>
+              </a:ext>
+              <a:ext uri="{96DAC541-7B7A-43D3-8B79-37D633B846F1}">
+                <asvg:svgBlip xmlns:asvg="http://schemas.microsoft.com/office/drawing/2016/SVG/main" r:embed="rId5"/>
+              </a:ext>
+            </a:extLst>
+          </a:blip>
+          <a:stretch>
+            <a:fillRect/>
+          </a:stretch>
+        </p:blipFill>
+        <p:spPr>
+          <a:xfrm>
+            <a:off x="12838366" y="3151682"/>
+            <a:ext cx="1198880" cy="1198880"/>
+          </a:xfrm>
+          <a:prstGeom prst="rect">
+            <a:avLst/>
+          </a:prstGeom>
+        </p:spPr>
+      </p:pic>
+      <p:pic>
+        <p:nvPicPr>
+          <p:cNvPr id="52" name="Graphic 51" descr="Man changing baby">
+            <a:extLst>
+              <a:ext uri="{FF2B5EF4-FFF2-40B4-BE49-F238E27FC236}">
+                <a16:creationId xmlns:a16="http://schemas.microsoft.com/office/drawing/2014/main" id="{1782260A-73F5-3526-70E9-7BC73513DA77}"/>
+              </a:ext>
+            </a:extLst>
+          </p:cNvPr>
+          <p:cNvPicPr>
+            <a:picLocks noChangeAspect="1"/>
+          </p:cNvPicPr>
+          <p:nvPr/>
+        </p:nvPicPr>
+        <p:blipFill>
+          <a:blip r:embed="rId6">
+            <a:extLst>
+              <a:ext uri="{28A0092B-C50C-407E-A947-70E740481C1C}">
+                <a14:useLocalDpi xmlns:a14="http://schemas.microsoft.com/office/drawing/2010/main" val="0"/>
+              </a:ext>
+              <a:ext uri="{96DAC541-7B7A-43D3-8B79-37D633B846F1}">
+                <asvg:svgBlip xmlns:asvg="http://schemas.microsoft.com/office/drawing/2016/SVG/main" r:embed="rId7"/>
+              </a:ext>
+            </a:extLst>
+          </a:blip>
+          <a:stretch>
+            <a:fillRect/>
+          </a:stretch>
+        </p:blipFill>
+        <p:spPr>
+          <a:xfrm>
+            <a:off x="12838366" y="1230163"/>
+            <a:ext cx="914400" cy="914400"/>
+          </a:xfrm>
+          <a:prstGeom prst="rect">
+            <a:avLst/>
+          </a:prstGeom>
+        </p:spPr>
+      </p:pic>
+      <p:pic>
+        <p:nvPicPr>
+          <p:cNvPr id="54" name="Graphic 53" descr="Pie chart">
+            <a:extLst>
+              <a:ext uri="{FF2B5EF4-FFF2-40B4-BE49-F238E27FC236}">
+                <a16:creationId xmlns:a16="http://schemas.microsoft.com/office/drawing/2014/main" id="{A8680BD8-AEF2-8082-5237-CFF2A6C35B5F}"/>
+              </a:ext>
+            </a:extLst>
+          </p:cNvPr>
+          <p:cNvPicPr>
+            <a:picLocks noChangeAspect="1"/>
+          </p:cNvPicPr>
+          <p:nvPr/>
+        </p:nvPicPr>
+        <p:blipFill>
+          <a:blip r:embed="rId8">
+            <a:extLst>
+              <a:ext uri="{28A0092B-C50C-407E-A947-70E740481C1C}">
+                <a14:useLocalDpi xmlns:a14="http://schemas.microsoft.com/office/drawing/2010/main" val="0"/>
+              </a:ext>
+              <a:ext uri="{96DAC541-7B7A-43D3-8B79-37D633B846F1}">
+                <asvg:svgBlip xmlns:asvg="http://schemas.microsoft.com/office/drawing/2016/SVG/main" r:embed="rId9"/>
+              </a:ext>
+            </a:extLst>
+          </a:blip>
+          <a:stretch>
+            <a:fillRect/>
+          </a:stretch>
+        </p:blipFill>
+        <p:spPr>
+          <a:xfrm>
+            <a:off x="12097813" y="2069228"/>
+            <a:ext cx="1082454" cy="1082454"/>
+          </a:xfrm>
+          <a:prstGeom prst="rect">
+            <a:avLst/>
+          </a:prstGeom>
+        </p:spPr>
+      </p:pic>
+      <p:grpSp>
+        <p:nvGrpSpPr>
+          <p:cNvPr id="73" name="Group 72">
+            <a:extLst>
+              <a:ext uri="{FF2B5EF4-FFF2-40B4-BE49-F238E27FC236}">
+                <a16:creationId xmlns:a16="http://schemas.microsoft.com/office/drawing/2014/main" id="{3E5B5ADC-CFAE-5F45-70EB-A6BDB89AE105}"/>
+              </a:ext>
+            </a:extLst>
+          </p:cNvPr>
+          <p:cNvGrpSpPr/>
+          <p:nvPr/>
+        </p:nvGrpSpPr>
+        <p:grpSpPr>
+          <a:xfrm>
+            <a:off x="476250" y="-8216"/>
+            <a:ext cx="11330438" cy="2123444"/>
+            <a:chOff x="476250" y="-8216"/>
+            <a:chExt cx="11330438" cy="2017951"/>
+          </a:xfrm>
+        </p:grpSpPr>
+        <p:pic>
+          <p:nvPicPr>
+            <p:cNvPr id="72" name="Picture 71">
+              <a:extLst>
+                <a:ext uri="{FF2B5EF4-FFF2-40B4-BE49-F238E27FC236}">
+                  <a16:creationId xmlns:a16="http://schemas.microsoft.com/office/drawing/2014/main" id="{2FCEE5F4-77E2-27C4-6462-898FDE47A0C3}"/>
+                </a:ext>
+              </a:extLst>
+            </p:cNvPr>
+            <p:cNvPicPr>
+              <a:picLocks noChangeAspect="1"/>
+            </p:cNvPicPr>
+            <p:nvPr/>
+          </p:nvPicPr>
+          <p:blipFill>
+            <a:blip r:embed="rId10"/>
+            <a:stretch>
+              <a:fillRect/>
+            </a:stretch>
+          </p:blipFill>
+          <p:spPr>
+            <a:xfrm>
+              <a:off x="508529" y="-8216"/>
+              <a:ext cx="11235902" cy="2017951"/>
+            </a:xfrm>
+            <a:prstGeom prst="rect">
+              <a:avLst/>
+            </a:prstGeom>
+          </p:spPr>
+        </p:pic>
+        <p:sp>
+          <p:nvSpPr>
+            <p:cNvPr id="4" name="TextBox 3">
+              <a:extLst>
+                <a:ext uri="{FF2B5EF4-FFF2-40B4-BE49-F238E27FC236}">
+                  <a16:creationId xmlns:a16="http://schemas.microsoft.com/office/drawing/2014/main" id="{55293C82-9B5F-DC86-5006-7253D2B111DF}"/>
+                </a:ext>
+              </a:extLst>
+            </p:cNvPr>
+            <p:cNvSpPr txBox="1"/>
+            <p:nvPr/>
+          </p:nvSpPr>
+          <p:spPr>
+            <a:xfrm>
+              <a:off x="476250" y="100749"/>
+              <a:ext cx="11237214" cy="400110"/>
+            </a:xfrm>
+            <a:prstGeom prst="rect">
+              <a:avLst/>
+            </a:prstGeom>
+            <a:noFill/>
+          </p:spPr>
+          <p:txBody>
+            <a:bodyPr wrap="square" rtlCol="0">
+              <a:spAutoFit/>
+            </a:bodyPr>
+            <a:lstStyle/>
+            <a:p>
+              <a:pPr algn="ctr"/>
+              <a:r>
+                <a:rPr lang="en-US" sz="2000" b="1" i="1" dirty="0">
+                  <a:solidFill>
+                    <a:schemeClr val="tx1">
+                      <a:lumMod val="65000"/>
+                      <a:lumOff val="35000"/>
+                    </a:schemeClr>
+                  </a:solidFill>
+                  <a:effectLst/>
+                </a:rPr>
+                <a:t>3 MAJOR STAGES OF LIFE</a:t>
+              </a:r>
+              <a:endParaRPr lang="en-US" sz="2000" b="0" i="1" dirty="0">
+                <a:solidFill>
+                  <a:schemeClr val="tx1">
+                    <a:lumMod val="65000"/>
+                    <a:lumOff val="35000"/>
+                  </a:schemeClr>
+                </a:solidFill>
+                <a:effectLst/>
+              </a:endParaRPr>
+            </a:p>
+          </p:txBody>
+        </p:sp>
+        <p:grpSp>
+          <p:nvGrpSpPr>
+            <p:cNvPr id="42" name="Group 41">
+              <a:extLst>
+                <a:ext uri="{FF2B5EF4-FFF2-40B4-BE49-F238E27FC236}">
+                  <a16:creationId xmlns:a16="http://schemas.microsoft.com/office/drawing/2014/main" id="{C7E56B02-81A6-FF26-3EE7-63AE9723E2A4}"/>
+                </a:ext>
+              </a:extLst>
+            </p:cNvPr>
+            <p:cNvGrpSpPr/>
+            <p:nvPr/>
+          </p:nvGrpSpPr>
+          <p:grpSpPr>
+            <a:xfrm>
+              <a:off x="5570918" y="463264"/>
+              <a:ext cx="1047877" cy="849983"/>
+              <a:chOff x="4511040" y="1877124"/>
+              <a:chExt cx="1264920" cy="914400"/>
+            </a:xfrm>
+          </p:grpSpPr>
+          <p:pic>
+            <p:nvPicPr>
+              <p:cNvPr id="39" name="Graphic 38" descr="Office worker">
+                <a:extLst>
+                  <a:ext uri="{FF2B5EF4-FFF2-40B4-BE49-F238E27FC236}">
+                    <a16:creationId xmlns:a16="http://schemas.microsoft.com/office/drawing/2014/main" id="{18339F49-92EF-B92D-176D-83FDA51EA667}"/>
+                  </a:ext>
+                </a:extLst>
+              </p:cNvPr>
+              <p:cNvPicPr>
+                <a:picLocks noChangeAspect="1"/>
+              </p:cNvPicPr>
+              <p:nvPr/>
+            </p:nvPicPr>
+            <p:blipFill>
+              <a:blip r:embed="rId11">
+                <a:extLst>
+                  <a:ext uri="{28A0092B-C50C-407E-A947-70E740481C1C}">
+                    <a14:useLocalDpi xmlns:a14="http://schemas.microsoft.com/office/drawing/2010/main" val="0"/>
+                  </a:ext>
+                  <a:ext uri="{96DAC541-7B7A-43D3-8B79-37D633B846F1}">
+                    <asvg:svgBlip xmlns:asvg="http://schemas.microsoft.com/office/drawing/2016/SVG/main" r:embed="rId12"/>
+                  </a:ext>
+                </a:extLst>
+              </a:blip>
+              <a:stretch>
+                <a:fillRect/>
+              </a:stretch>
+            </p:blipFill>
+            <p:spPr>
+              <a:xfrm>
+                <a:off x="4511040" y="1877124"/>
+                <a:ext cx="914400" cy="914400"/>
+              </a:xfrm>
+              <a:prstGeom prst="rect">
+                <a:avLst/>
+              </a:prstGeom>
+            </p:spPr>
+          </p:pic>
+          <p:pic>
+            <p:nvPicPr>
+              <p:cNvPr id="41" name="Graphic 40" descr="Briefcase">
+                <a:extLst>
+                  <a:ext uri="{FF2B5EF4-FFF2-40B4-BE49-F238E27FC236}">
+                    <a16:creationId xmlns:a16="http://schemas.microsoft.com/office/drawing/2014/main" id="{EED70979-92E4-31CA-B815-56217BDEF4EE}"/>
+                  </a:ext>
+                </a:extLst>
+              </p:cNvPr>
+              <p:cNvPicPr>
+                <a:picLocks noChangeAspect="1"/>
+              </p:cNvPicPr>
+              <p:nvPr/>
+            </p:nvPicPr>
+            <p:blipFill>
+              <a:blip r:embed="rId13">
+                <a:extLst>
+                  <a:ext uri="{28A0092B-C50C-407E-A947-70E740481C1C}">
+                    <a14:useLocalDpi xmlns:a14="http://schemas.microsoft.com/office/drawing/2010/main" val="0"/>
+                  </a:ext>
+                  <a:ext uri="{96DAC541-7B7A-43D3-8B79-37D633B846F1}">
+                    <asvg:svgBlip xmlns:asvg="http://schemas.microsoft.com/office/drawing/2016/SVG/main" r:embed="rId14"/>
+                  </a:ext>
+                </a:extLst>
+              </a:blip>
+              <a:stretch>
+                <a:fillRect/>
+              </a:stretch>
+            </p:blipFill>
+            <p:spPr>
+              <a:xfrm>
+                <a:off x="5256034" y="2230958"/>
+                <a:ext cx="519926" cy="519926"/>
+              </a:xfrm>
+              <a:prstGeom prst="rect">
+                <a:avLst/>
+              </a:prstGeom>
+            </p:spPr>
+          </p:pic>
+        </p:grpSp>
+        <p:pic>
+          <p:nvPicPr>
+            <p:cNvPr id="56" name="Picture 55">
+              <a:extLst>
+                <a:ext uri="{FF2B5EF4-FFF2-40B4-BE49-F238E27FC236}">
+                  <a16:creationId xmlns:a16="http://schemas.microsoft.com/office/drawing/2014/main" id="{F37977D1-2847-C0F7-7541-5C3A37DCA779}"/>
+                </a:ext>
+              </a:extLst>
+            </p:cNvPr>
+            <p:cNvPicPr>
+              <a:picLocks noChangeAspect="1"/>
+            </p:cNvPicPr>
+            <p:nvPr/>
+          </p:nvPicPr>
+          <p:blipFill>
+            <a:blip r:embed="rId15">
+              <a:extLst>
+                <a:ext uri="{28A0092B-C50C-407E-A947-70E740481C1C}">
+                  <a14:useLocalDpi xmlns:a14="http://schemas.microsoft.com/office/drawing/2010/main" val="0"/>
+                </a:ext>
+              </a:extLst>
+            </a:blip>
+            <a:stretch>
+              <a:fillRect/>
+            </a:stretch>
+          </p:blipFill>
+          <p:spPr>
+            <a:xfrm>
+              <a:off x="9010958" y="142926"/>
+              <a:ext cx="1221124" cy="1095959"/>
+            </a:xfrm>
+            <a:prstGeom prst="rect">
+              <a:avLst/>
+            </a:prstGeom>
+          </p:spPr>
+        </p:pic>
+        <p:grpSp>
+          <p:nvGrpSpPr>
+            <p:cNvPr id="59" name="Group 58">
+              <a:extLst>
+                <a:ext uri="{FF2B5EF4-FFF2-40B4-BE49-F238E27FC236}">
+                  <a16:creationId xmlns:a16="http://schemas.microsoft.com/office/drawing/2014/main" id="{6DAE5E8A-CD96-6ADD-BA05-5E9008751A36}"/>
+                </a:ext>
+              </a:extLst>
+            </p:cNvPr>
+            <p:cNvGrpSpPr/>
+            <p:nvPr/>
+          </p:nvGrpSpPr>
+          <p:grpSpPr>
+            <a:xfrm>
+              <a:off x="1684471" y="156970"/>
+              <a:ext cx="1418378" cy="1129170"/>
+              <a:chOff x="1320414" y="416559"/>
+              <a:chExt cx="1418378" cy="1129170"/>
+            </a:xfrm>
+          </p:grpSpPr>
+          <p:grpSp>
+            <p:nvGrpSpPr>
+              <p:cNvPr id="37" name="Group 36">
+                <a:extLst>
+                  <a:ext uri="{FF2B5EF4-FFF2-40B4-BE49-F238E27FC236}">
+                    <a16:creationId xmlns:a16="http://schemas.microsoft.com/office/drawing/2014/main" id="{0116B90B-D058-5059-CC0D-190AD76EDA3A}"/>
+                  </a:ext>
+                </a:extLst>
+              </p:cNvPr>
+              <p:cNvGrpSpPr/>
+              <p:nvPr/>
+            </p:nvGrpSpPr>
+            <p:grpSpPr>
+              <a:xfrm>
+                <a:off x="2044842" y="416559"/>
+                <a:ext cx="693950" cy="1126933"/>
+                <a:chOff x="962130" y="179005"/>
+                <a:chExt cx="924560" cy="1405128"/>
+              </a:xfrm>
+            </p:grpSpPr>
+            <p:pic>
+              <p:nvPicPr>
+                <p:cNvPr id="30" name="Graphic 29" descr="Books">
+                  <a:extLst>
+                    <a:ext uri="{FF2B5EF4-FFF2-40B4-BE49-F238E27FC236}">
+                      <a16:creationId xmlns:a16="http://schemas.microsoft.com/office/drawing/2014/main" id="{5EDC206C-91E3-8E5D-CC6C-41BA5E36D1E7}"/>
+                    </a:ext>
+                  </a:extLst>
+                </p:cNvPr>
+                <p:cNvPicPr>
+                  <a:picLocks noChangeAspect="1"/>
+                </p:cNvPicPr>
+                <p:nvPr/>
+              </p:nvPicPr>
+              <p:blipFill>
+                <a:blip r:embed="rId16">
+                  <a:extLst>
+                    <a:ext uri="{28A0092B-C50C-407E-A947-70E740481C1C}">
+                      <a14:useLocalDpi xmlns:a14="http://schemas.microsoft.com/office/drawing/2010/main" val="0"/>
+                    </a:ext>
+                    <a:ext uri="{96DAC541-7B7A-43D3-8B79-37D633B846F1}">
+                      <asvg:svgBlip xmlns:asvg="http://schemas.microsoft.com/office/drawing/2016/SVG/main" r:embed="rId17"/>
+                    </a:ext>
+                  </a:extLst>
+                </a:blip>
+                <a:stretch>
+                  <a:fillRect/>
+                </a:stretch>
+              </p:blipFill>
+              <p:spPr>
+                <a:xfrm>
+                  <a:off x="972290" y="669733"/>
+                  <a:ext cx="914400" cy="914400"/>
+                </a:xfrm>
+                <a:prstGeom prst="rect">
+                  <a:avLst/>
+                </a:prstGeom>
+              </p:spPr>
+            </p:pic>
+            <p:pic>
+              <p:nvPicPr>
+                <p:cNvPr id="34" name="Graphic 33" descr="Graduation cap">
+                  <a:extLst>
+                    <a:ext uri="{FF2B5EF4-FFF2-40B4-BE49-F238E27FC236}">
+                      <a16:creationId xmlns:a16="http://schemas.microsoft.com/office/drawing/2014/main" id="{22C573B1-DA24-07B6-6E5C-596469B07AC7}"/>
+                    </a:ext>
+                  </a:extLst>
+                </p:cNvPr>
+                <p:cNvPicPr>
+                  <a:picLocks noChangeAspect="1"/>
+                </p:cNvPicPr>
+                <p:nvPr/>
+              </p:nvPicPr>
+              <p:blipFill>
+                <a:blip r:embed="rId18">
+                  <a:extLst>
+                    <a:ext uri="{28A0092B-C50C-407E-A947-70E740481C1C}">
+                      <a14:useLocalDpi xmlns:a14="http://schemas.microsoft.com/office/drawing/2010/main" val="0"/>
+                    </a:ext>
+                    <a:ext uri="{96DAC541-7B7A-43D3-8B79-37D633B846F1}">
+                      <asvg:svgBlip xmlns:asvg="http://schemas.microsoft.com/office/drawing/2016/SVG/main" r:embed="rId19"/>
+                    </a:ext>
+                  </a:extLst>
+                </a:blip>
+                <a:stretch>
+                  <a:fillRect/>
+                </a:stretch>
+              </p:blipFill>
+              <p:spPr>
+                <a:xfrm>
+                  <a:off x="962130" y="179005"/>
+                  <a:ext cx="914400" cy="914400"/>
+                </a:xfrm>
+                <a:prstGeom prst="rect">
+                  <a:avLst/>
+                </a:prstGeom>
+              </p:spPr>
+            </p:pic>
+          </p:grpSp>
+          <p:pic>
+            <p:nvPicPr>
+              <p:cNvPr id="58" name="Graphic 57" descr="Baby crawling">
+                <a:extLst>
+                  <a:ext uri="{FF2B5EF4-FFF2-40B4-BE49-F238E27FC236}">
+                    <a16:creationId xmlns:a16="http://schemas.microsoft.com/office/drawing/2014/main" id="{CE8A0943-F23B-276D-43FC-7187A5F87617}"/>
+                  </a:ext>
+                </a:extLst>
+              </p:cNvPr>
+              <p:cNvPicPr>
+                <a:picLocks noChangeAspect="1"/>
+              </p:cNvPicPr>
+              <p:nvPr/>
+            </p:nvPicPr>
+            <p:blipFill>
+              <a:blip r:embed="rId20">
+                <a:extLst>
+                  <a:ext uri="{28A0092B-C50C-407E-A947-70E740481C1C}">
+                    <a14:useLocalDpi xmlns:a14="http://schemas.microsoft.com/office/drawing/2010/main" val="0"/>
+                  </a:ext>
+                  <a:ext uri="{96DAC541-7B7A-43D3-8B79-37D633B846F1}">
+                    <asvg:svgBlip xmlns:asvg="http://schemas.microsoft.com/office/drawing/2016/SVG/main" r:embed="rId21"/>
+                  </a:ext>
+                </a:extLst>
+              </a:blip>
+              <a:stretch>
+                <a:fillRect/>
+              </a:stretch>
+            </p:blipFill>
+            <p:spPr>
+              <a:xfrm rot="21440613">
+                <a:off x="1320414" y="837336"/>
+                <a:ext cx="708393" cy="708393"/>
+              </a:xfrm>
+              <a:prstGeom prst="rect">
+                <a:avLst/>
+              </a:prstGeom>
+            </p:spPr>
+          </p:pic>
+        </p:grpSp>
+        <p:sp>
+          <p:nvSpPr>
+            <p:cNvPr id="60" name="TextBox 59">
+              <a:extLst>
+                <a:ext uri="{FF2B5EF4-FFF2-40B4-BE49-F238E27FC236}">
+                  <a16:creationId xmlns:a16="http://schemas.microsoft.com/office/drawing/2014/main" id="{85DE82DB-603B-6227-18B8-0798996FDC4D}"/>
+                </a:ext>
+              </a:extLst>
+            </p:cNvPr>
+            <p:cNvSpPr txBox="1"/>
+            <p:nvPr/>
+          </p:nvSpPr>
+          <p:spPr>
+            <a:xfrm>
+              <a:off x="569474" y="1155812"/>
+              <a:ext cx="11237214" cy="584775"/>
+            </a:xfrm>
+            <a:prstGeom prst="rect">
+              <a:avLst/>
+            </a:prstGeom>
+            <a:noFill/>
+          </p:spPr>
+          <p:txBody>
+            <a:bodyPr wrap="square" rtlCol="0">
+              <a:spAutoFit/>
+            </a:bodyPr>
+            <a:lstStyle/>
+            <a:p>
+              <a:r>
+                <a:rPr lang="en-US" sz="1400" b="1" i="1" dirty="0">
+                  <a:solidFill>
+                    <a:schemeClr val="tx1">
+                      <a:lumMod val="65000"/>
+                      <a:lumOff val="35000"/>
+                    </a:schemeClr>
+                  </a:solidFill>
+                </a:rPr>
+                <a:t>	            </a:t>
+              </a:r>
+              <a:r>
+                <a:rPr lang="en-US" sz="1400" b="1" i="1" dirty="0">
+                  <a:solidFill>
+                    <a:schemeClr val="tx1">
+                      <a:lumMod val="65000"/>
+                      <a:lumOff val="35000"/>
+                    </a:schemeClr>
+                  </a:solidFill>
+                  <a:effectLst/>
+                </a:rPr>
+                <a:t>EDUCATION			  </a:t>
+              </a:r>
+              <a:r>
+                <a:rPr lang="en-US" b="1" i="1" dirty="0">
+                  <a:solidFill>
+                    <a:schemeClr val="accent6">
+                      <a:lumMod val="50000"/>
+                    </a:schemeClr>
+                  </a:solidFill>
+                  <a:effectLst/>
+                </a:rPr>
+                <a:t>WORKING STAGE</a:t>
+              </a:r>
+              <a:r>
+                <a:rPr lang="en-US" sz="1400" b="1" i="1" dirty="0">
+                  <a:solidFill>
+                    <a:schemeClr val="tx1">
+                      <a:lumMod val="65000"/>
+                      <a:lumOff val="35000"/>
+                    </a:schemeClr>
+                  </a:solidFill>
+                  <a:effectLst/>
+                </a:rPr>
+                <a:t>			       RETIREMENT</a:t>
+              </a:r>
+            </a:p>
+            <a:p>
+              <a:r>
+                <a:rPr lang="en-US" sz="1400" b="1" i="1" dirty="0">
+                  <a:solidFill>
+                    <a:schemeClr val="tx1">
+                      <a:lumMod val="65000"/>
+                      <a:lumOff val="35000"/>
+                    </a:schemeClr>
+                  </a:solidFill>
+                </a:rPr>
+                <a:t>	           </a:t>
+              </a:r>
+              <a:r>
+                <a:rPr lang="en-US" sz="1400" b="1" i="1" dirty="0">
+                  <a:solidFill>
+                    <a:srgbClr val="C00000"/>
+                  </a:solidFill>
+                </a:rPr>
+                <a:t> (no income)							        (no income)</a:t>
+              </a:r>
+              <a:endParaRPr lang="en-US" sz="1400" b="0" i="1" dirty="0">
+                <a:solidFill>
+                  <a:srgbClr val="C00000"/>
+                </a:solidFill>
+                <a:effectLst/>
+              </a:endParaRPr>
+            </a:p>
+          </p:txBody>
+        </p:sp>
+        <p:sp>
+          <p:nvSpPr>
+            <p:cNvPr id="61" name="TextBox 60">
+              <a:extLst>
+                <a:ext uri="{FF2B5EF4-FFF2-40B4-BE49-F238E27FC236}">
+                  <a16:creationId xmlns:a16="http://schemas.microsoft.com/office/drawing/2014/main" id="{DBB05038-6DBF-9AF0-5AD4-1C196BB3A3EB}"/>
+                </a:ext>
+              </a:extLst>
+            </p:cNvPr>
+            <p:cNvSpPr txBox="1"/>
+            <p:nvPr/>
+          </p:nvSpPr>
+          <p:spPr>
+            <a:xfrm>
+              <a:off x="1381126" y="633685"/>
+              <a:ext cx="461929" cy="584775"/>
+            </a:xfrm>
+            <a:prstGeom prst="rect">
+              <a:avLst/>
+            </a:prstGeom>
+            <a:noFill/>
+          </p:spPr>
+          <p:txBody>
+            <a:bodyPr wrap="square" rtlCol="0">
+              <a:spAutoFit/>
+            </a:bodyPr>
+            <a:lstStyle/>
+            <a:p>
+              <a:r>
+                <a:rPr lang="en-US" sz="3200" b="1" dirty="0">
+                  <a:solidFill>
+                    <a:schemeClr val="tx1">
+                      <a:lumMod val="65000"/>
+                      <a:lumOff val="35000"/>
+                    </a:schemeClr>
+                  </a:solidFill>
+                </a:rPr>
+                <a:t>0</a:t>
+              </a:r>
+              <a:endParaRPr lang="en-PH" sz="3200" b="1" dirty="0">
+                <a:solidFill>
+                  <a:schemeClr val="tx1">
+                    <a:lumMod val="65000"/>
+                    <a:lumOff val="35000"/>
+                  </a:schemeClr>
+                </a:solidFill>
+              </a:endParaRPr>
+            </a:p>
+          </p:txBody>
+        </p:sp>
+        <p:sp>
+          <p:nvSpPr>
+            <p:cNvPr id="62" name="TextBox 61">
+              <a:extLst>
+                <a:ext uri="{FF2B5EF4-FFF2-40B4-BE49-F238E27FC236}">
+                  <a16:creationId xmlns:a16="http://schemas.microsoft.com/office/drawing/2014/main" id="{786A2140-4326-FF7A-6942-09F9F4FA68D1}"/>
+                </a:ext>
+              </a:extLst>
+            </p:cNvPr>
+            <p:cNvSpPr txBox="1"/>
+            <p:nvPr/>
+          </p:nvSpPr>
+          <p:spPr>
+            <a:xfrm>
+              <a:off x="3048030" y="633600"/>
+              <a:ext cx="599416" cy="584775"/>
+            </a:xfrm>
+            <a:prstGeom prst="rect">
+              <a:avLst/>
+            </a:prstGeom>
+            <a:noFill/>
+          </p:spPr>
+          <p:txBody>
+            <a:bodyPr wrap="square" rtlCol="0">
+              <a:spAutoFit/>
+            </a:bodyPr>
+            <a:lstStyle/>
+            <a:p>
+              <a:r>
+                <a:rPr lang="en-US" sz="3200" b="1" dirty="0">
+                  <a:solidFill>
+                    <a:schemeClr val="tx1">
+                      <a:lumMod val="65000"/>
+                      <a:lumOff val="35000"/>
+                    </a:schemeClr>
+                  </a:solidFill>
+                </a:rPr>
+                <a:t>20</a:t>
+              </a:r>
+              <a:endParaRPr lang="en-PH" sz="3200" b="1" dirty="0">
+                <a:solidFill>
+                  <a:schemeClr val="tx1">
+                    <a:lumMod val="65000"/>
+                    <a:lumOff val="35000"/>
+                  </a:schemeClr>
+                </a:solidFill>
+              </a:endParaRPr>
+            </a:p>
+          </p:txBody>
+        </p:sp>
+        <p:sp>
+          <p:nvSpPr>
+            <p:cNvPr id="63" name="TextBox 62">
+              <a:extLst>
+                <a:ext uri="{FF2B5EF4-FFF2-40B4-BE49-F238E27FC236}">
+                  <a16:creationId xmlns:a16="http://schemas.microsoft.com/office/drawing/2014/main" id="{E3354032-9571-8CA1-6755-DADBE53C4C25}"/>
+                </a:ext>
+              </a:extLst>
+            </p:cNvPr>
+            <p:cNvSpPr txBox="1"/>
+            <p:nvPr/>
+          </p:nvSpPr>
+          <p:spPr>
+            <a:xfrm>
+              <a:off x="8565780" y="643087"/>
+              <a:ext cx="601685" cy="584775"/>
+            </a:xfrm>
+            <a:prstGeom prst="rect">
+              <a:avLst/>
+            </a:prstGeom>
+            <a:noFill/>
+          </p:spPr>
+          <p:txBody>
+            <a:bodyPr wrap="square" rtlCol="0">
+              <a:spAutoFit/>
+            </a:bodyPr>
+            <a:lstStyle/>
+            <a:p>
+              <a:r>
+                <a:rPr lang="en-US" sz="3200" b="1" dirty="0">
+                  <a:solidFill>
+                    <a:schemeClr val="tx1">
+                      <a:lumMod val="65000"/>
+                      <a:lumOff val="35000"/>
+                    </a:schemeClr>
+                  </a:solidFill>
+                </a:rPr>
+                <a:t>60</a:t>
+              </a:r>
+              <a:endParaRPr lang="en-PH" sz="3200" b="1" dirty="0">
+                <a:solidFill>
+                  <a:schemeClr val="tx1">
+                    <a:lumMod val="65000"/>
+                    <a:lumOff val="35000"/>
+                  </a:schemeClr>
+                </a:solidFill>
+              </a:endParaRPr>
+            </a:p>
+          </p:txBody>
+        </p:sp>
+        <p:sp>
+          <p:nvSpPr>
+            <p:cNvPr id="66" name="TextBox 65">
+              <a:extLst>
+                <a:ext uri="{FF2B5EF4-FFF2-40B4-BE49-F238E27FC236}">
+                  <a16:creationId xmlns:a16="http://schemas.microsoft.com/office/drawing/2014/main" id="{73EB994D-99F7-8A1B-A79A-1BD6471287A5}"/>
+                </a:ext>
+              </a:extLst>
+            </p:cNvPr>
+            <p:cNvSpPr txBox="1"/>
+            <p:nvPr/>
+          </p:nvSpPr>
+          <p:spPr>
+            <a:xfrm>
+              <a:off x="10061569" y="643086"/>
+              <a:ext cx="841399" cy="584775"/>
+            </a:xfrm>
+            <a:prstGeom prst="rect">
+              <a:avLst/>
+            </a:prstGeom>
+            <a:noFill/>
+          </p:spPr>
+          <p:txBody>
+            <a:bodyPr wrap="square" rtlCol="0">
+              <a:spAutoFit/>
+            </a:bodyPr>
+            <a:lstStyle/>
+            <a:p>
+              <a:r>
+                <a:rPr lang="en-US" sz="3200" b="1" dirty="0">
+                  <a:solidFill>
+                    <a:schemeClr val="tx1">
+                      <a:lumMod val="65000"/>
+                      <a:lumOff val="35000"/>
+                    </a:schemeClr>
+                  </a:solidFill>
+                </a:rPr>
+                <a:t>100</a:t>
+              </a:r>
+              <a:endParaRPr lang="en-PH" sz="3200" b="1" dirty="0">
+                <a:solidFill>
+                  <a:schemeClr val="tx1">
+                    <a:lumMod val="65000"/>
+                    <a:lumOff val="35000"/>
+                  </a:schemeClr>
+                </a:solidFill>
+              </a:endParaRPr>
+            </a:p>
+          </p:txBody>
+        </p:sp>
+      </p:grpSp>
+      <p:grpSp>
+        <p:nvGrpSpPr>
+          <p:cNvPr id="80" name="Group 79">
+            <a:extLst>
+              <a:ext uri="{FF2B5EF4-FFF2-40B4-BE49-F238E27FC236}">
+                <a16:creationId xmlns:a16="http://schemas.microsoft.com/office/drawing/2014/main" id="{EE4AA5E3-0369-4E86-0F28-FFCC0A053BE8}"/>
+              </a:ext>
+            </a:extLst>
+          </p:cNvPr>
+          <p:cNvGrpSpPr/>
+          <p:nvPr/>
+        </p:nvGrpSpPr>
+        <p:grpSpPr>
+          <a:xfrm>
+            <a:off x="332204" y="3008711"/>
+            <a:ext cx="11234928" cy="2017776"/>
+            <a:chOff x="332204" y="3008711"/>
+            <a:chExt cx="11234928" cy="2017776"/>
+          </a:xfrm>
+        </p:grpSpPr>
+        <p:grpSp>
+          <p:nvGrpSpPr>
+            <p:cNvPr id="75" name="Group 74">
+              <a:extLst>
+                <a:ext uri="{FF2B5EF4-FFF2-40B4-BE49-F238E27FC236}">
+                  <a16:creationId xmlns:a16="http://schemas.microsoft.com/office/drawing/2014/main" id="{1AC56FFE-0E44-ACAA-2F09-9CB36B2822AC}"/>
+                </a:ext>
+              </a:extLst>
+            </p:cNvPr>
+            <p:cNvGrpSpPr/>
+            <p:nvPr/>
+          </p:nvGrpSpPr>
+          <p:grpSpPr>
+            <a:xfrm>
+              <a:off x="332204" y="3008711"/>
+              <a:ext cx="11234928" cy="2017776"/>
+              <a:chOff x="332204" y="3008711"/>
+              <a:chExt cx="11234928" cy="2017776"/>
+            </a:xfrm>
+          </p:grpSpPr>
+          <p:grpSp>
+            <p:nvGrpSpPr>
+              <p:cNvPr id="68" name="Group 67">
+                <a:extLst>
+                  <a:ext uri="{FF2B5EF4-FFF2-40B4-BE49-F238E27FC236}">
+                    <a16:creationId xmlns:a16="http://schemas.microsoft.com/office/drawing/2014/main" id="{37F85369-EC0C-BFBB-E697-2645F6897737}"/>
+                  </a:ext>
+                </a:extLst>
+              </p:cNvPr>
+              <p:cNvGrpSpPr/>
+              <p:nvPr/>
+            </p:nvGrpSpPr>
+            <p:grpSpPr>
+              <a:xfrm>
+                <a:off x="332204" y="3008711"/>
+                <a:ext cx="11234928" cy="2017776"/>
+                <a:chOff x="302133" y="3184884"/>
+                <a:chExt cx="11234928" cy="2017776"/>
+              </a:xfrm>
+            </p:grpSpPr>
+            <p:pic>
+              <p:nvPicPr>
+                <p:cNvPr id="44" name="Picture 43">
+                  <a:extLst>
+                    <a:ext uri="{FF2B5EF4-FFF2-40B4-BE49-F238E27FC236}">
+                      <a16:creationId xmlns:a16="http://schemas.microsoft.com/office/drawing/2014/main" id="{BEAB5C5C-D88A-F81B-B11A-016EF7831D55}"/>
+                    </a:ext>
+                  </a:extLst>
+                </p:cNvPr>
+                <p:cNvPicPr>
+                  <a:picLocks noChangeAspect="1"/>
+                </p:cNvPicPr>
+                <p:nvPr/>
+              </p:nvPicPr>
+              <p:blipFill>
+                <a:blip r:embed="rId22">
+                  <a:extLst>
+                    <a:ext uri="{28A0092B-C50C-407E-A947-70E740481C1C}">
+                      <a14:useLocalDpi xmlns:a14="http://schemas.microsoft.com/office/drawing/2010/main" val="0"/>
+                    </a:ext>
+                  </a:extLst>
+                </a:blip>
+                <a:stretch>
+                  <a:fillRect/>
+                </a:stretch>
+              </p:blipFill>
+              <p:spPr>
+                <a:xfrm>
+                  <a:off x="302133" y="3184884"/>
+                  <a:ext cx="11234928" cy="2017776"/>
+                </a:xfrm>
+                <a:prstGeom prst="rect">
+                  <a:avLst/>
+                </a:prstGeom>
+              </p:spPr>
+            </p:pic>
+            <p:sp>
+              <p:nvSpPr>
+                <p:cNvPr id="45" name="Rectangle 44">
+                  <a:extLst>
+                    <a:ext uri="{FF2B5EF4-FFF2-40B4-BE49-F238E27FC236}">
+                      <a16:creationId xmlns:a16="http://schemas.microsoft.com/office/drawing/2014/main" id="{194AE3F0-18DC-2F33-3074-BAEDF2EE3988}"/>
+                    </a:ext>
+                  </a:extLst>
+                </p:cNvPr>
+                <p:cNvSpPr/>
+                <p:nvPr/>
+              </p:nvSpPr>
+              <p:spPr>
+                <a:xfrm>
+                  <a:off x="1158240" y="3342319"/>
+                  <a:ext cx="8676640" cy="1498438"/>
+                </a:xfrm>
+                <a:prstGeom prst="rect">
+                  <a:avLst/>
+                </a:prstGeom>
+                <a:solidFill>
+                  <a:schemeClr val="bg1"/>
+                </a:solidFill>
+                <a:ln>
+                  <a:solidFill>
+                    <a:schemeClr val="bg1"/>
+                  </a:solidFill>
+                </a:ln>
+              </p:spPr>
+              <p:style>
+                <a:lnRef idx="2">
+                  <a:schemeClr val="accent1">
+                    <a:shade val="50000"/>
+                  </a:schemeClr>
+                </a:lnRef>
+                <a:fillRef idx="1">
+                  <a:schemeClr val="accent1"/>
+                </a:fillRef>
+                <a:effectRef idx="0">
+                  <a:schemeClr val="accent1"/>
+                </a:effectRef>
+                <a:fontRef idx="minor">
+                  <a:schemeClr val="lt1"/>
+                </a:fontRef>
+              </p:style>
+              <p:txBody>
+                <a:bodyPr rtlCol="0" anchor="ctr"/>
+                <a:lstStyle/>
+                <a:p>
+                  <a:pPr algn="ctr"/>
+                  <a:endParaRPr lang="en-PH"/>
+                </a:p>
+              </p:txBody>
+            </p:sp>
+          </p:grpSp>
+          <p:sp>
+            <p:nvSpPr>
+              <p:cNvPr id="74" name="TextBox 73">
+                <a:extLst>
+                  <a:ext uri="{FF2B5EF4-FFF2-40B4-BE49-F238E27FC236}">
+                    <a16:creationId xmlns:a16="http://schemas.microsoft.com/office/drawing/2014/main" id="{0F385419-8445-4148-EBC0-46222A220333}"/>
+                  </a:ext>
+                </a:extLst>
+              </p:cNvPr>
+              <p:cNvSpPr txBox="1"/>
+              <p:nvPr/>
+            </p:nvSpPr>
+            <p:spPr>
+              <a:xfrm>
+                <a:off x="332204" y="3308384"/>
+                <a:ext cx="11234928" cy="1200329"/>
+              </a:xfrm>
+              <a:prstGeom prst="rect">
+                <a:avLst/>
+              </a:prstGeom>
+              <a:noFill/>
+            </p:spPr>
+            <p:txBody>
+              <a:bodyPr wrap="square" rtlCol="0">
+                <a:spAutoFit/>
+              </a:bodyPr>
+              <a:lstStyle/>
+              <a:p>
+                <a:pPr algn="ctr"/>
+                <a:r>
+                  <a:rPr lang="en-US" sz="2000" b="1" i="1" dirty="0">
+                    <a:solidFill>
+                      <a:schemeClr val="accent6">
+                        <a:lumMod val="50000"/>
+                      </a:schemeClr>
+                    </a:solidFill>
+                    <a:effectLst/>
+                  </a:rPr>
+                  <a:t>In GOAL SETTING</a:t>
+                </a:r>
+                <a:r>
+                  <a:rPr lang="en-US" sz="2000" b="1" i="1" dirty="0">
+                    <a:solidFill>
+                      <a:schemeClr val="tx1">
+                        <a:lumMod val="65000"/>
+                        <a:lumOff val="35000"/>
+                      </a:schemeClr>
+                    </a:solidFill>
+                    <a:effectLst/>
+                  </a:rPr>
+                  <a:t>, </a:t>
+                </a:r>
+              </a:p>
+              <a:p>
+                <a:pPr algn="ctr"/>
+                <a:r>
+                  <a:rPr lang="en-US" sz="2000" b="1" i="1" dirty="0">
+                    <a:solidFill>
+                      <a:schemeClr val="tx1">
+                        <a:lumMod val="65000"/>
+                        <a:lumOff val="35000"/>
+                      </a:schemeClr>
+                    </a:solidFill>
+                    <a:effectLst/>
+                  </a:rPr>
+                  <a:t>be</a:t>
+                </a:r>
+                <a:endParaRPr lang="en-US" sz="2000" b="1" i="1" dirty="0">
+                  <a:solidFill>
+                    <a:schemeClr val="tx1">
+                      <a:lumMod val="65000"/>
+                      <a:lumOff val="35000"/>
+                    </a:schemeClr>
+                  </a:solidFill>
+                </a:endParaRPr>
+              </a:p>
+              <a:p>
+                <a:pPr algn="ctr"/>
+                <a:r>
+                  <a:rPr lang="en-US" sz="3200" b="1" dirty="0">
+                    <a:solidFill>
+                      <a:srgbClr val="002060"/>
+                    </a:solidFill>
+                  </a:rPr>
+                  <a:t>S</a:t>
+                </a:r>
+                <a:r>
+                  <a:rPr lang="en-US" sz="2000" b="1" i="1" dirty="0">
+                    <a:solidFill>
+                      <a:srgbClr val="002060"/>
+                    </a:solidFill>
+                  </a:rPr>
+                  <a:t>pecific</a:t>
+                </a:r>
+                <a:r>
+                  <a:rPr lang="en-US" sz="2000" b="1" dirty="0">
+                    <a:solidFill>
+                      <a:srgbClr val="002060"/>
+                    </a:solidFill>
+                  </a:rPr>
+                  <a:t> | </a:t>
+                </a:r>
+                <a:r>
+                  <a:rPr lang="en-US" sz="3200" b="1" dirty="0">
+                    <a:solidFill>
+                      <a:srgbClr val="002060"/>
+                    </a:solidFill>
+                  </a:rPr>
+                  <a:t>M</a:t>
+                </a:r>
+                <a:r>
+                  <a:rPr lang="en-US" sz="2000" b="1" i="1" dirty="0">
+                    <a:solidFill>
+                      <a:srgbClr val="002060"/>
+                    </a:solidFill>
+                  </a:rPr>
+                  <a:t>easurable</a:t>
+                </a:r>
+                <a:r>
+                  <a:rPr lang="en-US" sz="2000" b="1" dirty="0">
+                    <a:solidFill>
+                      <a:srgbClr val="002060"/>
+                    </a:solidFill>
+                  </a:rPr>
+                  <a:t> | </a:t>
+                </a:r>
+                <a:r>
+                  <a:rPr lang="en-US" sz="3200" b="1" dirty="0">
+                    <a:solidFill>
+                      <a:srgbClr val="002060"/>
+                    </a:solidFill>
+                  </a:rPr>
+                  <a:t>A</a:t>
+                </a:r>
+                <a:r>
+                  <a:rPr lang="en-US" sz="2000" b="1" i="1" dirty="0">
+                    <a:solidFill>
+                      <a:srgbClr val="002060"/>
+                    </a:solidFill>
+                  </a:rPr>
+                  <a:t>ttainable </a:t>
+                </a:r>
+                <a:r>
+                  <a:rPr lang="en-US" sz="2000" b="1" dirty="0">
+                    <a:solidFill>
+                      <a:srgbClr val="002060"/>
+                    </a:solidFill>
+                  </a:rPr>
+                  <a:t>| </a:t>
+                </a:r>
+                <a:r>
+                  <a:rPr lang="en-US" sz="3200" b="1" dirty="0">
+                    <a:solidFill>
+                      <a:srgbClr val="002060"/>
+                    </a:solidFill>
+                  </a:rPr>
+                  <a:t>R</a:t>
+                </a:r>
+                <a:r>
+                  <a:rPr lang="en-US" sz="2000" b="1" i="1" dirty="0">
+                    <a:solidFill>
+                      <a:srgbClr val="002060"/>
+                    </a:solidFill>
+                  </a:rPr>
+                  <a:t>ealistic </a:t>
+                </a:r>
+                <a:r>
+                  <a:rPr lang="en-US" sz="2000" b="1" dirty="0">
+                    <a:solidFill>
+                      <a:srgbClr val="002060"/>
+                    </a:solidFill>
+                  </a:rPr>
+                  <a:t>| </a:t>
+                </a:r>
+                <a:r>
+                  <a:rPr lang="en-US" sz="3200" b="1" dirty="0">
+                    <a:solidFill>
+                      <a:srgbClr val="002060"/>
+                    </a:solidFill>
+                  </a:rPr>
+                  <a:t>T</a:t>
+                </a:r>
+                <a:r>
+                  <a:rPr lang="en-US" sz="2000" b="1" i="1" dirty="0">
+                    <a:solidFill>
+                      <a:srgbClr val="002060"/>
+                    </a:solidFill>
+                  </a:rPr>
+                  <a:t>ime-bounded</a:t>
+                </a:r>
+                <a:endParaRPr lang="en-US" sz="2000" b="0" i="1" dirty="0">
+                  <a:solidFill>
+                    <a:srgbClr val="002060"/>
+                  </a:solidFill>
+                  <a:effectLst/>
+                </a:endParaRPr>
+              </a:p>
+            </p:txBody>
+          </p:sp>
+        </p:grpSp>
+        <p:pic>
+          <p:nvPicPr>
+            <p:cNvPr id="77" name="Graphic 76" descr="Run">
+              <a:extLst>
+                <a:ext uri="{FF2B5EF4-FFF2-40B4-BE49-F238E27FC236}">
+                  <a16:creationId xmlns:a16="http://schemas.microsoft.com/office/drawing/2014/main" id="{60029FD9-737C-AE5E-DBD0-D63E71F9927C}"/>
+                </a:ext>
+              </a:extLst>
+            </p:cNvPr>
+            <p:cNvPicPr>
+              <a:picLocks noChangeAspect="1"/>
+            </p:cNvPicPr>
+            <p:nvPr/>
+          </p:nvPicPr>
+          <p:blipFill>
+            <a:blip r:embed="rId23">
+              <a:extLst>
+                <a:ext uri="{28A0092B-C50C-407E-A947-70E740481C1C}">
+                  <a14:useLocalDpi xmlns:a14="http://schemas.microsoft.com/office/drawing/2010/main" val="0"/>
+                </a:ext>
+                <a:ext uri="{96DAC541-7B7A-43D3-8B79-37D633B846F1}">
+                  <asvg:svgBlip xmlns:asvg="http://schemas.microsoft.com/office/drawing/2016/SVG/main" r:embed="rId24"/>
+                </a:ext>
+              </a:extLst>
+            </a:blip>
+            <a:stretch>
+              <a:fillRect/>
+            </a:stretch>
+          </p:blipFill>
+          <p:spPr>
+            <a:xfrm>
+              <a:off x="1937920" y="4012490"/>
+              <a:ext cx="389129" cy="389129"/>
+            </a:xfrm>
+            <a:prstGeom prst="rect">
+              <a:avLst/>
+            </a:prstGeom>
+          </p:spPr>
+        </p:pic>
+        <p:pic>
+          <p:nvPicPr>
+            <p:cNvPr id="79" name="Graphic 78" descr="Flag">
+              <a:extLst>
+                <a:ext uri="{FF2B5EF4-FFF2-40B4-BE49-F238E27FC236}">
+                  <a16:creationId xmlns:a16="http://schemas.microsoft.com/office/drawing/2014/main" id="{4C712D11-F68B-9B08-62D6-E72A13145CF0}"/>
+                </a:ext>
+              </a:extLst>
+            </p:cNvPr>
+            <p:cNvPicPr>
+              <a:picLocks noChangeAspect="1"/>
+            </p:cNvPicPr>
+            <p:nvPr/>
+          </p:nvPicPr>
+          <p:blipFill>
+            <a:blip r:embed="rId25">
+              <a:extLst>
+                <a:ext uri="{28A0092B-C50C-407E-A947-70E740481C1C}">
+                  <a14:useLocalDpi xmlns:a14="http://schemas.microsoft.com/office/drawing/2010/main" val="0"/>
+                </a:ext>
+                <a:ext uri="{96DAC541-7B7A-43D3-8B79-37D633B846F1}">
+                  <asvg:svgBlip xmlns:asvg="http://schemas.microsoft.com/office/drawing/2016/SVG/main" r:embed="rId26"/>
+                </a:ext>
+              </a:extLst>
+            </a:blip>
+            <a:stretch>
+              <a:fillRect/>
+            </a:stretch>
+          </p:blipFill>
+          <p:spPr>
+            <a:xfrm>
+              <a:off x="9535255" y="4012489"/>
+              <a:ext cx="389129" cy="389129"/>
+            </a:xfrm>
+            <a:prstGeom prst="rect">
+              <a:avLst/>
+            </a:prstGeom>
+          </p:spPr>
+        </p:pic>
+      </p:grpSp>
+    </p:spTree>
+    <p:extLst>
+      <p:ext uri="{BB962C8B-B14F-4D97-AF65-F5344CB8AC3E}">
+        <p14:creationId xmlns:p14="http://schemas.microsoft.com/office/powerpoint/2010/main" val="900757665"/>
+      </p:ext>
+    </p:extLst>
+  </p:cSld>
+  <p:clrMapOvr>
+    <a:masterClrMapping/>
+  </p:clrMapOvr>
+</p:sld>
+</file>
+
+<file path=ppt/slides/slide3.xml><?xml version="1.0" encoding="utf-8"?>
+<p:sld xmlns:a="http://schemas.openxmlformats.org/drawingml/2006/main" xmlns:r="http://schemas.openxmlformats.org/officeDocument/2006/relationships" xmlns:p="http://schemas.openxmlformats.org/presentationml/2006/main">
+  <p:cSld>
+    <p:spTree>
+      <p:nvGrpSpPr>
+        <p:cNvPr id="1" name=""/>
+        <p:cNvGrpSpPr/>
+        <p:nvPr/>
+      </p:nvGrpSpPr>
+      <p:grpSpPr>
+        <a:xfrm>
+          <a:off x="0" y="0"/>
+          <a:ext cx="0" cy="0"/>
+          <a:chOff x="0" y="0"/>
+          <a:chExt cx="0" cy="0"/>
+        </a:xfrm>
+      </p:grpSpPr>
+      <p:pic>
+        <p:nvPicPr>
+          <p:cNvPr id="48" name="Graphic 47" descr="Lightbulb">
+            <a:extLst>
+              <a:ext uri="{FF2B5EF4-FFF2-40B4-BE49-F238E27FC236}">
+                <a16:creationId xmlns:a16="http://schemas.microsoft.com/office/drawing/2014/main" id="{9960A429-2085-71B2-AC9B-A756F94E851B}"/>
+              </a:ext>
+            </a:extLst>
+          </p:cNvPr>
+          <p:cNvPicPr>
+            <a:picLocks noChangeAspect="1"/>
+          </p:cNvPicPr>
+          <p:nvPr/>
+        </p:nvPicPr>
+        <p:blipFill>
+          <a:blip r:embed="rId2">
+            <a:extLst>
+              <a:ext uri="{28A0092B-C50C-407E-A947-70E740481C1C}">
+                <a14:useLocalDpi xmlns:a14="http://schemas.microsoft.com/office/drawing/2010/main" val="0"/>
+              </a:ext>
+              <a:ext uri="{96DAC541-7B7A-43D3-8B79-37D633B846F1}">
+                <asvg:svgBlip xmlns:asvg="http://schemas.microsoft.com/office/drawing/2016/SVG/main" r:embed="rId3"/>
+              </a:ext>
+            </a:extLst>
+          </a:blip>
+          <a:stretch>
+            <a:fillRect/>
+          </a:stretch>
+        </p:blipFill>
+        <p:spPr>
+          <a:xfrm>
+            <a:off x="13730160" y="293399"/>
+            <a:ext cx="914400" cy="914400"/>
+          </a:xfrm>
+          <a:prstGeom prst="rect">
+            <a:avLst/>
+          </a:prstGeom>
+        </p:spPr>
+      </p:pic>
+      <p:pic>
+        <p:nvPicPr>
+          <p:cNvPr id="50" name="Graphic 49" descr="Bar chart RTL">
+            <a:extLst>
+              <a:ext uri="{FF2B5EF4-FFF2-40B4-BE49-F238E27FC236}">
+                <a16:creationId xmlns:a16="http://schemas.microsoft.com/office/drawing/2014/main" id="{930A53EC-5EBE-86E9-AFC5-6F1741EE1A72}"/>
+              </a:ext>
+            </a:extLst>
+          </p:cNvPr>
+          <p:cNvPicPr>
+            <a:picLocks noChangeAspect="1"/>
+          </p:cNvPicPr>
+          <p:nvPr/>
+        </p:nvPicPr>
+        <p:blipFill>
+          <a:blip r:embed="rId4">
+            <a:extLst>
+              <a:ext uri="{28A0092B-C50C-407E-A947-70E740481C1C}">
+                <a14:useLocalDpi xmlns:a14="http://schemas.microsoft.com/office/drawing/2010/main" val="0"/>
+              </a:ext>
+              <a:ext uri="{96DAC541-7B7A-43D3-8B79-37D633B846F1}">
+                <asvg:svgBlip xmlns:asvg="http://schemas.microsoft.com/office/drawing/2016/SVG/main" r:embed="rId5"/>
+              </a:ext>
+            </a:extLst>
+          </a:blip>
+          <a:stretch>
+            <a:fillRect/>
+          </a:stretch>
+        </p:blipFill>
+        <p:spPr>
+          <a:xfrm>
+            <a:off x="12838366" y="3151682"/>
+            <a:ext cx="1198880" cy="1198880"/>
+          </a:xfrm>
+          <a:prstGeom prst="rect">
+            <a:avLst/>
+          </a:prstGeom>
+        </p:spPr>
+      </p:pic>
+      <p:pic>
+        <p:nvPicPr>
+          <p:cNvPr id="52" name="Graphic 51" descr="Man changing baby">
+            <a:extLst>
+              <a:ext uri="{FF2B5EF4-FFF2-40B4-BE49-F238E27FC236}">
+                <a16:creationId xmlns:a16="http://schemas.microsoft.com/office/drawing/2014/main" id="{1782260A-73F5-3526-70E9-7BC73513DA77}"/>
+              </a:ext>
+            </a:extLst>
+          </p:cNvPr>
+          <p:cNvPicPr>
+            <a:picLocks noChangeAspect="1"/>
+          </p:cNvPicPr>
+          <p:nvPr/>
+        </p:nvPicPr>
+        <p:blipFill>
+          <a:blip r:embed="rId6">
+            <a:extLst>
+              <a:ext uri="{28A0092B-C50C-407E-A947-70E740481C1C}">
+                <a14:useLocalDpi xmlns:a14="http://schemas.microsoft.com/office/drawing/2010/main" val="0"/>
+              </a:ext>
+              <a:ext uri="{96DAC541-7B7A-43D3-8B79-37D633B846F1}">
+                <asvg:svgBlip xmlns:asvg="http://schemas.microsoft.com/office/drawing/2016/SVG/main" r:embed="rId7"/>
+              </a:ext>
+            </a:extLst>
+          </a:blip>
+          <a:stretch>
+            <a:fillRect/>
+          </a:stretch>
+        </p:blipFill>
+        <p:spPr>
+          <a:xfrm>
+            <a:off x="12838366" y="1230163"/>
+            <a:ext cx="914400" cy="914400"/>
+          </a:xfrm>
+          <a:prstGeom prst="rect">
+            <a:avLst/>
+          </a:prstGeom>
+        </p:spPr>
+      </p:pic>
+      <p:pic>
+        <p:nvPicPr>
+          <p:cNvPr id="54" name="Graphic 53" descr="Pie chart">
+            <a:extLst>
+              <a:ext uri="{FF2B5EF4-FFF2-40B4-BE49-F238E27FC236}">
+                <a16:creationId xmlns:a16="http://schemas.microsoft.com/office/drawing/2014/main" id="{A8680BD8-AEF2-8082-5237-CFF2A6C35B5F}"/>
+              </a:ext>
+            </a:extLst>
+          </p:cNvPr>
+          <p:cNvPicPr>
+            <a:picLocks noChangeAspect="1"/>
+          </p:cNvPicPr>
+          <p:nvPr/>
+        </p:nvPicPr>
+        <p:blipFill>
+          <a:blip r:embed="rId8">
+            <a:extLst>
+              <a:ext uri="{28A0092B-C50C-407E-A947-70E740481C1C}">
+                <a14:useLocalDpi xmlns:a14="http://schemas.microsoft.com/office/drawing/2010/main" val="0"/>
+              </a:ext>
+              <a:ext uri="{96DAC541-7B7A-43D3-8B79-37D633B846F1}">
+                <asvg:svgBlip xmlns:asvg="http://schemas.microsoft.com/office/drawing/2016/SVG/main" r:embed="rId9"/>
+              </a:ext>
+            </a:extLst>
+          </a:blip>
+          <a:stretch>
+            <a:fillRect/>
+          </a:stretch>
+        </p:blipFill>
+        <p:spPr>
+          <a:xfrm>
+            <a:off x="12097813" y="2069228"/>
+            <a:ext cx="1082454" cy="1082454"/>
+          </a:xfrm>
+          <a:prstGeom prst="rect">
+            <a:avLst/>
+          </a:prstGeom>
+        </p:spPr>
+      </p:pic>
+      <p:grpSp>
+        <p:nvGrpSpPr>
+          <p:cNvPr id="73" name="Group 72">
+            <a:extLst>
+              <a:ext uri="{FF2B5EF4-FFF2-40B4-BE49-F238E27FC236}">
+                <a16:creationId xmlns:a16="http://schemas.microsoft.com/office/drawing/2014/main" id="{3E5B5ADC-CFAE-5F45-70EB-A6BDB89AE105}"/>
+              </a:ext>
+            </a:extLst>
+          </p:cNvPr>
+          <p:cNvGrpSpPr/>
+          <p:nvPr/>
+        </p:nvGrpSpPr>
+        <p:grpSpPr>
+          <a:xfrm>
+            <a:off x="476250" y="-8216"/>
+            <a:ext cx="11330438" cy="2123444"/>
+            <a:chOff x="476250" y="-8216"/>
+            <a:chExt cx="11330438" cy="2017951"/>
+          </a:xfrm>
+        </p:grpSpPr>
+        <p:pic>
+          <p:nvPicPr>
+            <p:cNvPr id="72" name="Picture 71">
+              <a:extLst>
+                <a:ext uri="{FF2B5EF4-FFF2-40B4-BE49-F238E27FC236}">
+                  <a16:creationId xmlns:a16="http://schemas.microsoft.com/office/drawing/2014/main" id="{2FCEE5F4-77E2-27C4-6462-898FDE47A0C3}"/>
+                </a:ext>
+              </a:extLst>
+            </p:cNvPr>
+            <p:cNvPicPr>
+              <a:picLocks noChangeAspect="1"/>
+            </p:cNvPicPr>
+            <p:nvPr/>
+          </p:nvPicPr>
+          <p:blipFill>
+            <a:blip r:embed="rId10"/>
+            <a:stretch>
+              <a:fillRect/>
+            </a:stretch>
+          </p:blipFill>
+          <p:spPr>
+            <a:xfrm>
+              <a:off x="508529" y="-8216"/>
+              <a:ext cx="11235902" cy="2017951"/>
+            </a:xfrm>
+            <a:prstGeom prst="rect">
+              <a:avLst/>
+            </a:prstGeom>
+          </p:spPr>
+        </p:pic>
+        <p:sp>
+          <p:nvSpPr>
+            <p:cNvPr id="4" name="TextBox 3">
+              <a:extLst>
+                <a:ext uri="{FF2B5EF4-FFF2-40B4-BE49-F238E27FC236}">
+                  <a16:creationId xmlns:a16="http://schemas.microsoft.com/office/drawing/2014/main" id="{55293C82-9B5F-DC86-5006-7253D2B111DF}"/>
+                </a:ext>
+              </a:extLst>
+            </p:cNvPr>
+            <p:cNvSpPr txBox="1"/>
+            <p:nvPr/>
+          </p:nvSpPr>
+          <p:spPr>
+            <a:xfrm>
+              <a:off x="476250" y="100749"/>
+              <a:ext cx="11237214" cy="400110"/>
+            </a:xfrm>
+            <a:prstGeom prst="rect">
+              <a:avLst/>
+            </a:prstGeom>
+            <a:noFill/>
+          </p:spPr>
+          <p:txBody>
+            <a:bodyPr wrap="square" rtlCol="0">
+              <a:spAutoFit/>
+            </a:bodyPr>
+            <a:lstStyle/>
+            <a:p>
+              <a:pPr algn="ctr"/>
+              <a:r>
+                <a:rPr lang="en-US" sz="2000" b="1" i="1" dirty="0">
+                  <a:solidFill>
+                    <a:schemeClr val="tx1">
+                      <a:lumMod val="65000"/>
+                      <a:lumOff val="35000"/>
+                    </a:schemeClr>
+                  </a:solidFill>
+                  <a:effectLst/>
+                </a:rPr>
+                <a:t>3 MAJOR STAGES OF LIFE</a:t>
+              </a:r>
+              <a:endParaRPr lang="en-US" sz="2000" b="0" i="1" dirty="0">
+                <a:solidFill>
+                  <a:schemeClr val="tx1">
+                    <a:lumMod val="65000"/>
+                    <a:lumOff val="35000"/>
+                  </a:schemeClr>
+                </a:solidFill>
+                <a:effectLst/>
+              </a:endParaRPr>
+            </a:p>
+          </p:txBody>
+        </p:sp>
+        <p:grpSp>
+          <p:nvGrpSpPr>
+            <p:cNvPr id="42" name="Group 41">
+              <a:extLst>
+                <a:ext uri="{FF2B5EF4-FFF2-40B4-BE49-F238E27FC236}">
+                  <a16:creationId xmlns:a16="http://schemas.microsoft.com/office/drawing/2014/main" id="{C7E56B02-81A6-FF26-3EE7-63AE9723E2A4}"/>
+                </a:ext>
+              </a:extLst>
+            </p:cNvPr>
+            <p:cNvGrpSpPr/>
+            <p:nvPr/>
+          </p:nvGrpSpPr>
+          <p:grpSpPr>
+            <a:xfrm>
+              <a:off x="5570918" y="463264"/>
+              <a:ext cx="1047877" cy="849983"/>
+              <a:chOff x="4511040" y="1877124"/>
+              <a:chExt cx="1264920" cy="914400"/>
+            </a:xfrm>
+          </p:grpSpPr>
+          <p:pic>
+            <p:nvPicPr>
+              <p:cNvPr id="39" name="Graphic 38" descr="Office worker">
+                <a:extLst>
+                  <a:ext uri="{FF2B5EF4-FFF2-40B4-BE49-F238E27FC236}">
+                    <a16:creationId xmlns:a16="http://schemas.microsoft.com/office/drawing/2014/main" id="{18339F49-92EF-B92D-176D-83FDA51EA667}"/>
+                  </a:ext>
+                </a:extLst>
+              </p:cNvPr>
+              <p:cNvPicPr>
+                <a:picLocks noChangeAspect="1"/>
+              </p:cNvPicPr>
+              <p:nvPr/>
+            </p:nvPicPr>
+            <p:blipFill>
+              <a:blip r:embed="rId11">
+                <a:extLst>
+                  <a:ext uri="{28A0092B-C50C-407E-A947-70E740481C1C}">
+                    <a14:useLocalDpi xmlns:a14="http://schemas.microsoft.com/office/drawing/2010/main" val="0"/>
+                  </a:ext>
+                  <a:ext uri="{96DAC541-7B7A-43D3-8B79-37D633B846F1}">
+                    <asvg:svgBlip xmlns:asvg="http://schemas.microsoft.com/office/drawing/2016/SVG/main" r:embed="rId12"/>
+                  </a:ext>
+                </a:extLst>
+              </a:blip>
+              <a:stretch>
+                <a:fillRect/>
+              </a:stretch>
+            </p:blipFill>
+            <p:spPr>
+              <a:xfrm>
+                <a:off x="4511040" y="1877124"/>
+                <a:ext cx="914400" cy="914400"/>
+              </a:xfrm>
+              <a:prstGeom prst="rect">
+                <a:avLst/>
+              </a:prstGeom>
+            </p:spPr>
+          </p:pic>
+          <p:pic>
+            <p:nvPicPr>
+              <p:cNvPr id="41" name="Graphic 40" descr="Briefcase">
+                <a:extLst>
+                  <a:ext uri="{FF2B5EF4-FFF2-40B4-BE49-F238E27FC236}">
+                    <a16:creationId xmlns:a16="http://schemas.microsoft.com/office/drawing/2014/main" id="{EED70979-92E4-31CA-B815-56217BDEF4EE}"/>
+                  </a:ext>
+                </a:extLst>
+              </p:cNvPr>
+              <p:cNvPicPr>
+                <a:picLocks noChangeAspect="1"/>
+              </p:cNvPicPr>
+              <p:nvPr/>
+            </p:nvPicPr>
+            <p:blipFill>
+              <a:blip r:embed="rId13">
+                <a:extLst>
+                  <a:ext uri="{28A0092B-C50C-407E-A947-70E740481C1C}">
+                    <a14:useLocalDpi xmlns:a14="http://schemas.microsoft.com/office/drawing/2010/main" val="0"/>
+                  </a:ext>
+                  <a:ext uri="{96DAC541-7B7A-43D3-8B79-37D633B846F1}">
+                    <asvg:svgBlip xmlns:asvg="http://schemas.microsoft.com/office/drawing/2016/SVG/main" r:embed="rId14"/>
+                  </a:ext>
+                </a:extLst>
+              </a:blip>
+              <a:stretch>
+                <a:fillRect/>
+              </a:stretch>
+            </p:blipFill>
+            <p:spPr>
+              <a:xfrm>
+                <a:off x="5256034" y="2230958"/>
+                <a:ext cx="519926" cy="519926"/>
+              </a:xfrm>
+              <a:prstGeom prst="rect">
+                <a:avLst/>
+              </a:prstGeom>
+            </p:spPr>
+          </p:pic>
+        </p:grpSp>
+        <p:pic>
+          <p:nvPicPr>
+            <p:cNvPr id="56" name="Picture 55">
+              <a:extLst>
+                <a:ext uri="{FF2B5EF4-FFF2-40B4-BE49-F238E27FC236}">
+                  <a16:creationId xmlns:a16="http://schemas.microsoft.com/office/drawing/2014/main" id="{F37977D1-2847-C0F7-7541-5C3A37DCA779}"/>
+                </a:ext>
+              </a:extLst>
+            </p:cNvPr>
+            <p:cNvPicPr>
+              <a:picLocks noChangeAspect="1"/>
+            </p:cNvPicPr>
+            <p:nvPr/>
+          </p:nvPicPr>
+          <p:blipFill>
+            <a:blip r:embed="rId15">
+              <a:extLst>
+                <a:ext uri="{28A0092B-C50C-407E-A947-70E740481C1C}">
+                  <a14:useLocalDpi xmlns:a14="http://schemas.microsoft.com/office/drawing/2010/main" val="0"/>
+                </a:ext>
+              </a:extLst>
+            </a:blip>
+            <a:stretch>
+              <a:fillRect/>
+            </a:stretch>
+          </p:blipFill>
+          <p:spPr>
+            <a:xfrm>
+              <a:off x="9010958" y="142926"/>
+              <a:ext cx="1221124" cy="1095959"/>
+            </a:xfrm>
+            <a:prstGeom prst="rect">
+              <a:avLst/>
+            </a:prstGeom>
+          </p:spPr>
+        </p:pic>
+        <p:grpSp>
+          <p:nvGrpSpPr>
+            <p:cNvPr id="59" name="Group 58">
+              <a:extLst>
+                <a:ext uri="{FF2B5EF4-FFF2-40B4-BE49-F238E27FC236}">
+                  <a16:creationId xmlns:a16="http://schemas.microsoft.com/office/drawing/2014/main" id="{6DAE5E8A-CD96-6ADD-BA05-5E9008751A36}"/>
+                </a:ext>
+              </a:extLst>
+            </p:cNvPr>
+            <p:cNvGrpSpPr/>
+            <p:nvPr/>
+          </p:nvGrpSpPr>
+          <p:grpSpPr>
+            <a:xfrm>
+              <a:off x="1684471" y="156970"/>
+              <a:ext cx="1418378" cy="1129170"/>
+              <a:chOff x="1320414" y="416559"/>
+              <a:chExt cx="1418378" cy="1129170"/>
+            </a:xfrm>
+          </p:grpSpPr>
+          <p:grpSp>
+            <p:nvGrpSpPr>
+              <p:cNvPr id="37" name="Group 36">
+                <a:extLst>
+                  <a:ext uri="{FF2B5EF4-FFF2-40B4-BE49-F238E27FC236}">
+                    <a16:creationId xmlns:a16="http://schemas.microsoft.com/office/drawing/2014/main" id="{0116B90B-D058-5059-CC0D-190AD76EDA3A}"/>
+                  </a:ext>
+                </a:extLst>
+              </p:cNvPr>
+              <p:cNvGrpSpPr/>
+              <p:nvPr/>
+            </p:nvGrpSpPr>
+            <p:grpSpPr>
+              <a:xfrm>
+                <a:off x="2044842" y="416559"/>
+                <a:ext cx="693950" cy="1126933"/>
+                <a:chOff x="962130" y="179005"/>
+                <a:chExt cx="924560" cy="1405128"/>
+              </a:xfrm>
+            </p:grpSpPr>
+            <p:pic>
+              <p:nvPicPr>
+                <p:cNvPr id="30" name="Graphic 29" descr="Books">
+                  <a:extLst>
+                    <a:ext uri="{FF2B5EF4-FFF2-40B4-BE49-F238E27FC236}">
+                      <a16:creationId xmlns:a16="http://schemas.microsoft.com/office/drawing/2014/main" id="{5EDC206C-91E3-8E5D-CC6C-41BA5E36D1E7}"/>
+                    </a:ext>
+                  </a:extLst>
+                </p:cNvPr>
+                <p:cNvPicPr>
+                  <a:picLocks noChangeAspect="1"/>
+                </p:cNvPicPr>
+                <p:nvPr/>
+              </p:nvPicPr>
+              <p:blipFill>
+                <a:blip r:embed="rId16">
+                  <a:extLst>
+                    <a:ext uri="{28A0092B-C50C-407E-A947-70E740481C1C}">
+                      <a14:useLocalDpi xmlns:a14="http://schemas.microsoft.com/office/drawing/2010/main" val="0"/>
+                    </a:ext>
+                    <a:ext uri="{96DAC541-7B7A-43D3-8B79-37D633B846F1}">
+                      <asvg:svgBlip xmlns:asvg="http://schemas.microsoft.com/office/drawing/2016/SVG/main" r:embed="rId17"/>
+                    </a:ext>
+                  </a:extLst>
+                </a:blip>
+                <a:stretch>
+                  <a:fillRect/>
+                </a:stretch>
+              </p:blipFill>
+              <p:spPr>
+                <a:xfrm>
+                  <a:off x="972290" y="669733"/>
+                  <a:ext cx="914400" cy="914400"/>
+                </a:xfrm>
+                <a:prstGeom prst="rect">
+                  <a:avLst/>
+                </a:prstGeom>
+              </p:spPr>
+            </p:pic>
+            <p:pic>
+              <p:nvPicPr>
+                <p:cNvPr id="34" name="Graphic 33" descr="Graduation cap">
+                  <a:extLst>
+                    <a:ext uri="{FF2B5EF4-FFF2-40B4-BE49-F238E27FC236}">
+                      <a16:creationId xmlns:a16="http://schemas.microsoft.com/office/drawing/2014/main" id="{22C573B1-DA24-07B6-6E5C-596469B07AC7}"/>
+                    </a:ext>
+                  </a:extLst>
+                </p:cNvPr>
+                <p:cNvPicPr>
+                  <a:picLocks noChangeAspect="1"/>
+                </p:cNvPicPr>
+                <p:nvPr/>
+              </p:nvPicPr>
+              <p:blipFill>
+                <a:blip r:embed="rId18">
+                  <a:extLst>
+                    <a:ext uri="{28A0092B-C50C-407E-A947-70E740481C1C}">
+                      <a14:useLocalDpi xmlns:a14="http://schemas.microsoft.com/office/drawing/2010/main" val="0"/>
+                    </a:ext>
+                    <a:ext uri="{96DAC541-7B7A-43D3-8B79-37D633B846F1}">
+                      <asvg:svgBlip xmlns:asvg="http://schemas.microsoft.com/office/drawing/2016/SVG/main" r:embed="rId19"/>
+                    </a:ext>
+                  </a:extLst>
+                </a:blip>
+                <a:stretch>
+                  <a:fillRect/>
+                </a:stretch>
+              </p:blipFill>
+              <p:spPr>
+                <a:xfrm>
+                  <a:off x="962130" y="179005"/>
+                  <a:ext cx="914400" cy="914400"/>
+                </a:xfrm>
+                <a:prstGeom prst="rect">
+                  <a:avLst/>
+                </a:prstGeom>
+              </p:spPr>
+            </p:pic>
+          </p:grpSp>
+          <p:pic>
+            <p:nvPicPr>
+              <p:cNvPr id="58" name="Graphic 57" descr="Baby crawling">
+                <a:extLst>
+                  <a:ext uri="{FF2B5EF4-FFF2-40B4-BE49-F238E27FC236}">
+                    <a16:creationId xmlns:a16="http://schemas.microsoft.com/office/drawing/2014/main" id="{CE8A0943-F23B-276D-43FC-7187A5F87617}"/>
+                  </a:ext>
+                </a:extLst>
+              </p:cNvPr>
+              <p:cNvPicPr>
+                <a:picLocks noChangeAspect="1"/>
+              </p:cNvPicPr>
+              <p:nvPr/>
+            </p:nvPicPr>
+            <p:blipFill>
+              <a:blip r:embed="rId20">
+                <a:extLst>
+                  <a:ext uri="{28A0092B-C50C-407E-A947-70E740481C1C}">
+                    <a14:useLocalDpi xmlns:a14="http://schemas.microsoft.com/office/drawing/2010/main" val="0"/>
+                  </a:ext>
+                  <a:ext uri="{96DAC541-7B7A-43D3-8B79-37D633B846F1}">
+                    <asvg:svgBlip xmlns:asvg="http://schemas.microsoft.com/office/drawing/2016/SVG/main" r:embed="rId21"/>
+                  </a:ext>
+                </a:extLst>
+              </a:blip>
+              <a:stretch>
+                <a:fillRect/>
+              </a:stretch>
+            </p:blipFill>
+            <p:spPr>
+              <a:xfrm rot="21440613">
+                <a:off x="1320414" y="837336"/>
+                <a:ext cx="708393" cy="708393"/>
+              </a:xfrm>
+              <a:prstGeom prst="rect">
+                <a:avLst/>
+              </a:prstGeom>
+            </p:spPr>
+          </p:pic>
+        </p:grpSp>
+        <p:sp>
+          <p:nvSpPr>
+            <p:cNvPr id="60" name="TextBox 59">
+              <a:extLst>
+                <a:ext uri="{FF2B5EF4-FFF2-40B4-BE49-F238E27FC236}">
+                  <a16:creationId xmlns:a16="http://schemas.microsoft.com/office/drawing/2014/main" id="{85DE82DB-603B-6227-18B8-0798996FDC4D}"/>
+                </a:ext>
+              </a:extLst>
+            </p:cNvPr>
+            <p:cNvSpPr txBox="1"/>
+            <p:nvPr/>
+          </p:nvSpPr>
+          <p:spPr>
+            <a:xfrm>
+              <a:off x="569474" y="1155812"/>
+              <a:ext cx="11237214" cy="584775"/>
+            </a:xfrm>
+            <a:prstGeom prst="rect">
+              <a:avLst/>
+            </a:prstGeom>
+            <a:noFill/>
+          </p:spPr>
+          <p:txBody>
+            <a:bodyPr wrap="square" rtlCol="0">
+              <a:spAutoFit/>
+            </a:bodyPr>
+            <a:lstStyle/>
+            <a:p>
+              <a:r>
+                <a:rPr lang="en-US" sz="1400" b="1" i="1" dirty="0">
+                  <a:solidFill>
+                    <a:schemeClr val="tx1">
+                      <a:lumMod val="65000"/>
+                      <a:lumOff val="35000"/>
+                    </a:schemeClr>
+                  </a:solidFill>
+                </a:rPr>
+                <a:t>	            </a:t>
+              </a:r>
+              <a:r>
+                <a:rPr lang="en-US" sz="1400" b="1" i="1" dirty="0">
+                  <a:solidFill>
+                    <a:schemeClr val="tx1">
+                      <a:lumMod val="65000"/>
+                      <a:lumOff val="35000"/>
+                    </a:schemeClr>
+                  </a:solidFill>
+                  <a:effectLst/>
+                </a:rPr>
+                <a:t>EDUCATION			  </a:t>
+              </a:r>
+              <a:r>
+                <a:rPr lang="en-US" b="1" i="1" dirty="0">
+                  <a:solidFill>
+                    <a:schemeClr val="accent6">
+                      <a:lumMod val="50000"/>
+                    </a:schemeClr>
+                  </a:solidFill>
+                  <a:effectLst/>
+                </a:rPr>
+                <a:t>WORKING STAGE</a:t>
+              </a:r>
+              <a:r>
+                <a:rPr lang="en-US" sz="1400" b="1" i="1" dirty="0">
+                  <a:solidFill>
+                    <a:schemeClr val="tx1">
+                      <a:lumMod val="65000"/>
+                      <a:lumOff val="35000"/>
+                    </a:schemeClr>
+                  </a:solidFill>
+                  <a:effectLst/>
+                </a:rPr>
+                <a:t>			       RETIREMENT</a:t>
+              </a:r>
+            </a:p>
+            <a:p>
+              <a:r>
+                <a:rPr lang="en-US" sz="1400" b="1" i="1" dirty="0">
+                  <a:solidFill>
+                    <a:schemeClr val="tx1">
+                      <a:lumMod val="65000"/>
+                      <a:lumOff val="35000"/>
+                    </a:schemeClr>
+                  </a:solidFill>
+                </a:rPr>
+                <a:t>	           </a:t>
+              </a:r>
+              <a:r>
+                <a:rPr lang="en-US" sz="1400" b="1" i="1" dirty="0">
+                  <a:solidFill>
+                    <a:srgbClr val="C00000"/>
+                  </a:solidFill>
+                </a:rPr>
+                <a:t> (no income)							        (no income)</a:t>
+              </a:r>
+              <a:endParaRPr lang="en-US" sz="1400" b="0" i="1" dirty="0">
+                <a:solidFill>
+                  <a:srgbClr val="C00000"/>
+                </a:solidFill>
+                <a:effectLst/>
+              </a:endParaRPr>
+            </a:p>
+          </p:txBody>
+        </p:sp>
+        <p:sp>
+          <p:nvSpPr>
+            <p:cNvPr id="61" name="TextBox 60">
+              <a:extLst>
+                <a:ext uri="{FF2B5EF4-FFF2-40B4-BE49-F238E27FC236}">
+                  <a16:creationId xmlns:a16="http://schemas.microsoft.com/office/drawing/2014/main" id="{DBB05038-6DBF-9AF0-5AD4-1C196BB3A3EB}"/>
+                </a:ext>
+              </a:extLst>
+            </p:cNvPr>
+            <p:cNvSpPr txBox="1"/>
+            <p:nvPr/>
+          </p:nvSpPr>
+          <p:spPr>
+            <a:xfrm>
+              <a:off x="1381126" y="633685"/>
+              <a:ext cx="461929" cy="584775"/>
+            </a:xfrm>
+            <a:prstGeom prst="rect">
+              <a:avLst/>
+            </a:prstGeom>
+            <a:noFill/>
+          </p:spPr>
+          <p:txBody>
+            <a:bodyPr wrap="square" rtlCol="0">
+              <a:spAutoFit/>
+            </a:bodyPr>
+            <a:lstStyle/>
+            <a:p>
+              <a:r>
+                <a:rPr lang="en-US" sz="3200" b="1" dirty="0">
+                  <a:solidFill>
+                    <a:schemeClr val="tx1">
+                      <a:lumMod val="65000"/>
+                      <a:lumOff val="35000"/>
+                    </a:schemeClr>
+                  </a:solidFill>
+                </a:rPr>
+                <a:t>0</a:t>
+              </a:r>
+              <a:endParaRPr lang="en-PH" sz="3200" b="1" dirty="0">
+                <a:solidFill>
+                  <a:schemeClr val="tx1">
+                    <a:lumMod val="65000"/>
+                    <a:lumOff val="35000"/>
+                  </a:schemeClr>
+                </a:solidFill>
+              </a:endParaRPr>
+            </a:p>
+          </p:txBody>
+        </p:sp>
+        <p:sp>
+          <p:nvSpPr>
+            <p:cNvPr id="62" name="TextBox 61">
+              <a:extLst>
+                <a:ext uri="{FF2B5EF4-FFF2-40B4-BE49-F238E27FC236}">
+                  <a16:creationId xmlns:a16="http://schemas.microsoft.com/office/drawing/2014/main" id="{786A2140-4326-FF7A-6942-09F9F4FA68D1}"/>
+                </a:ext>
+              </a:extLst>
+            </p:cNvPr>
+            <p:cNvSpPr txBox="1"/>
+            <p:nvPr/>
+          </p:nvSpPr>
+          <p:spPr>
+            <a:xfrm>
+              <a:off x="3048030" y="633600"/>
+              <a:ext cx="599416" cy="584775"/>
+            </a:xfrm>
+            <a:prstGeom prst="rect">
+              <a:avLst/>
+            </a:prstGeom>
+            <a:noFill/>
+          </p:spPr>
+          <p:txBody>
+            <a:bodyPr wrap="square" rtlCol="0">
+              <a:spAutoFit/>
+            </a:bodyPr>
+            <a:lstStyle/>
+            <a:p>
+              <a:r>
+                <a:rPr lang="en-US" sz="3200" b="1" dirty="0">
+                  <a:solidFill>
+                    <a:schemeClr val="tx1">
+                      <a:lumMod val="65000"/>
+                      <a:lumOff val="35000"/>
+                    </a:schemeClr>
+                  </a:solidFill>
+                </a:rPr>
+                <a:t>20</a:t>
+              </a:r>
+              <a:endParaRPr lang="en-PH" sz="3200" b="1" dirty="0">
+                <a:solidFill>
+                  <a:schemeClr val="tx1">
+                    <a:lumMod val="65000"/>
+                    <a:lumOff val="35000"/>
+                  </a:schemeClr>
+                </a:solidFill>
+              </a:endParaRPr>
+            </a:p>
+          </p:txBody>
+        </p:sp>
+        <p:sp>
+          <p:nvSpPr>
+            <p:cNvPr id="63" name="TextBox 62">
+              <a:extLst>
+                <a:ext uri="{FF2B5EF4-FFF2-40B4-BE49-F238E27FC236}">
+                  <a16:creationId xmlns:a16="http://schemas.microsoft.com/office/drawing/2014/main" id="{E3354032-9571-8CA1-6755-DADBE53C4C25}"/>
+                </a:ext>
+              </a:extLst>
+            </p:cNvPr>
+            <p:cNvSpPr txBox="1"/>
+            <p:nvPr/>
+          </p:nvSpPr>
+          <p:spPr>
+            <a:xfrm>
+              <a:off x="8565780" y="643087"/>
+              <a:ext cx="601685" cy="584775"/>
+            </a:xfrm>
+            <a:prstGeom prst="rect">
+              <a:avLst/>
+            </a:prstGeom>
+            <a:noFill/>
+          </p:spPr>
+          <p:txBody>
+            <a:bodyPr wrap="square" rtlCol="0">
+              <a:spAutoFit/>
+            </a:bodyPr>
+            <a:lstStyle/>
+            <a:p>
+              <a:r>
+                <a:rPr lang="en-US" sz="3200" b="1" dirty="0">
+                  <a:solidFill>
+                    <a:schemeClr val="tx1">
+                      <a:lumMod val="65000"/>
+                      <a:lumOff val="35000"/>
+                    </a:schemeClr>
+                  </a:solidFill>
+                </a:rPr>
+                <a:t>60</a:t>
+              </a:r>
+              <a:endParaRPr lang="en-PH" sz="3200" b="1" dirty="0">
+                <a:solidFill>
+                  <a:schemeClr val="tx1">
+                    <a:lumMod val="65000"/>
+                    <a:lumOff val="35000"/>
+                  </a:schemeClr>
+                </a:solidFill>
+              </a:endParaRPr>
+            </a:p>
+          </p:txBody>
+        </p:sp>
+        <p:sp>
+          <p:nvSpPr>
+            <p:cNvPr id="66" name="TextBox 65">
+              <a:extLst>
+                <a:ext uri="{FF2B5EF4-FFF2-40B4-BE49-F238E27FC236}">
+                  <a16:creationId xmlns:a16="http://schemas.microsoft.com/office/drawing/2014/main" id="{73EB994D-99F7-8A1B-A79A-1BD6471287A5}"/>
+                </a:ext>
+              </a:extLst>
+            </p:cNvPr>
+            <p:cNvSpPr txBox="1"/>
+            <p:nvPr/>
+          </p:nvSpPr>
+          <p:spPr>
+            <a:xfrm>
+              <a:off x="10061569" y="643086"/>
+              <a:ext cx="841399" cy="584775"/>
+            </a:xfrm>
+            <a:prstGeom prst="rect">
+              <a:avLst/>
+            </a:prstGeom>
+            <a:noFill/>
+          </p:spPr>
+          <p:txBody>
+            <a:bodyPr wrap="square" rtlCol="0">
+              <a:spAutoFit/>
+            </a:bodyPr>
+            <a:lstStyle/>
+            <a:p>
+              <a:r>
+                <a:rPr lang="en-US" sz="3200" b="1" dirty="0">
+                  <a:solidFill>
+                    <a:schemeClr val="tx1">
+                      <a:lumMod val="65000"/>
+                      <a:lumOff val="35000"/>
+                    </a:schemeClr>
+                  </a:solidFill>
+                </a:rPr>
+                <a:t>100</a:t>
+              </a:r>
+              <a:endParaRPr lang="en-PH" sz="3200" b="1" dirty="0">
+                <a:solidFill>
+                  <a:schemeClr val="tx1">
+                    <a:lumMod val="65000"/>
+                    <a:lumOff val="35000"/>
+                  </a:schemeClr>
+                </a:solidFill>
+              </a:endParaRPr>
+            </a:p>
+          </p:txBody>
+        </p:sp>
+      </p:grpSp>
+      <p:grpSp>
+        <p:nvGrpSpPr>
+          <p:cNvPr id="80" name="Group 79">
+            <a:extLst>
+              <a:ext uri="{FF2B5EF4-FFF2-40B4-BE49-F238E27FC236}">
+                <a16:creationId xmlns:a16="http://schemas.microsoft.com/office/drawing/2014/main" id="{EE4AA5E3-0369-4E86-0F28-FFCC0A053BE8}"/>
+              </a:ext>
+            </a:extLst>
+          </p:cNvPr>
+          <p:cNvGrpSpPr/>
+          <p:nvPr/>
+        </p:nvGrpSpPr>
+        <p:grpSpPr>
+          <a:xfrm>
+            <a:off x="332204" y="3112393"/>
+            <a:ext cx="11234928" cy="2017776"/>
+            <a:chOff x="332204" y="3008711"/>
+            <a:chExt cx="11234928" cy="2017776"/>
+          </a:xfrm>
+        </p:grpSpPr>
+        <p:grpSp>
+          <p:nvGrpSpPr>
+            <p:cNvPr id="75" name="Group 74">
+              <a:extLst>
+                <a:ext uri="{FF2B5EF4-FFF2-40B4-BE49-F238E27FC236}">
+                  <a16:creationId xmlns:a16="http://schemas.microsoft.com/office/drawing/2014/main" id="{1AC56FFE-0E44-ACAA-2F09-9CB36B2822AC}"/>
+                </a:ext>
+              </a:extLst>
+            </p:cNvPr>
+            <p:cNvGrpSpPr/>
+            <p:nvPr/>
+          </p:nvGrpSpPr>
+          <p:grpSpPr>
+            <a:xfrm>
+              <a:off x="332204" y="3008711"/>
+              <a:ext cx="11234928" cy="2017776"/>
+              <a:chOff x="332204" y="3008711"/>
+              <a:chExt cx="11234928" cy="2017776"/>
+            </a:xfrm>
+          </p:grpSpPr>
+          <p:grpSp>
+            <p:nvGrpSpPr>
+              <p:cNvPr id="68" name="Group 67">
+                <a:extLst>
+                  <a:ext uri="{FF2B5EF4-FFF2-40B4-BE49-F238E27FC236}">
+                    <a16:creationId xmlns:a16="http://schemas.microsoft.com/office/drawing/2014/main" id="{37F85369-EC0C-BFBB-E697-2645F6897737}"/>
+                  </a:ext>
+                </a:extLst>
+              </p:cNvPr>
+              <p:cNvGrpSpPr/>
+              <p:nvPr/>
+            </p:nvGrpSpPr>
+            <p:grpSpPr>
+              <a:xfrm>
+                <a:off x="332204" y="3008711"/>
+                <a:ext cx="11234928" cy="2017776"/>
+                <a:chOff x="302133" y="3184884"/>
+                <a:chExt cx="11234928" cy="2017776"/>
+              </a:xfrm>
+            </p:grpSpPr>
+            <p:pic>
+              <p:nvPicPr>
+                <p:cNvPr id="44" name="Picture 43">
+                  <a:extLst>
+                    <a:ext uri="{FF2B5EF4-FFF2-40B4-BE49-F238E27FC236}">
+                      <a16:creationId xmlns:a16="http://schemas.microsoft.com/office/drawing/2014/main" id="{BEAB5C5C-D88A-F81B-B11A-016EF7831D55}"/>
+                    </a:ext>
+                  </a:extLst>
+                </p:cNvPr>
+                <p:cNvPicPr>
+                  <a:picLocks noChangeAspect="1"/>
+                </p:cNvPicPr>
+                <p:nvPr/>
+              </p:nvPicPr>
+              <p:blipFill>
+                <a:blip r:embed="rId22">
+                  <a:extLst>
+                    <a:ext uri="{28A0092B-C50C-407E-A947-70E740481C1C}">
+                      <a14:useLocalDpi xmlns:a14="http://schemas.microsoft.com/office/drawing/2010/main" val="0"/>
+                    </a:ext>
+                  </a:extLst>
+                </a:blip>
+                <a:stretch>
+                  <a:fillRect/>
+                </a:stretch>
+              </p:blipFill>
+              <p:spPr>
+                <a:xfrm>
+                  <a:off x="302133" y="3184884"/>
+                  <a:ext cx="11234928" cy="2017776"/>
+                </a:xfrm>
+                <a:prstGeom prst="rect">
+                  <a:avLst/>
+                </a:prstGeom>
+              </p:spPr>
+            </p:pic>
+            <p:sp>
+              <p:nvSpPr>
+                <p:cNvPr id="45" name="Rectangle 44">
+                  <a:extLst>
+                    <a:ext uri="{FF2B5EF4-FFF2-40B4-BE49-F238E27FC236}">
+                      <a16:creationId xmlns:a16="http://schemas.microsoft.com/office/drawing/2014/main" id="{194AE3F0-18DC-2F33-3074-BAEDF2EE3988}"/>
+                    </a:ext>
+                  </a:extLst>
+                </p:cNvPr>
+                <p:cNvSpPr/>
+                <p:nvPr/>
+              </p:nvSpPr>
+              <p:spPr>
+                <a:xfrm>
+                  <a:off x="1158240" y="3342319"/>
+                  <a:ext cx="8676640" cy="1498438"/>
+                </a:xfrm>
+                <a:prstGeom prst="rect">
+                  <a:avLst/>
+                </a:prstGeom>
+                <a:solidFill>
+                  <a:schemeClr val="bg1"/>
+                </a:solidFill>
+                <a:ln>
+                  <a:solidFill>
+                    <a:schemeClr val="bg1"/>
+                  </a:solidFill>
+                </a:ln>
+              </p:spPr>
+              <p:style>
+                <a:lnRef idx="2">
+                  <a:schemeClr val="accent1">
+                    <a:shade val="50000"/>
+                  </a:schemeClr>
+                </a:lnRef>
+                <a:fillRef idx="1">
+                  <a:schemeClr val="accent1"/>
+                </a:fillRef>
+                <a:effectRef idx="0">
+                  <a:schemeClr val="accent1"/>
+                </a:effectRef>
+                <a:fontRef idx="minor">
+                  <a:schemeClr val="lt1"/>
+                </a:fontRef>
+              </p:style>
+              <p:txBody>
+                <a:bodyPr rtlCol="0" anchor="ctr"/>
+                <a:lstStyle/>
+                <a:p>
+                  <a:pPr algn="ctr"/>
+                  <a:endParaRPr lang="en-PH"/>
+                </a:p>
+              </p:txBody>
+            </p:sp>
+          </p:grpSp>
+          <p:sp>
+            <p:nvSpPr>
+              <p:cNvPr id="74" name="TextBox 73">
+                <a:extLst>
+                  <a:ext uri="{FF2B5EF4-FFF2-40B4-BE49-F238E27FC236}">
+                    <a16:creationId xmlns:a16="http://schemas.microsoft.com/office/drawing/2014/main" id="{0F385419-8445-4148-EBC0-46222A220333}"/>
+                  </a:ext>
+                </a:extLst>
+              </p:cNvPr>
+              <p:cNvSpPr txBox="1"/>
+              <p:nvPr/>
+            </p:nvSpPr>
+            <p:spPr>
+              <a:xfrm>
+                <a:off x="332204" y="3308384"/>
+                <a:ext cx="11234928" cy="1200329"/>
+              </a:xfrm>
+              <a:prstGeom prst="rect">
+                <a:avLst/>
+              </a:prstGeom>
+              <a:noFill/>
+            </p:spPr>
+            <p:txBody>
+              <a:bodyPr wrap="square" rtlCol="0">
+                <a:spAutoFit/>
+              </a:bodyPr>
+              <a:lstStyle/>
+              <a:p>
+                <a:pPr algn="ctr"/>
+                <a:r>
+                  <a:rPr lang="en-US" sz="2000" b="1" i="1" dirty="0">
+                    <a:solidFill>
+                      <a:schemeClr val="accent6">
+                        <a:lumMod val="50000"/>
+                      </a:schemeClr>
+                    </a:solidFill>
+                    <a:effectLst/>
+                  </a:rPr>
+                  <a:t>In GOAL SETTING</a:t>
+                </a:r>
+                <a:r>
+                  <a:rPr lang="en-US" sz="2000" b="1" i="1" dirty="0">
+                    <a:solidFill>
+                      <a:schemeClr val="tx1">
+                        <a:lumMod val="65000"/>
+                        <a:lumOff val="35000"/>
+                      </a:schemeClr>
+                    </a:solidFill>
+                    <a:effectLst/>
+                  </a:rPr>
+                  <a:t>, </a:t>
+                </a:r>
+              </a:p>
+              <a:p>
+                <a:pPr algn="ctr"/>
+                <a:r>
+                  <a:rPr lang="en-US" sz="2000" b="1" i="1" dirty="0">
+                    <a:solidFill>
+                      <a:schemeClr val="tx1">
+                        <a:lumMod val="65000"/>
+                        <a:lumOff val="35000"/>
+                      </a:schemeClr>
+                    </a:solidFill>
+                    <a:effectLst/>
+                  </a:rPr>
+                  <a:t>be</a:t>
+                </a:r>
+                <a:endParaRPr lang="en-US" sz="2000" b="1" i="1" dirty="0">
+                  <a:solidFill>
+                    <a:schemeClr val="tx1">
+                      <a:lumMod val="65000"/>
+                      <a:lumOff val="35000"/>
+                    </a:schemeClr>
+                  </a:solidFill>
+                </a:endParaRPr>
+              </a:p>
+              <a:p>
+                <a:pPr algn="ctr"/>
+                <a:r>
+                  <a:rPr lang="en-US" sz="3200" b="1" dirty="0">
+                    <a:solidFill>
+                      <a:srgbClr val="002060"/>
+                    </a:solidFill>
+                  </a:rPr>
+                  <a:t>S</a:t>
+                </a:r>
+                <a:r>
+                  <a:rPr lang="en-US" sz="2000" b="1" i="1" dirty="0">
+                    <a:solidFill>
+                      <a:srgbClr val="002060"/>
+                    </a:solidFill>
+                  </a:rPr>
+                  <a:t>pecific</a:t>
+                </a:r>
+                <a:r>
+                  <a:rPr lang="en-US" sz="2000" b="1" dirty="0">
+                    <a:solidFill>
+                      <a:srgbClr val="002060"/>
+                    </a:solidFill>
+                  </a:rPr>
+                  <a:t> | </a:t>
+                </a:r>
+                <a:r>
+                  <a:rPr lang="en-US" sz="3200" b="1" dirty="0">
+                    <a:solidFill>
+                      <a:srgbClr val="002060"/>
+                    </a:solidFill>
+                  </a:rPr>
+                  <a:t>M</a:t>
+                </a:r>
+                <a:r>
+                  <a:rPr lang="en-US" sz="2000" b="1" i="1" dirty="0">
+                    <a:solidFill>
+                      <a:srgbClr val="002060"/>
+                    </a:solidFill>
+                  </a:rPr>
+                  <a:t>easurable</a:t>
+                </a:r>
+                <a:r>
+                  <a:rPr lang="en-US" sz="2000" b="1" dirty="0">
+                    <a:solidFill>
+                      <a:srgbClr val="002060"/>
+                    </a:solidFill>
+                  </a:rPr>
+                  <a:t> | </a:t>
+                </a:r>
+                <a:r>
+                  <a:rPr lang="en-US" sz="3200" b="1" dirty="0">
+                    <a:solidFill>
+                      <a:srgbClr val="002060"/>
+                    </a:solidFill>
+                  </a:rPr>
+                  <a:t>A</a:t>
+                </a:r>
+                <a:r>
+                  <a:rPr lang="en-US" sz="2000" b="1" i="1" dirty="0">
+                    <a:solidFill>
+                      <a:srgbClr val="002060"/>
+                    </a:solidFill>
+                  </a:rPr>
+                  <a:t>ttainable </a:t>
+                </a:r>
+                <a:r>
+                  <a:rPr lang="en-US" sz="2000" b="1" dirty="0">
+                    <a:solidFill>
+                      <a:srgbClr val="002060"/>
+                    </a:solidFill>
+                  </a:rPr>
+                  <a:t>| </a:t>
+                </a:r>
+                <a:r>
+                  <a:rPr lang="en-US" sz="3200" b="1" dirty="0">
+                    <a:solidFill>
+                      <a:srgbClr val="002060"/>
+                    </a:solidFill>
+                  </a:rPr>
+                  <a:t>R</a:t>
+                </a:r>
+                <a:r>
+                  <a:rPr lang="en-US" sz="2000" b="1" i="1" dirty="0">
+                    <a:solidFill>
+                      <a:srgbClr val="002060"/>
+                    </a:solidFill>
+                  </a:rPr>
+                  <a:t>ealistic </a:t>
+                </a:r>
+                <a:r>
+                  <a:rPr lang="en-US" sz="2000" b="1" dirty="0">
+                    <a:solidFill>
+                      <a:srgbClr val="002060"/>
+                    </a:solidFill>
+                  </a:rPr>
+                  <a:t>| </a:t>
+                </a:r>
+                <a:r>
+                  <a:rPr lang="en-US" sz="3200" b="1" dirty="0">
+                    <a:solidFill>
+                      <a:srgbClr val="002060"/>
+                    </a:solidFill>
+                  </a:rPr>
+                  <a:t>T</a:t>
+                </a:r>
+                <a:r>
+                  <a:rPr lang="en-US" sz="2000" b="1" i="1" dirty="0">
+                    <a:solidFill>
+                      <a:srgbClr val="002060"/>
+                    </a:solidFill>
+                  </a:rPr>
+                  <a:t>ime-bounded</a:t>
+                </a:r>
+                <a:endParaRPr lang="en-US" sz="2000" b="0" i="1" dirty="0">
+                  <a:solidFill>
+                    <a:srgbClr val="002060"/>
+                  </a:solidFill>
+                  <a:effectLst/>
+                </a:endParaRPr>
+              </a:p>
+            </p:txBody>
+          </p:sp>
+        </p:grpSp>
+        <p:pic>
+          <p:nvPicPr>
+            <p:cNvPr id="77" name="Graphic 76" descr="Run">
+              <a:extLst>
+                <a:ext uri="{FF2B5EF4-FFF2-40B4-BE49-F238E27FC236}">
+                  <a16:creationId xmlns:a16="http://schemas.microsoft.com/office/drawing/2014/main" id="{60029FD9-737C-AE5E-DBD0-D63E71F9927C}"/>
+                </a:ext>
+              </a:extLst>
+            </p:cNvPr>
+            <p:cNvPicPr>
+              <a:picLocks noChangeAspect="1"/>
+            </p:cNvPicPr>
+            <p:nvPr/>
+          </p:nvPicPr>
+          <p:blipFill>
+            <a:blip r:embed="rId23">
+              <a:extLst>
+                <a:ext uri="{28A0092B-C50C-407E-A947-70E740481C1C}">
+                  <a14:useLocalDpi xmlns:a14="http://schemas.microsoft.com/office/drawing/2010/main" val="0"/>
+                </a:ext>
+                <a:ext uri="{96DAC541-7B7A-43D3-8B79-37D633B846F1}">
+                  <asvg:svgBlip xmlns:asvg="http://schemas.microsoft.com/office/drawing/2016/SVG/main" r:embed="rId24"/>
+                </a:ext>
+              </a:extLst>
+            </a:blip>
+            <a:stretch>
+              <a:fillRect/>
+            </a:stretch>
+          </p:blipFill>
+          <p:spPr>
+            <a:xfrm>
+              <a:off x="1937920" y="4012490"/>
+              <a:ext cx="389129" cy="389129"/>
+            </a:xfrm>
+            <a:prstGeom prst="rect">
+              <a:avLst/>
+            </a:prstGeom>
+          </p:spPr>
+        </p:pic>
+        <p:pic>
+          <p:nvPicPr>
+            <p:cNvPr id="79" name="Graphic 78" descr="Flag">
+              <a:extLst>
+                <a:ext uri="{FF2B5EF4-FFF2-40B4-BE49-F238E27FC236}">
+                  <a16:creationId xmlns:a16="http://schemas.microsoft.com/office/drawing/2014/main" id="{4C712D11-F68B-9B08-62D6-E72A13145CF0}"/>
+                </a:ext>
+              </a:extLst>
+            </p:cNvPr>
+            <p:cNvPicPr>
+              <a:picLocks noChangeAspect="1"/>
+            </p:cNvPicPr>
+            <p:nvPr/>
+          </p:nvPicPr>
+          <p:blipFill>
+            <a:blip r:embed="rId25">
+              <a:extLst>
+                <a:ext uri="{28A0092B-C50C-407E-A947-70E740481C1C}">
+                  <a14:useLocalDpi xmlns:a14="http://schemas.microsoft.com/office/drawing/2010/main" val="0"/>
+                </a:ext>
+                <a:ext uri="{96DAC541-7B7A-43D3-8B79-37D633B846F1}">
+                  <asvg:svgBlip xmlns:asvg="http://schemas.microsoft.com/office/drawing/2016/SVG/main" r:embed="rId26"/>
+                </a:ext>
+              </a:extLst>
+            </a:blip>
+            <a:stretch>
+              <a:fillRect/>
+            </a:stretch>
+          </p:blipFill>
+          <p:spPr>
+            <a:xfrm>
+              <a:off x="9535255" y="4012489"/>
+              <a:ext cx="389129" cy="389129"/>
+            </a:xfrm>
+            <a:prstGeom prst="rect">
+              <a:avLst/>
+            </a:prstGeom>
+          </p:spPr>
+        </p:pic>
+      </p:grpSp>
+    </p:spTree>
+    <p:extLst>
+      <p:ext uri="{BB962C8B-B14F-4D97-AF65-F5344CB8AC3E}">
+        <p14:creationId xmlns:p14="http://schemas.microsoft.com/office/powerpoint/2010/main" val="3486530727"/>
+      </p:ext>
+    </p:extLst>
+  </p:cSld>
+  <p:clrMapOvr>
+    <a:masterClrMapping/>
+  </p:clrMapOvr>
+</p:sld>
+</file>
+
 <file path=ppt/theme/theme1.xml><?xml version="1.0" encoding="utf-8"?>
 <a:theme xmlns:a="http://schemas.openxmlformats.org/drawingml/2006/main" name="Office Theme">
   <a:themeElements>

</xml_diff>

<commit_message>
modified:   home.html 	modified:   index.html 	deleted:    mp1images/ampleprep.JPG 	modified:   mp1images/carousel pics.pptx 	modified:   mp1images/causesofdeath.jpg 	modified:   mp1images/lifeexpectancy.jpg 	new file:   mp1images/prep.jpg 	modified:   mp1images/stagesoflife.jpg
</commit_message>
<xml_diff>
--- a/mp1images/carousel pics.pptx
+++ b/mp1images/carousel pics.pptx
@@ -119,24 +119,48 @@
   <pc:docChgLst>
     <pc:chgData name="Rose Joy Angeline Padilla" userId="ecdd412207c6b092" providerId="LiveId" clId="{8A8653A4-EEE4-480C-A831-A23D8E4BA8F6}"/>
     <pc:docChg chg="undo redo custSel addSld modSld">
-      <pc:chgData name="Rose Joy Angeline Padilla" userId="ecdd412207c6b092" providerId="LiveId" clId="{8A8653A4-EEE4-480C-A831-A23D8E4BA8F6}" dt="2023-06-03T22:54:09.082" v="2504" actId="1076"/>
+      <pc:chgData name="Rose Joy Angeline Padilla" userId="ecdd412207c6b092" providerId="LiveId" clId="{8A8653A4-EEE4-480C-A831-A23D8E4BA8F6}" dt="2023-06-04T03:35:48.654" v="3591" actId="338"/>
       <pc:docMkLst>
         <pc:docMk/>
       </pc:docMkLst>
-      <pc:sldChg chg="addSp modSp mod">
-        <pc:chgData name="Rose Joy Angeline Padilla" userId="ecdd412207c6b092" providerId="LiveId" clId="{8A8653A4-EEE4-480C-A831-A23D8E4BA8F6}" dt="2023-05-31T03:28:36.488" v="175" actId="14100"/>
+      <pc:sldChg chg="addSp delSp modSp mod">
+        <pc:chgData name="Rose Joy Angeline Padilla" userId="ecdd412207c6b092" providerId="LiveId" clId="{8A8653A4-EEE4-480C-A831-A23D8E4BA8F6}" dt="2023-06-04T03:35:48.654" v="3591" actId="338"/>
         <pc:sldMkLst>
           <pc:docMk/>
           <pc:sldMk cId="2712377923" sldId="256"/>
         </pc:sldMkLst>
-        <pc:spChg chg="add mod">
-          <ac:chgData name="Rose Joy Angeline Padilla" userId="ecdd412207c6b092" providerId="LiveId" clId="{8A8653A4-EEE4-480C-A831-A23D8E4BA8F6}" dt="2023-05-31T03:28:36.488" v="175" actId="14100"/>
+        <pc:spChg chg="add del mod">
+          <ac:chgData name="Rose Joy Angeline Padilla" userId="ecdd412207c6b092" providerId="LiveId" clId="{8A8653A4-EEE4-480C-A831-A23D8E4BA8F6}" dt="2023-06-04T02:51:16.391" v="3018" actId="478"/>
           <ac:spMkLst>
             <pc:docMk/>
             <pc:sldMk cId="2712377923" sldId="256"/>
             <ac:spMk id="26" creationId="{E1F36DEA-5B95-968F-F716-EBBB97DBF400}"/>
           </ac:spMkLst>
         </pc:spChg>
+        <pc:grpChg chg="add del mod">
+          <ac:chgData name="Rose Joy Angeline Padilla" userId="ecdd412207c6b092" providerId="LiveId" clId="{8A8653A4-EEE4-480C-A831-A23D8E4BA8F6}" dt="2023-06-04T03:14:11.981" v="3403" actId="165"/>
+          <ac:grpSpMkLst>
+            <pc:docMk/>
+            <pc:sldMk cId="2712377923" sldId="256"/>
+            <ac:grpSpMk id="3" creationId="{ACA45B5A-3717-B53B-FEE2-8D35A367DB6F}"/>
+          </ac:grpSpMkLst>
+        </pc:grpChg>
+        <pc:grpChg chg="add del mod">
+          <ac:chgData name="Rose Joy Angeline Padilla" userId="ecdd412207c6b092" providerId="LiveId" clId="{8A8653A4-EEE4-480C-A831-A23D8E4BA8F6}" dt="2023-06-04T03:35:30.345" v="3577" actId="165"/>
+          <ac:grpSpMkLst>
+            <pc:docMk/>
+            <pc:sldMk cId="2712377923" sldId="256"/>
+            <ac:grpSpMk id="4" creationId="{FBCE9B4B-C588-8876-BA3C-619035CA80A2}"/>
+          </ac:grpSpMkLst>
+        </pc:grpChg>
+        <pc:grpChg chg="add mod">
+          <ac:chgData name="Rose Joy Angeline Padilla" userId="ecdd412207c6b092" providerId="LiveId" clId="{8A8653A4-EEE4-480C-A831-A23D8E4BA8F6}" dt="2023-06-04T03:35:48.654" v="3591" actId="338"/>
+          <ac:grpSpMkLst>
+            <pc:docMk/>
+            <pc:sldMk cId="2712377923" sldId="256"/>
+            <ac:grpSpMk id="6" creationId="{2B33130B-DD05-BECC-97F2-642A12EF7A0E}"/>
+          </ac:grpSpMkLst>
+        </pc:grpChg>
         <pc:grpChg chg="mod">
           <ac:chgData name="Rose Joy Angeline Padilla" userId="ecdd412207c6b092" providerId="LiveId" clId="{8A8653A4-EEE4-480C-A831-A23D8E4BA8F6}" dt="2023-05-31T03:02:42.527" v="0" actId="164"/>
           <ac:grpSpMkLst>
@@ -153,8 +177,8 @@
             <ac:grpSpMk id="16" creationId="{8802AEF2-376C-5C66-6BC6-AB02FE3EAE9C}"/>
           </ac:grpSpMkLst>
         </pc:grpChg>
-        <pc:grpChg chg="add mod">
-          <ac:chgData name="Rose Joy Angeline Padilla" userId="ecdd412207c6b092" providerId="LiveId" clId="{8A8653A4-EEE4-480C-A831-A23D8E4BA8F6}" dt="2023-05-31T03:11:19.351" v="111" actId="1076"/>
+        <pc:grpChg chg="add del mod">
+          <ac:chgData name="Rose Joy Angeline Padilla" userId="ecdd412207c6b092" providerId="LiveId" clId="{8A8653A4-EEE4-480C-A831-A23D8E4BA8F6}" dt="2023-06-04T03:11:07.615" v="3369" actId="165"/>
           <ac:grpSpMkLst>
             <pc:docMk/>
             <pc:sldMk cId="2712377923" sldId="256"/>
@@ -177,16 +201,24 @@
             <ac:grpSpMk id="25" creationId="{50528A1E-2A20-4094-78E2-AD33CC89DC3C}"/>
           </ac:grpSpMkLst>
         </pc:grpChg>
-        <pc:picChg chg="mod">
-          <ac:chgData name="Rose Joy Angeline Padilla" userId="ecdd412207c6b092" providerId="LiveId" clId="{8A8653A4-EEE4-480C-A831-A23D8E4BA8F6}" dt="2023-05-31T03:04:18.793" v="60" actId="164"/>
+        <pc:picChg chg="add mod">
+          <ac:chgData name="Rose Joy Angeline Padilla" userId="ecdd412207c6b092" providerId="LiveId" clId="{8A8653A4-EEE4-480C-A831-A23D8E4BA8F6}" dt="2023-06-04T02:51:18.831" v="3019" actId="1076"/>
+          <ac:picMkLst>
+            <pc:docMk/>
+            <pc:sldMk cId="2712377923" sldId="256"/>
+            <ac:picMk id="2" creationId="{F78E1811-0171-71AE-C43A-FA3E75E68FEF}"/>
+          </ac:picMkLst>
+        </pc:picChg>
+        <pc:picChg chg="mod topLvl">
+          <ac:chgData name="Rose Joy Angeline Padilla" userId="ecdd412207c6b092" providerId="LiveId" clId="{8A8653A4-EEE4-480C-A831-A23D8E4BA8F6}" dt="2023-06-04T03:35:48.654" v="3591" actId="338"/>
           <ac:picMkLst>
             <pc:docMk/>
             <pc:sldMk cId="2712377923" sldId="256"/>
             <ac:picMk id="5" creationId="{907824E4-9E3D-43CD-C106-333AACD876A9}"/>
           </ac:picMkLst>
         </pc:picChg>
-        <pc:picChg chg="mod">
-          <ac:chgData name="Rose Joy Angeline Padilla" userId="ecdd412207c6b092" providerId="LiveId" clId="{8A8653A4-EEE4-480C-A831-A23D8E4BA8F6}" dt="2023-05-31T03:04:18.793" v="60" actId="164"/>
+        <pc:picChg chg="mod topLvl">
+          <ac:chgData name="Rose Joy Angeline Padilla" userId="ecdd412207c6b092" providerId="LiveId" clId="{8A8653A4-EEE4-480C-A831-A23D8E4BA8F6}" dt="2023-06-04T03:35:48.654" v="3591" actId="338"/>
           <ac:picMkLst>
             <pc:docMk/>
             <pc:sldMk cId="2712377923" sldId="256"/>
@@ -227,17 +259,33 @@
         </pc:picChg>
       </pc:sldChg>
       <pc:sldChg chg="addSp delSp modSp add mod">
-        <pc:chgData name="Rose Joy Angeline Padilla" userId="ecdd412207c6b092" providerId="LiveId" clId="{8A8653A4-EEE4-480C-A831-A23D8E4BA8F6}" dt="2023-06-03T22:53:45.963" v="2502" actId="21"/>
+        <pc:chgData name="Rose Joy Angeline Padilla" userId="ecdd412207c6b092" providerId="LiveId" clId="{8A8653A4-EEE4-480C-A831-A23D8E4BA8F6}" dt="2023-06-04T03:31:16.437" v="3576" actId="164"/>
         <pc:sldMkLst>
           <pc:docMk/>
           <pc:sldMk cId="900757665" sldId="257"/>
         </pc:sldMkLst>
         <pc:spChg chg="add mod topLvl">
-          <ac:chgData name="Rose Joy Angeline Padilla" userId="ecdd412207c6b092" providerId="LiveId" clId="{8A8653A4-EEE4-480C-A831-A23D8E4BA8F6}" dt="2023-06-03T22:38:08.685" v="2086" actId="1076"/>
+          <ac:chgData name="Rose Joy Angeline Padilla" userId="ecdd412207c6b092" providerId="LiveId" clId="{8A8653A4-EEE4-480C-A831-A23D8E4BA8F6}" dt="2023-06-04T03:31:16.437" v="3576" actId="164"/>
           <ac:spMkLst>
             <pc:docMk/>
             <pc:sldMk cId="900757665" sldId="257"/>
             <ac:spMk id="4" creationId="{55293C82-9B5F-DC86-5006-7253D2B111DF}"/>
+          </ac:spMkLst>
+        </pc:spChg>
+        <pc:spChg chg="add del">
+          <ac:chgData name="Rose Joy Angeline Padilla" userId="ecdd412207c6b092" providerId="LiveId" clId="{8A8653A4-EEE4-480C-A831-A23D8E4BA8F6}" dt="2023-06-04T02:05:17.441" v="2540" actId="11529"/>
+          <ac:spMkLst>
+            <pc:docMk/>
+            <pc:sldMk cId="900757665" sldId="257"/>
+            <ac:spMk id="9" creationId="{445CEDC8-3722-0DAA-647B-46ADF3F3B759}"/>
+          </ac:spMkLst>
+        </pc:spChg>
+        <pc:spChg chg="add del mod topLvl">
+          <ac:chgData name="Rose Joy Angeline Padilla" userId="ecdd412207c6b092" providerId="LiveId" clId="{8A8653A4-EEE4-480C-A831-A23D8E4BA8F6}" dt="2023-06-04T02:51:03.561" v="3014" actId="478"/>
+          <ac:spMkLst>
+            <pc:docMk/>
+            <pc:sldMk cId="900757665" sldId="257"/>
+            <ac:spMk id="11" creationId="{8DCABC55-AE9B-A96D-EC60-A590363E0A85}"/>
           </ac:spMkLst>
         </pc:spChg>
         <pc:spChg chg="mod">
@@ -280,6 +328,14 @@
             <ac:spMk id="15" creationId="{6107E97F-BB4A-DC34-02D4-B8CCC3819454}"/>
           </ac:spMkLst>
         </pc:spChg>
+        <pc:spChg chg="mod">
+          <ac:chgData name="Rose Joy Angeline Padilla" userId="ecdd412207c6b092" providerId="LiveId" clId="{8A8653A4-EEE4-480C-A831-A23D8E4BA8F6}" dt="2023-06-04T02:50:36.628" v="3006"/>
+          <ac:spMkLst>
+            <pc:docMk/>
+            <pc:sldMk cId="900757665" sldId="257"/>
+            <ac:spMk id="15" creationId="{D93E541E-8E64-FF3E-9D66-2DB3001D6E8F}"/>
+          </ac:spMkLst>
+        </pc:spChg>
         <pc:spChg chg="add del mod">
           <ac:chgData name="Rose Joy Angeline Padilla" userId="ecdd412207c6b092" providerId="LiveId" clId="{8A8653A4-EEE4-480C-A831-A23D8E4BA8F6}" dt="2023-06-03T21:42:25.562" v="290" actId="478"/>
           <ac:spMkLst>
@@ -313,7 +369,7 @@
           </ac:spMkLst>
         </pc:spChg>
         <pc:spChg chg="add mod topLvl">
-          <ac:chgData name="Rose Joy Angeline Padilla" userId="ecdd412207c6b092" providerId="LiveId" clId="{8A8653A4-EEE4-480C-A831-A23D8E4BA8F6}" dt="2023-06-03T22:30:59.781" v="1810" actId="164"/>
+          <ac:chgData name="Rose Joy Angeline Padilla" userId="ecdd412207c6b092" providerId="LiveId" clId="{8A8653A4-EEE4-480C-A831-A23D8E4BA8F6}" dt="2023-06-04T02:04:54.457" v="2534" actId="165"/>
           <ac:spMkLst>
             <pc:docMk/>
             <pc:sldMk cId="900757665" sldId="257"/>
@@ -321,7 +377,7 @@
           </ac:spMkLst>
         </pc:spChg>
         <pc:spChg chg="add mod topLvl">
-          <ac:chgData name="Rose Joy Angeline Padilla" userId="ecdd412207c6b092" providerId="LiveId" clId="{8A8653A4-EEE4-480C-A831-A23D8E4BA8F6}" dt="2023-06-03T22:31:52.602" v="1940" actId="164"/>
+          <ac:chgData name="Rose Joy Angeline Padilla" userId="ecdd412207c6b092" providerId="LiveId" clId="{8A8653A4-EEE4-480C-A831-A23D8E4BA8F6}" dt="2023-06-04T03:31:16.437" v="3576" actId="164"/>
           <ac:spMkLst>
             <pc:docMk/>
             <pc:sldMk cId="900757665" sldId="257"/>
@@ -329,7 +385,7 @@
           </ac:spMkLst>
         </pc:spChg>
         <pc:spChg chg="add mod topLvl">
-          <ac:chgData name="Rose Joy Angeline Padilla" userId="ecdd412207c6b092" providerId="LiveId" clId="{8A8653A4-EEE4-480C-A831-A23D8E4BA8F6}" dt="2023-06-03T22:31:52.602" v="1940" actId="164"/>
+          <ac:chgData name="Rose Joy Angeline Padilla" userId="ecdd412207c6b092" providerId="LiveId" clId="{8A8653A4-EEE4-480C-A831-A23D8E4BA8F6}" dt="2023-06-04T03:31:16.437" v="3576" actId="164"/>
           <ac:spMkLst>
             <pc:docMk/>
             <pc:sldMk cId="900757665" sldId="257"/>
@@ -337,7 +393,7 @@
           </ac:spMkLst>
         </pc:spChg>
         <pc:spChg chg="add mod topLvl">
-          <ac:chgData name="Rose Joy Angeline Padilla" userId="ecdd412207c6b092" providerId="LiveId" clId="{8A8653A4-EEE4-480C-A831-A23D8E4BA8F6}" dt="2023-06-03T22:31:52.602" v="1940" actId="164"/>
+          <ac:chgData name="Rose Joy Angeline Padilla" userId="ecdd412207c6b092" providerId="LiveId" clId="{8A8653A4-EEE4-480C-A831-A23D8E4BA8F6}" dt="2023-06-04T03:31:16.437" v="3576" actId="164"/>
           <ac:spMkLst>
             <pc:docMk/>
             <pc:sldMk cId="900757665" sldId="257"/>
@@ -345,7 +401,7 @@
           </ac:spMkLst>
         </pc:spChg>
         <pc:spChg chg="add mod topLvl">
-          <ac:chgData name="Rose Joy Angeline Padilla" userId="ecdd412207c6b092" providerId="LiveId" clId="{8A8653A4-EEE4-480C-A831-A23D8E4BA8F6}" dt="2023-06-03T22:31:52.602" v="1940" actId="164"/>
+          <ac:chgData name="Rose Joy Angeline Padilla" userId="ecdd412207c6b092" providerId="LiveId" clId="{8A8653A4-EEE4-480C-A831-A23D8E4BA8F6}" dt="2023-06-04T03:31:16.437" v="3576" actId="164"/>
           <ac:spMkLst>
             <pc:docMk/>
             <pc:sldMk cId="900757665" sldId="257"/>
@@ -361,7 +417,7 @@
           </ac:spMkLst>
         </pc:spChg>
         <pc:spChg chg="add mod topLvl">
-          <ac:chgData name="Rose Joy Angeline Padilla" userId="ecdd412207c6b092" providerId="LiveId" clId="{8A8653A4-EEE4-480C-A831-A23D8E4BA8F6}" dt="2023-06-03T22:31:52.602" v="1940" actId="164"/>
+          <ac:chgData name="Rose Joy Angeline Padilla" userId="ecdd412207c6b092" providerId="LiveId" clId="{8A8653A4-EEE4-480C-A831-A23D8E4BA8F6}" dt="2023-06-04T03:31:16.437" v="3576" actId="164"/>
           <ac:spMkLst>
             <pc:docMk/>
             <pc:sldMk cId="900757665" sldId="257"/>
@@ -376,8 +432,8 @@
             <ac:spMk id="71" creationId="{0B9F62E4-69D3-3B25-2218-86866B0DC928}"/>
           </ac:spMkLst>
         </pc:spChg>
-        <pc:spChg chg="add mod ord">
-          <ac:chgData name="Rose Joy Angeline Padilla" userId="ecdd412207c6b092" providerId="LiveId" clId="{8A8653A4-EEE4-480C-A831-A23D8E4BA8F6}" dt="2023-06-03T22:46:03.787" v="2394" actId="164"/>
+        <pc:spChg chg="add mod ord topLvl">
+          <ac:chgData name="Rose Joy Angeline Padilla" userId="ecdd412207c6b092" providerId="LiveId" clId="{8A8653A4-EEE4-480C-A831-A23D8E4BA8F6}" dt="2023-06-04T02:57:22.886" v="3129" actId="164"/>
           <ac:spMkLst>
             <pc:docMk/>
             <pc:sldMk cId="900757665" sldId="257"/>
@@ -393,11 +449,35 @@
           </ac:grpSpMkLst>
         </pc:grpChg>
         <pc:grpChg chg="add del mod">
+          <ac:chgData name="Rose Joy Angeline Padilla" userId="ecdd412207c6b092" providerId="LiveId" clId="{8A8653A4-EEE4-480C-A831-A23D8E4BA8F6}" dt="2023-06-04T02:49:04.295" v="2991" actId="165"/>
+          <ac:grpSpMkLst>
+            <pc:docMk/>
+            <pc:sldMk cId="900757665" sldId="257"/>
+            <ac:grpSpMk id="10" creationId="{732892AC-6634-F4E0-3BBE-C6FFFCAD13FA}"/>
+          </ac:grpSpMkLst>
+        </pc:grpChg>
+        <pc:grpChg chg="add del mod">
           <ac:chgData name="Rose Joy Angeline Padilla" userId="ecdd412207c6b092" providerId="LiveId" clId="{8A8653A4-EEE4-480C-A831-A23D8E4BA8F6}" dt="2023-06-03T21:39:02.073" v="221" actId="27803"/>
           <ac:grpSpMkLst>
             <pc:docMk/>
             <pc:sldMk cId="900757665" sldId="257"/>
             <ac:grpSpMk id="10" creationId="{AAFF79F0-A1A4-FB1F-1C90-80F3AE1A108D}"/>
+          </ac:grpSpMkLst>
+        </pc:grpChg>
+        <pc:grpChg chg="add del mod">
+          <ac:chgData name="Rose Joy Angeline Padilla" userId="ecdd412207c6b092" providerId="LiveId" clId="{8A8653A4-EEE4-480C-A831-A23D8E4BA8F6}" dt="2023-06-04T02:51:00.623" v="3013" actId="165"/>
+          <ac:grpSpMkLst>
+            <pc:docMk/>
+            <pc:sldMk cId="900757665" sldId="257"/>
+            <ac:grpSpMk id="12" creationId="{DDE65A7A-9409-2825-26BA-EE592D58883A}"/>
+          </ac:grpSpMkLst>
+        </pc:grpChg>
+        <pc:grpChg chg="add del mod">
+          <ac:chgData name="Rose Joy Angeline Padilla" userId="ecdd412207c6b092" providerId="LiveId" clId="{8A8653A4-EEE4-480C-A831-A23D8E4BA8F6}" dt="2023-06-04T02:50:43.682" v="3009"/>
+          <ac:grpSpMkLst>
+            <pc:docMk/>
+            <pc:sldMk cId="900757665" sldId="257"/>
+            <ac:grpSpMk id="13" creationId="{50893EBD-2F85-5A3A-B43E-4C847DE45FE8}"/>
           </ac:grpSpMkLst>
         </pc:grpChg>
         <pc:grpChg chg="del mod">
@@ -406,6 +486,22 @@
             <pc:docMk/>
             <pc:sldMk cId="900757665" sldId="257"/>
             <ac:grpSpMk id="17" creationId="{2932514E-B95A-4C18-474E-BB158D2C692C}"/>
+          </ac:grpSpMkLst>
+        </pc:grpChg>
+        <pc:grpChg chg="add mod">
+          <ac:chgData name="Rose Joy Angeline Padilla" userId="ecdd412207c6b092" providerId="LiveId" clId="{8A8653A4-EEE4-480C-A831-A23D8E4BA8F6}" dt="2023-06-04T02:57:22.886" v="3129" actId="164"/>
+          <ac:grpSpMkLst>
+            <pc:docMk/>
+            <pc:sldMk cId="900757665" sldId="257"/>
+            <ac:grpSpMk id="18" creationId="{673EE9E8-D904-A1F1-C9C1-266BB185F666}"/>
+          </ac:grpSpMkLst>
+        </pc:grpChg>
+        <pc:grpChg chg="add mod">
+          <ac:chgData name="Rose Joy Angeline Padilla" userId="ecdd412207c6b092" providerId="LiveId" clId="{8A8653A4-EEE4-480C-A831-A23D8E4BA8F6}" dt="2023-06-04T03:31:16.437" v="3576" actId="164"/>
+          <ac:grpSpMkLst>
+            <pc:docMk/>
+            <pc:sldMk cId="900757665" sldId="257"/>
+            <ac:grpSpMk id="19" creationId="{314527D1-0893-227F-95B5-9AD653A9E116}"/>
           </ac:grpSpMkLst>
         </pc:grpChg>
         <pc:grpChg chg="add mod">
@@ -449,7 +545,7 @@
           </ac:grpSpMkLst>
         </pc:grpChg>
         <pc:grpChg chg="add mod">
-          <ac:chgData name="Rose Joy Angeline Padilla" userId="ecdd412207c6b092" providerId="LiveId" clId="{8A8653A4-EEE4-480C-A831-A23D8E4BA8F6}" dt="2023-06-03T22:29:54.575" v="1697" actId="165"/>
+          <ac:chgData name="Rose Joy Angeline Padilla" userId="ecdd412207c6b092" providerId="LiveId" clId="{8A8653A4-EEE4-480C-A831-A23D8E4BA8F6}" dt="2023-06-04T03:21:06" v="3428" actId="165"/>
           <ac:grpSpMkLst>
             <pc:docMk/>
             <pc:sldMk cId="900757665" sldId="257"/>
@@ -457,7 +553,7 @@
           </ac:grpSpMkLst>
         </pc:grpChg>
         <pc:grpChg chg="add mod topLvl">
-          <ac:chgData name="Rose Joy Angeline Padilla" userId="ecdd412207c6b092" providerId="LiveId" clId="{8A8653A4-EEE4-480C-A831-A23D8E4BA8F6}" dt="2023-06-03T22:31:52.602" v="1940" actId="164"/>
+          <ac:chgData name="Rose Joy Angeline Padilla" userId="ecdd412207c6b092" providerId="LiveId" clId="{8A8653A4-EEE4-480C-A831-A23D8E4BA8F6}" dt="2023-06-04T03:31:16.437" v="3576" actId="164"/>
           <ac:grpSpMkLst>
             <pc:docMk/>
             <pc:sldMk cId="900757665" sldId="257"/>
@@ -473,7 +569,7 @@
           </ac:grpSpMkLst>
         </pc:grpChg>
         <pc:grpChg chg="add mod topLvl">
-          <ac:chgData name="Rose Joy Angeline Padilla" userId="ecdd412207c6b092" providerId="LiveId" clId="{8A8653A4-EEE4-480C-A831-A23D8E4BA8F6}" dt="2023-06-03T22:31:52.602" v="1940" actId="164"/>
+          <ac:chgData name="Rose Joy Angeline Padilla" userId="ecdd412207c6b092" providerId="LiveId" clId="{8A8653A4-EEE4-480C-A831-A23D8E4BA8F6}" dt="2023-06-04T03:31:16.437" v="3576" actId="164"/>
           <ac:grpSpMkLst>
             <pc:docMk/>
             <pc:sldMk cId="900757665" sldId="257"/>
@@ -488,8 +584,8 @@
             <ac:grpSpMk id="67" creationId="{ABFDF6DE-1C27-5B87-574E-16EF972B5736}"/>
           </ac:grpSpMkLst>
         </pc:grpChg>
-        <pc:grpChg chg="add mod ord">
-          <ac:chgData name="Rose Joy Angeline Padilla" userId="ecdd412207c6b092" providerId="LiveId" clId="{8A8653A4-EEE4-480C-A831-A23D8E4BA8F6}" dt="2023-06-03T22:46:03.787" v="2394" actId="164"/>
+        <pc:grpChg chg="add del mod ord topLvl">
+          <ac:chgData name="Rose Joy Angeline Padilla" userId="ecdd412207c6b092" providerId="LiveId" clId="{8A8653A4-EEE4-480C-A831-A23D8E4BA8F6}" dt="2023-06-04T02:04:57.092" v="2535" actId="478"/>
           <ac:grpSpMkLst>
             <pc:docMk/>
             <pc:sldMk cId="900757665" sldId="257"/>
@@ -504,30 +600,46 @@
             <ac:grpSpMk id="69" creationId="{CDAB437C-4A2A-E3A7-6BA7-3A2F3F6BFBA4}"/>
           </ac:grpSpMkLst>
         </pc:grpChg>
-        <pc:grpChg chg="add mod">
-          <ac:chgData name="Rose Joy Angeline Padilla" userId="ecdd412207c6b092" providerId="LiveId" clId="{8A8653A4-EEE4-480C-A831-A23D8E4BA8F6}" dt="2023-06-03T22:38:13.462" v="2089" actId="1076"/>
+        <pc:grpChg chg="add del mod">
+          <ac:chgData name="Rose Joy Angeline Padilla" userId="ecdd412207c6b092" providerId="LiveId" clId="{8A8653A4-EEE4-480C-A831-A23D8E4BA8F6}" dt="2023-06-04T03:21:06" v="3428" actId="165"/>
           <ac:grpSpMkLst>
             <pc:docMk/>
             <pc:sldMk cId="900757665" sldId="257"/>
             <ac:grpSpMk id="73" creationId="{3E5B5ADC-CFAE-5F45-70EB-A6BDB89AE105}"/>
           </ac:grpSpMkLst>
         </pc:grpChg>
-        <pc:grpChg chg="add mod">
-          <ac:chgData name="Rose Joy Angeline Padilla" userId="ecdd412207c6b092" providerId="LiveId" clId="{8A8653A4-EEE4-480C-A831-A23D8E4BA8F6}" dt="2023-06-03T22:52:03.722" v="2501" actId="164"/>
+        <pc:grpChg chg="add del mod topLvl">
+          <ac:chgData name="Rose Joy Angeline Padilla" userId="ecdd412207c6b092" providerId="LiveId" clId="{8A8653A4-EEE4-480C-A831-A23D8E4BA8F6}" dt="2023-06-04T02:04:54.457" v="2534" actId="165"/>
           <ac:grpSpMkLst>
             <pc:docMk/>
             <pc:sldMk cId="900757665" sldId="257"/>
             <ac:grpSpMk id="75" creationId="{1AC56FFE-0E44-ACAA-2F09-9CB36B2822AC}"/>
           </ac:grpSpMkLst>
         </pc:grpChg>
-        <pc:grpChg chg="add mod">
-          <ac:chgData name="Rose Joy Angeline Padilla" userId="ecdd412207c6b092" providerId="LiveId" clId="{8A8653A4-EEE4-480C-A831-A23D8E4BA8F6}" dt="2023-06-03T22:52:03.722" v="2501" actId="164"/>
+        <pc:grpChg chg="add del mod">
+          <ac:chgData name="Rose Joy Angeline Padilla" userId="ecdd412207c6b092" providerId="LiveId" clId="{8A8653A4-EEE4-480C-A831-A23D8E4BA8F6}" dt="2023-06-04T02:01:55.695" v="2505" actId="165"/>
           <ac:grpSpMkLst>
             <pc:docMk/>
             <pc:sldMk cId="900757665" sldId="257"/>
             <ac:grpSpMk id="80" creationId="{EE4AA5E3-0369-4E86-0F28-FFCC0A053BE8}"/>
           </ac:grpSpMkLst>
         </pc:grpChg>
+        <pc:picChg chg="add del mod">
+          <ac:chgData name="Rose Joy Angeline Padilla" userId="ecdd412207c6b092" providerId="LiveId" clId="{8A8653A4-EEE4-480C-A831-A23D8E4BA8F6}" dt="2023-06-04T02:02:00.769" v="2507" actId="478"/>
+          <ac:picMkLst>
+            <pc:docMk/>
+            <pc:sldMk cId="900757665" sldId="257"/>
+            <ac:picMk id="2" creationId="{9B98C3D0-D536-B31B-4235-92C11C88C449}"/>
+          </ac:picMkLst>
+        </pc:picChg>
+        <pc:picChg chg="add del mod">
+          <ac:chgData name="Rose Joy Angeline Padilla" userId="ecdd412207c6b092" providerId="LiveId" clId="{8A8653A4-EEE4-480C-A831-A23D8E4BA8F6}" dt="2023-06-04T02:02:00.769" v="2507" actId="478"/>
+          <ac:picMkLst>
+            <pc:docMk/>
+            <pc:sldMk cId="900757665" sldId="257"/>
+            <ac:picMk id="3" creationId="{BEBBB8A2-A771-E31A-CA44-4D7D5B0648A0}"/>
+          </ac:picMkLst>
+        </pc:picChg>
         <pc:picChg chg="add del mod topLvl">
           <ac:chgData name="Rose Joy Angeline Padilla" userId="ecdd412207c6b092" providerId="LiveId" clId="{8A8653A4-EEE4-480C-A831-A23D8E4BA8F6}" dt="2023-06-03T22:03:40.289" v="920" actId="478"/>
           <ac:picMkLst>
@@ -544,12 +656,28 @@
             <ac:picMk id="5" creationId="{907824E4-9E3D-43CD-C106-333AACD876A9}"/>
           </ac:picMkLst>
         </pc:picChg>
+        <pc:picChg chg="add del mod">
+          <ac:chgData name="Rose Joy Angeline Padilla" userId="ecdd412207c6b092" providerId="LiveId" clId="{8A8653A4-EEE4-480C-A831-A23D8E4BA8F6}" dt="2023-06-04T02:04:44.754" v="2531"/>
+          <ac:picMkLst>
+            <pc:docMk/>
+            <pc:sldMk cId="900757665" sldId="257"/>
+            <ac:picMk id="6" creationId="{1BF723AC-4F65-33AA-E50A-6C1288BBF050}"/>
+          </ac:picMkLst>
+        </pc:picChg>
         <pc:picChg chg="del mod topLvl">
           <ac:chgData name="Rose Joy Angeline Padilla" userId="ecdd412207c6b092" providerId="LiveId" clId="{8A8653A4-EEE4-480C-A831-A23D8E4BA8F6}" dt="2023-06-03T21:47:03.513" v="604" actId="478"/>
           <ac:picMkLst>
             <pc:docMk/>
             <pc:sldMk cId="900757665" sldId="257"/>
             <ac:picMk id="7" creationId="{DAD80A57-0AB4-0C83-50CF-4487C7E86293}"/>
+          </ac:picMkLst>
+        </pc:picChg>
+        <pc:picChg chg="add del mod ord topLvl">
+          <ac:chgData name="Rose Joy Angeline Padilla" userId="ecdd412207c6b092" providerId="LiveId" clId="{8A8653A4-EEE4-480C-A831-A23D8E4BA8F6}" dt="2023-06-04T02:51:08.527" v="3015" actId="21"/>
+          <ac:picMkLst>
+            <pc:docMk/>
+            <pc:sldMk cId="900757665" sldId="257"/>
+            <ac:picMk id="8" creationId="{339E3D82-5128-2DBC-BD59-A782AEAE24E9}"/>
           </ac:picMkLst>
         </pc:picChg>
         <pc:picChg chg="add del mod ord topLvl">
@@ -560,6 +688,30 @@
             <ac:picMk id="9" creationId="{A0131655-D1C2-A1A9-B639-9217AAEFD1F8}"/>
           </ac:picMkLst>
         </pc:picChg>
+        <pc:picChg chg="mod">
+          <ac:chgData name="Rose Joy Angeline Padilla" userId="ecdd412207c6b092" providerId="LiveId" clId="{8A8653A4-EEE4-480C-A831-A23D8E4BA8F6}" dt="2023-06-04T02:50:36.628" v="3006"/>
+          <ac:picMkLst>
+            <pc:docMk/>
+            <pc:sldMk cId="900757665" sldId="257"/>
+            <ac:picMk id="14" creationId="{B8F4ABA5-1428-0D5C-6AC7-3523EA021A54}"/>
+          </ac:picMkLst>
+        </pc:picChg>
+        <pc:picChg chg="add mod">
+          <ac:chgData name="Rose Joy Angeline Padilla" userId="ecdd412207c6b092" providerId="LiveId" clId="{8A8653A4-EEE4-480C-A831-A23D8E4BA8F6}" dt="2023-06-04T02:51:25.308" v="3021" actId="1076"/>
+          <ac:picMkLst>
+            <pc:docMk/>
+            <pc:sldMk cId="900757665" sldId="257"/>
+            <ac:picMk id="16" creationId="{399DFDD8-1685-B1EB-9A0C-D3DBFE1D35F6}"/>
+          </ac:picMkLst>
+        </pc:picChg>
+        <pc:picChg chg="add mod ord">
+          <ac:chgData name="Rose Joy Angeline Padilla" userId="ecdd412207c6b092" providerId="LiveId" clId="{8A8653A4-EEE4-480C-A831-A23D8E4BA8F6}" dt="2023-06-04T02:57:22.886" v="3129" actId="164"/>
+          <ac:picMkLst>
+            <pc:docMk/>
+            <pc:sldMk cId="900757665" sldId="257"/>
+            <ac:picMk id="17" creationId="{30793041-93FD-8982-269D-95F7BD0A3FB7}"/>
+          </ac:picMkLst>
+        </pc:picChg>
         <pc:picChg chg="add mod">
           <ac:chgData name="Rose Joy Angeline Padilla" userId="ecdd412207c6b092" providerId="LiveId" clId="{8A8653A4-EEE4-480C-A831-A23D8E4BA8F6}" dt="2023-06-03T21:41:13.702" v="273" actId="164"/>
           <ac:picMkLst>
@@ -569,7 +721,7 @@
           </ac:picMkLst>
         </pc:picChg>
         <pc:picChg chg="add mod">
-          <ac:chgData name="Rose Joy Angeline Padilla" userId="ecdd412207c6b092" providerId="LiveId" clId="{8A8653A4-EEE4-480C-A831-A23D8E4BA8F6}" dt="2023-06-03T22:29:54.575" v="1697" actId="165"/>
+          <ac:chgData name="Rose Joy Angeline Padilla" userId="ecdd412207c6b092" providerId="LiveId" clId="{8A8653A4-EEE4-480C-A831-A23D8E4BA8F6}" dt="2023-06-04T03:21:06" v="3428" actId="165"/>
           <ac:picMkLst>
             <pc:docMk/>
             <pc:sldMk cId="900757665" sldId="257"/>
@@ -585,7 +737,7 @@
           </ac:picMkLst>
         </pc:picChg>
         <pc:picChg chg="add mod">
-          <ac:chgData name="Rose Joy Angeline Padilla" userId="ecdd412207c6b092" providerId="LiveId" clId="{8A8653A4-EEE4-480C-A831-A23D8E4BA8F6}" dt="2023-06-03T22:29:54.575" v="1697" actId="165"/>
+          <ac:chgData name="Rose Joy Angeline Padilla" userId="ecdd412207c6b092" providerId="LiveId" clId="{8A8653A4-EEE4-480C-A831-A23D8E4BA8F6}" dt="2023-06-04T03:21:06" v="3428" actId="165"/>
           <ac:picMkLst>
             <pc:docMk/>
             <pc:sldMk cId="900757665" sldId="257"/>
@@ -609,7 +761,7 @@
           </ac:picMkLst>
         </pc:picChg>
         <pc:picChg chg="add mod">
-          <ac:chgData name="Rose Joy Angeline Padilla" userId="ecdd412207c6b092" providerId="LiveId" clId="{8A8653A4-EEE4-480C-A831-A23D8E4BA8F6}" dt="2023-06-03T22:29:54.575" v="1697" actId="165"/>
+          <ac:chgData name="Rose Joy Angeline Padilla" userId="ecdd412207c6b092" providerId="LiveId" clId="{8A8653A4-EEE4-480C-A831-A23D8E4BA8F6}" dt="2023-06-04T03:21:06" v="3428" actId="165"/>
           <ac:picMkLst>
             <pc:docMk/>
             <pc:sldMk cId="900757665" sldId="257"/>
@@ -617,7 +769,7 @@
           </ac:picMkLst>
         </pc:picChg>
         <pc:picChg chg="add mod">
-          <ac:chgData name="Rose Joy Angeline Padilla" userId="ecdd412207c6b092" providerId="LiveId" clId="{8A8653A4-EEE4-480C-A831-A23D8E4BA8F6}" dt="2023-06-03T22:29:54.575" v="1697" actId="165"/>
+          <ac:chgData name="Rose Joy Angeline Padilla" userId="ecdd412207c6b092" providerId="LiveId" clId="{8A8653A4-EEE4-480C-A831-A23D8E4BA8F6}" dt="2023-06-04T03:21:06" v="3428" actId="165"/>
           <ac:picMkLst>
             <pc:docMk/>
             <pc:sldMk cId="900757665" sldId="257"/>
@@ -625,7 +777,7 @@
           </ac:picMkLst>
         </pc:picChg>
         <pc:picChg chg="add mod topLvl">
-          <ac:chgData name="Rose Joy Angeline Padilla" userId="ecdd412207c6b092" providerId="LiveId" clId="{8A8653A4-EEE4-480C-A831-A23D8E4BA8F6}" dt="2023-06-03T22:30:59.781" v="1810" actId="164"/>
+          <ac:chgData name="Rose Joy Angeline Padilla" userId="ecdd412207c6b092" providerId="LiveId" clId="{8A8653A4-EEE4-480C-A831-A23D8E4BA8F6}" dt="2023-06-04T02:04:54.457" v="2534" actId="165"/>
           <ac:picMkLst>
             <pc:docMk/>
             <pc:sldMk cId="900757665" sldId="257"/>
@@ -664,8 +816,8 @@
             <ac:picMk id="54" creationId="{A8680BD8-AEF2-8082-5237-CFF2A6C35B5F}"/>
           </ac:picMkLst>
         </pc:picChg>
-        <pc:picChg chg="add mod topLvl">
-          <ac:chgData name="Rose Joy Angeline Padilla" userId="ecdd412207c6b092" providerId="LiveId" clId="{8A8653A4-EEE4-480C-A831-A23D8E4BA8F6}" dt="2023-06-03T22:31:52.602" v="1940" actId="164"/>
+        <pc:picChg chg="add del mod topLvl">
+          <ac:chgData name="Rose Joy Angeline Padilla" userId="ecdd412207c6b092" providerId="LiveId" clId="{8A8653A4-EEE4-480C-A831-A23D8E4BA8F6}" dt="2023-06-04T03:21:09.709" v="3429" actId="478"/>
           <ac:picMkLst>
             <pc:docMk/>
             <pc:sldMk cId="900757665" sldId="257"/>
@@ -673,7 +825,7 @@
           </ac:picMkLst>
         </pc:picChg>
         <pc:picChg chg="add mod">
-          <ac:chgData name="Rose Joy Angeline Padilla" userId="ecdd412207c6b092" providerId="LiveId" clId="{8A8653A4-EEE4-480C-A831-A23D8E4BA8F6}" dt="2023-06-03T22:29:54.575" v="1697" actId="165"/>
+          <ac:chgData name="Rose Joy Angeline Padilla" userId="ecdd412207c6b092" providerId="LiveId" clId="{8A8653A4-EEE4-480C-A831-A23D8E4BA8F6}" dt="2023-06-04T03:21:06" v="3428" actId="165"/>
           <ac:picMkLst>
             <pc:docMk/>
             <pc:sldMk cId="900757665" sldId="257"/>
@@ -696,45 +848,341 @@
             <ac:picMk id="70" creationId="{2FCA6E23-6E6A-B500-949A-5094B3431793}"/>
           </ac:picMkLst>
         </pc:picChg>
-        <pc:picChg chg="add mod ord">
-          <ac:chgData name="Rose Joy Angeline Padilla" userId="ecdd412207c6b092" providerId="LiveId" clId="{8A8653A4-EEE4-480C-A831-A23D8E4BA8F6}" dt="2023-06-03T22:31:52.602" v="1940" actId="164"/>
+        <pc:picChg chg="add mod ord topLvl">
+          <ac:chgData name="Rose Joy Angeline Padilla" userId="ecdd412207c6b092" providerId="LiveId" clId="{8A8653A4-EEE4-480C-A831-A23D8E4BA8F6}" dt="2023-06-04T03:31:16.437" v="3576" actId="164"/>
           <ac:picMkLst>
             <pc:docMk/>
             <pc:sldMk cId="900757665" sldId="257"/>
             <ac:picMk id="72" creationId="{2FCEE5F4-77E2-27C4-6462-898FDE47A0C3}"/>
           </ac:picMkLst>
         </pc:picChg>
-        <pc:picChg chg="add mod">
-          <ac:chgData name="Rose Joy Angeline Padilla" userId="ecdd412207c6b092" providerId="LiveId" clId="{8A8653A4-EEE4-480C-A831-A23D8E4BA8F6}" dt="2023-06-03T22:52:03.722" v="2501" actId="164"/>
+        <pc:picChg chg="add del mod topLvl">
+          <ac:chgData name="Rose Joy Angeline Padilla" userId="ecdd412207c6b092" providerId="LiveId" clId="{8A8653A4-EEE4-480C-A831-A23D8E4BA8F6}" dt="2023-06-04T02:02:05.883" v="2508" actId="478"/>
           <ac:picMkLst>
             <pc:docMk/>
             <pc:sldMk cId="900757665" sldId="257"/>
             <ac:picMk id="77" creationId="{60029FD9-737C-AE5E-DBD0-D63E71F9927C}"/>
           </ac:picMkLst>
         </pc:picChg>
-        <pc:picChg chg="add mod">
-          <ac:chgData name="Rose Joy Angeline Padilla" userId="ecdd412207c6b092" providerId="LiveId" clId="{8A8653A4-EEE4-480C-A831-A23D8E4BA8F6}" dt="2023-06-03T22:52:03.722" v="2501" actId="164"/>
+        <pc:picChg chg="add del mod topLvl">
+          <ac:chgData name="Rose Joy Angeline Padilla" userId="ecdd412207c6b092" providerId="LiveId" clId="{8A8653A4-EEE4-480C-A831-A23D8E4BA8F6}" dt="2023-06-04T02:02:05.883" v="2508" actId="478"/>
           <ac:picMkLst>
             <pc:docMk/>
             <pc:sldMk cId="900757665" sldId="257"/>
             <ac:picMk id="79" creationId="{4C712D11-F68B-9B08-62D6-E72A13145CF0}"/>
           </ac:picMkLst>
         </pc:picChg>
+        <pc:picChg chg="add mod">
+          <ac:chgData name="Rose Joy Angeline Padilla" userId="ecdd412207c6b092" providerId="LiveId" clId="{8A8653A4-EEE4-480C-A831-A23D8E4BA8F6}" dt="2023-06-04T03:16:45.178" v="3422" actId="1367"/>
+          <ac:picMkLst>
+            <pc:docMk/>
+            <pc:sldMk cId="900757665" sldId="257"/>
+            <ac:picMk id="2050" creationId="{C8A0AA91-C594-6201-616C-4E388E0500CF}"/>
+          </ac:picMkLst>
+        </pc:picChg>
+        <pc:picChg chg="add del mod">
+          <ac:chgData name="Rose Joy Angeline Padilla" userId="ecdd412207c6b092" providerId="LiveId" clId="{8A8653A4-EEE4-480C-A831-A23D8E4BA8F6}" dt="2023-06-04T03:28:29.284" v="3481" actId="478"/>
+          <ac:picMkLst>
+            <pc:docMk/>
+            <pc:sldMk cId="900757665" sldId="257"/>
+            <ac:picMk id="2052" creationId="{6583D379-EAFC-93EE-9649-E8C41F6E57BA}"/>
+          </ac:picMkLst>
+        </pc:picChg>
+        <pc:picChg chg="add mod">
+          <ac:chgData name="Rose Joy Angeline Padilla" userId="ecdd412207c6b092" providerId="LiveId" clId="{8A8653A4-EEE4-480C-A831-A23D8E4BA8F6}" dt="2023-06-04T03:31:16.437" v="3576" actId="164"/>
+          <ac:picMkLst>
+            <pc:docMk/>
+            <pc:sldMk cId="900757665" sldId="257"/>
+            <ac:picMk id="2054" creationId="{227A2379-0EBA-D0CD-66B6-06A8CA7AAF8A}"/>
+          </ac:picMkLst>
+        </pc:picChg>
       </pc:sldChg>
-      <pc:sldChg chg="modSp add mod">
-        <pc:chgData name="Rose Joy Angeline Padilla" userId="ecdd412207c6b092" providerId="LiveId" clId="{8A8653A4-EEE4-480C-A831-A23D8E4BA8F6}" dt="2023-06-03T22:54:09.082" v="2504" actId="1076"/>
+      <pc:sldChg chg="addSp delSp modSp add mod">
+        <pc:chgData name="Rose Joy Angeline Padilla" userId="ecdd412207c6b092" providerId="LiveId" clId="{8A8653A4-EEE4-480C-A831-A23D8E4BA8F6}" dt="2023-06-04T03:15:25.337" v="3421" actId="1076"/>
         <pc:sldMkLst>
           <pc:docMk/>
           <pc:sldMk cId="3486530727" sldId="258"/>
         </pc:sldMkLst>
+        <pc:spChg chg="mod">
+          <ac:chgData name="Rose Joy Angeline Padilla" userId="ecdd412207c6b092" providerId="LiveId" clId="{8A8653A4-EEE4-480C-A831-A23D8E4BA8F6}" dt="2023-06-04T02:14:27.104" v="2617" actId="1036"/>
+          <ac:spMkLst>
+            <pc:docMk/>
+            <pc:sldMk cId="3486530727" sldId="258"/>
+            <ac:spMk id="5" creationId="{8E6CC056-327D-9D0E-44D9-1F5B6177CE21}"/>
+          </ac:spMkLst>
+        </pc:spChg>
+        <pc:spChg chg="mod">
+          <ac:chgData name="Rose Joy Angeline Padilla" userId="ecdd412207c6b092" providerId="LiveId" clId="{8A8653A4-EEE4-480C-A831-A23D8E4BA8F6}" dt="2023-06-04T02:14:37.671" v="2618"/>
+          <ac:spMkLst>
+            <pc:docMk/>
+            <pc:sldMk cId="3486530727" sldId="258"/>
+            <ac:spMk id="8" creationId="{127B34EC-3876-66EB-3CD6-CC5C0DEFCA7B}"/>
+          </ac:spMkLst>
+        </pc:spChg>
+        <pc:spChg chg="add mod">
+          <ac:chgData name="Rose Joy Angeline Padilla" userId="ecdd412207c6b092" providerId="LiveId" clId="{8A8653A4-EEE4-480C-A831-A23D8E4BA8F6}" dt="2023-06-04T02:15:21.340" v="2627" actId="571"/>
+          <ac:spMkLst>
+            <pc:docMk/>
+            <pc:sldMk cId="3486530727" sldId="258"/>
+            <ac:spMk id="10" creationId="{01759C3E-CF24-1C6D-F355-5D7400401785}"/>
+          </ac:spMkLst>
+        </pc:spChg>
+        <pc:spChg chg="add mod">
+          <ac:chgData name="Rose Joy Angeline Padilla" userId="ecdd412207c6b092" providerId="LiveId" clId="{8A8653A4-EEE4-480C-A831-A23D8E4BA8F6}" dt="2023-06-04T02:15:21.340" v="2627" actId="571"/>
+          <ac:spMkLst>
+            <pc:docMk/>
+            <pc:sldMk cId="3486530727" sldId="258"/>
+            <ac:spMk id="11" creationId="{F3295FCB-E63D-DE02-8D58-CADDBD02EF0A}"/>
+          </ac:spMkLst>
+        </pc:spChg>
+        <pc:spChg chg="add del mod">
+          <ac:chgData name="Rose Joy Angeline Padilla" userId="ecdd412207c6b092" providerId="LiveId" clId="{8A8653A4-EEE4-480C-A831-A23D8E4BA8F6}" dt="2023-06-04T02:15:30.725" v="2652"/>
+          <ac:spMkLst>
+            <pc:docMk/>
+            <pc:sldMk cId="3486530727" sldId="258"/>
+            <ac:spMk id="12" creationId="{B9A5819C-D64D-253F-E395-D854E7D4FBE3}"/>
+          </ac:spMkLst>
+        </pc:spChg>
+        <pc:spChg chg="add del mod">
+          <ac:chgData name="Rose Joy Angeline Padilla" userId="ecdd412207c6b092" providerId="LiveId" clId="{8A8653A4-EEE4-480C-A831-A23D8E4BA8F6}" dt="2023-06-04T02:15:30.725" v="2652"/>
+          <ac:spMkLst>
+            <pc:docMk/>
+            <pc:sldMk cId="3486530727" sldId="258"/>
+            <ac:spMk id="13" creationId="{8448784F-03D6-F62C-A027-594E9F84726C}"/>
+          </ac:spMkLst>
+        </pc:spChg>
+        <pc:spChg chg="add mod topLvl">
+          <ac:chgData name="Rose Joy Angeline Padilla" userId="ecdd412207c6b092" providerId="LiveId" clId="{8A8653A4-EEE4-480C-A831-A23D8E4BA8F6}" dt="2023-06-04T03:15:25.337" v="3421" actId="1076"/>
+          <ac:spMkLst>
+            <pc:docMk/>
+            <pc:sldMk cId="3486530727" sldId="258"/>
+            <ac:spMk id="14" creationId="{DDE57065-E1A8-659A-461A-B73761C831A7}"/>
+          </ac:spMkLst>
+        </pc:spChg>
+        <pc:spChg chg="add mod">
+          <ac:chgData name="Rose Joy Angeline Padilla" userId="ecdd412207c6b092" providerId="LiveId" clId="{8A8653A4-EEE4-480C-A831-A23D8E4BA8F6}" dt="2023-06-04T03:15:25.337" v="3421" actId="1076"/>
+          <ac:spMkLst>
+            <pc:docMk/>
+            <pc:sldMk cId="3486530727" sldId="258"/>
+            <ac:spMk id="15" creationId="{04AA899D-E777-3857-2A5D-31DEE4490F6C}"/>
+          </ac:spMkLst>
+        </pc:spChg>
+        <pc:spChg chg="add mod">
+          <ac:chgData name="Rose Joy Angeline Padilla" userId="ecdd412207c6b092" providerId="LiveId" clId="{8A8653A4-EEE4-480C-A831-A23D8E4BA8F6}" dt="2023-06-04T03:15:25.337" v="3421" actId="1076"/>
+          <ac:spMkLst>
+            <pc:docMk/>
+            <pc:sldMk cId="3486530727" sldId="258"/>
+            <ac:spMk id="17" creationId="{7839445B-FB40-C419-0124-0045E617F92B}"/>
+          </ac:spMkLst>
+        </pc:spChg>
+        <pc:spChg chg="add mod">
+          <ac:chgData name="Rose Joy Angeline Padilla" userId="ecdd412207c6b092" providerId="LiveId" clId="{8A8653A4-EEE4-480C-A831-A23D8E4BA8F6}" dt="2023-06-04T02:36:06.368" v="2882" actId="571"/>
+          <ac:spMkLst>
+            <pc:docMk/>
+            <pc:sldMk cId="3486530727" sldId="258"/>
+            <ac:spMk id="19" creationId="{C16D87CE-6EA6-ADDE-8C4F-4624D7D984A3}"/>
+          </ac:spMkLst>
+        </pc:spChg>
+        <pc:spChg chg="mod">
+          <ac:chgData name="Rose Joy Angeline Padilla" userId="ecdd412207c6b092" providerId="LiveId" clId="{8A8653A4-EEE4-480C-A831-A23D8E4BA8F6}" dt="2023-06-04T02:36:06.368" v="2882" actId="571"/>
+          <ac:spMkLst>
+            <pc:docMk/>
+            <pc:sldMk cId="3486530727" sldId="258"/>
+            <ac:spMk id="21" creationId="{5CCB387F-B084-6565-31CA-E51DA2660FF8}"/>
+          </ac:spMkLst>
+        </pc:spChg>
+        <pc:spChg chg="mod">
+          <ac:chgData name="Rose Joy Angeline Padilla" userId="ecdd412207c6b092" providerId="LiveId" clId="{8A8653A4-EEE4-480C-A831-A23D8E4BA8F6}" dt="2023-06-04T02:36:06.368" v="2882" actId="571"/>
+          <ac:spMkLst>
+            <pc:docMk/>
+            <pc:sldMk cId="3486530727" sldId="258"/>
+            <ac:spMk id="22" creationId="{32B390EA-C918-98ED-FEEC-BC659B3EC1D6}"/>
+          </ac:spMkLst>
+        </pc:spChg>
+        <pc:spChg chg="add mod topLvl">
+          <ac:chgData name="Rose Joy Angeline Padilla" userId="ecdd412207c6b092" providerId="LiveId" clId="{8A8653A4-EEE4-480C-A831-A23D8E4BA8F6}" dt="2023-06-04T03:15:25.337" v="3421" actId="1076"/>
+          <ac:spMkLst>
+            <pc:docMk/>
+            <pc:sldMk cId="3486530727" sldId="258"/>
+            <ac:spMk id="25" creationId="{FDD9F5A7-24FE-839E-19B1-54A4DEFD95B0}"/>
+          </ac:spMkLst>
+        </pc:spChg>
+        <pc:spChg chg="mod">
+          <ac:chgData name="Rose Joy Angeline Padilla" userId="ecdd412207c6b092" providerId="LiveId" clId="{8A8653A4-EEE4-480C-A831-A23D8E4BA8F6}" dt="2023-06-04T02:15:21.340" v="2627" actId="571"/>
+          <ac:spMkLst>
+            <pc:docMk/>
+            <pc:sldMk cId="3486530727" sldId="258"/>
+            <ac:spMk id="45" creationId="{194AE3F0-18DC-2F33-3074-BAEDF2EE3988}"/>
+          </ac:spMkLst>
+        </pc:spChg>
+        <pc:spChg chg="mod">
+          <ac:chgData name="Rose Joy Angeline Padilla" userId="ecdd412207c6b092" providerId="LiveId" clId="{8A8653A4-EEE4-480C-A831-A23D8E4BA8F6}" dt="2023-06-04T02:15:31.691" v="2653" actId="1076"/>
+          <ac:spMkLst>
+            <pc:docMk/>
+            <pc:sldMk cId="3486530727" sldId="258"/>
+            <ac:spMk id="74" creationId="{0F385419-8445-4148-EBC0-46222A220333}"/>
+          </ac:spMkLst>
+        </pc:spChg>
+        <pc:grpChg chg="add del mod">
+          <ac:chgData name="Rose Joy Angeline Padilla" userId="ecdd412207c6b092" providerId="LiveId" clId="{8A8653A4-EEE4-480C-A831-A23D8E4BA8F6}" dt="2023-06-04T02:14:46.708" v="2623" actId="478"/>
+          <ac:grpSpMkLst>
+            <pc:docMk/>
+            <pc:sldMk cId="3486530727" sldId="258"/>
+            <ac:grpSpMk id="2" creationId="{70C0CDB0-0421-3209-8C6A-9325ED9141E3}"/>
+          </ac:grpSpMkLst>
+        </pc:grpChg>
+        <pc:grpChg chg="add del mod">
+          <ac:chgData name="Rose Joy Angeline Padilla" userId="ecdd412207c6b092" providerId="LiveId" clId="{8A8653A4-EEE4-480C-A831-A23D8E4BA8F6}" dt="2023-06-04T02:14:40.443" v="2621"/>
+          <ac:grpSpMkLst>
+            <pc:docMk/>
+            <pc:sldMk cId="3486530727" sldId="258"/>
+            <ac:grpSpMk id="6" creationId="{9A761EF0-B31B-2250-9F88-EA78BEC72703}"/>
+          </ac:grpSpMkLst>
+        </pc:grpChg>
+        <pc:grpChg chg="add mod topLvl">
+          <ac:chgData name="Rose Joy Angeline Padilla" userId="ecdd412207c6b092" providerId="LiveId" clId="{8A8653A4-EEE4-480C-A831-A23D8E4BA8F6}" dt="2023-06-04T03:15:25.337" v="3421" actId="1076"/>
+          <ac:grpSpMkLst>
+            <pc:docMk/>
+            <pc:sldMk cId="3486530727" sldId="258"/>
+            <ac:grpSpMk id="18" creationId="{52D6BA2F-B3DA-FC56-0D3D-F4CEC9AC92CA}"/>
+          </ac:grpSpMkLst>
+        </pc:grpChg>
+        <pc:grpChg chg="add mod">
+          <ac:chgData name="Rose Joy Angeline Padilla" userId="ecdd412207c6b092" providerId="LiveId" clId="{8A8653A4-EEE4-480C-A831-A23D8E4BA8F6}" dt="2023-06-04T02:36:06.368" v="2882" actId="571"/>
+          <ac:grpSpMkLst>
+            <pc:docMk/>
+            <pc:sldMk cId="3486530727" sldId="258"/>
+            <ac:grpSpMk id="20" creationId="{8F34F25D-1CE9-6A72-5513-08AB08DD35EE}"/>
+          </ac:grpSpMkLst>
+        </pc:grpChg>
+        <pc:grpChg chg="add del mod">
+          <ac:chgData name="Rose Joy Angeline Padilla" userId="ecdd412207c6b092" providerId="LiveId" clId="{8A8653A4-EEE4-480C-A831-A23D8E4BA8F6}" dt="2023-06-04T03:01:13.902" v="3132" actId="165"/>
+          <ac:grpSpMkLst>
+            <pc:docMk/>
+            <pc:sldMk cId="3486530727" sldId="258"/>
+            <ac:grpSpMk id="26" creationId="{873BE0B4-A906-6B66-88BB-0FD58E103038}"/>
+          </ac:grpSpMkLst>
+        </pc:grpChg>
+        <pc:grpChg chg="add mod">
+          <ac:chgData name="Rose Joy Angeline Padilla" userId="ecdd412207c6b092" providerId="LiveId" clId="{8A8653A4-EEE4-480C-A831-A23D8E4BA8F6}" dt="2023-06-04T03:15:25.337" v="3421" actId="1076"/>
+          <ac:grpSpMkLst>
+            <pc:docMk/>
+            <pc:sldMk cId="3486530727" sldId="258"/>
+            <ac:grpSpMk id="28" creationId="{800BA599-BFAD-17D6-5463-5AA75A240A76}"/>
+          </ac:grpSpMkLst>
+        </pc:grpChg>
         <pc:grpChg chg="mod">
-          <ac:chgData name="Rose Joy Angeline Padilla" userId="ecdd412207c6b092" providerId="LiveId" clId="{8A8653A4-EEE4-480C-A831-A23D8E4BA8F6}" dt="2023-06-03T22:54:09.082" v="2504" actId="1076"/>
+          <ac:chgData name="Rose Joy Angeline Padilla" userId="ecdd412207c6b092" providerId="LiveId" clId="{8A8653A4-EEE4-480C-A831-A23D8E4BA8F6}" dt="2023-06-04T02:15:21.340" v="2627" actId="571"/>
+          <ac:grpSpMkLst>
+            <pc:docMk/>
+            <pc:sldMk cId="3486530727" sldId="258"/>
+            <ac:grpSpMk id="68" creationId="{37F85369-EC0C-BFBB-E697-2645F6897737}"/>
+          </ac:grpSpMkLst>
+        </pc:grpChg>
+        <pc:grpChg chg="del">
+          <ac:chgData name="Rose Joy Angeline Padilla" userId="ecdd412207c6b092" providerId="LiveId" clId="{8A8653A4-EEE4-480C-A831-A23D8E4BA8F6}" dt="2023-06-04T02:13:41.860" v="2606" actId="478"/>
+          <ac:grpSpMkLst>
+            <pc:docMk/>
+            <pc:sldMk cId="3486530727" sldId="258"/>
+            <ac:grpSpMk id="73" creationId="{3E5B5ADC-CFAE-5F45-70EB-A6BDB89AE105}"/>
+          </ac:grpSpMkLst>
+        </pc:grpChg>
+        <pc:grpChg chg="mod">
+          <ac:chgData name="Rose Joy Angeline Padilla" userId="ecdd412207c6b092" providerId="LiveId" clId="{8A8653A4-EEE4-480C-A831-A23D8E4BA8F6}" dt="2023-06-04T02:15:21.340" v="2627" actId="571"/>
+          <ac:grpSpMkLst>
+            <pc:docMk/>
+            <pc:sldMk cId="3486530727" sldId="258"/>
+            <ac:grpSpMk id="75" creationId="{1AC56FFE-0E44-ACAA-2F09-9CB36B2822AC}"/>
+          </ac:grpSpMkLst>
+        </pc:grpChg>
+        <pc:grpChg chg="mod">
+          <ac:chgData name="Rose Joy Angeline Padilla" userId="ecdd412207c6b092" providerId="LiveId" clId="{8A8653A4-EEE4-480C-A831-A23D8E4BA8F6}" dt="2023-06-04T02:42:22.010" v="2966" actId="1076"/>
           <ac:grpSpMkLst>
             <pc:docMk/>
             <pc:sldMk cId="3486530727" sldId="258"/>
             <ac:grpSpMk id="80" creationId="{EE4AA5E3-0369-4E86-0F28-FFCC0A053BE8}"/>
           </ac:grpSpMkLst>
         </pc:grpChg>
+        <pc:graphicFrameChg chg="add del mod">
+          <ac:chgData name="Rose Joy Angeline Padilla" userId="ecdd412207c6b092" providerId="LiveId" clId="{8A8653A4-EEE4-480C-A831-A23D8E4BA8F6}" dt="2023-06-04T02:32:00.027" v="2688"/>
+          <ac:graphicFrameMkLst>
+            <pc:docMk/>
+            <pc:sldMk cId="3486530727" sldId="258"/>
+            <ac:graphicFrameMk id="16" creationId="{BD772BB9-7D46-D642-A330-EA00D6120903}"/>
+          </ac:graphicFrameMkLst>
+        </pc:graphicFrameChg>
+        <pc:picChg chg="mod">
+          <ac:chgData name="Rose Joy Angeline Padilla" userId="ecdd412207c6b092" providerId="LiveId" clId="{8A8653A4-EEE4-480C-A831-A23D8E4BA8F6}" dt="2023-06-04T02:13:42.278" v="2607"/>
+          <ac:picMkLst>
+            <pc:docMk/>
+            <pc:sldMk cId="3486530727" sldId="258"/>
+            <ac:picMk id="3" creationId="{0719D8A7-06E6-029A-3492-60F00A5BA579}"/>
+          </ac:picMkLst>
+        </pc:picChg>
+        <pc:picChg chg="mod">
+          <ac:chgData name="Rose Joy Angeline Padilla" userId="ecdd412207c6b092" providerId="LiveId" clId="{8A8653A4-EEE4-480C-A831-A23D8E4BA8F6}" dt="2023-06-04T02:14:37.671" v="2618"/>
+          <ac:picMkLst>
+            <pc:docMk/>
+            <pc:sldMk cId="3486530727" sldId="258"/>
+            <ac:picMk id="7" creationId="{60AAA89A-2653-7CCE-5F25-83D49C6BD258}"/>
+          </ac:picMkLst>
+        </pc:picChg>
+        <pc:picChg chg="add mod topLvl">
+          <ac:chgData name="Rose Joy Angeline Padilla" userId="ecdd412207c6b092" providerId="LiveId" clId="{8A8653A4-EEE4-480C-A831-A23D8E4BA8F6}" dt="2023-06-04T03:15:25.337" v="3421" actId="1076"/>
+          <ac:picMkLst>
+            <pc:docMk/>
+            <pc:sldMk cId="3486530727" sldId="258"/>
+            <ac:picMk id="9" creationId="{1DCB7B71-A5D6-D4F2-2F43-834D2C39F4A5}"/>
+          </ac:picMkLst>
+        </pc:picChg>
+        <pc:picChg chg="add del mod ord topLvl">
+          <ac:chgData name="Rose Joy Angeline Padilla" userId="ecdd412207c6b092" providerId="LiveId" clId="{8A8653A4-EEE4-480C-A831-A23D8E4BA8F6}" dt="2023-06-04T03:05:39.920" v="3307" actId="478"/>
+          <ac:picMkLst>
+            <pc:docMk/>
+            <pc:sldMk cId="3486530727" sldId="258"/>
+            <ac:picMk id="24" creationId="{EF22F97D-7064-486E-1AA8-95808111DE81}"/>
+          </ac:picMkLst>
+        </pc:picChg>
+        <pc:picChg chg="add mod">
+          <ac:chgData name="Rose Joy Angeline Padilla" userId="ecdd412207c6b092" providerId="LiveId" clId="{8A8653A4-EEE4-480C-A831-A23D8E4BA8F6}" dt="2023-06-04T03:15:25.337" v="3421" actId="1076"/>
+          <ac:picMkLst>
+            <pc:docMk/>
+            <pc:sldMk cId="3486530727" sldId="258"/>
+            <ac:picMk id="27" creationId="{A3328E4F-8376-B37F-EBA2-1A824B471591}"/>
+          </ac:picMkLst>
+        </pc:picChg>
+        <pc:picChg chg="mod">
+          <ac:chgData name="Rose Joy Angeline Padilla" userId="ecdd412207c6b092" providerId="LiveId" clId="{8A8653A4-EEE4-480C-A831-A23D8E4BA8F6}" dt="2023-06-04T02:15:21.340" v="2627" actId="571"/>
+          <ac:picMkLst>
+            <pc:docMk/>
+            <pc:sldMk cId="3486530727" sldId="258"/>
+            <ac:picMk id="44" creationId="{BEAB5C5C-D88A-F81B-B11A-016EF7831D55}"/>
+          </ac:picMkLst>
+        </pc:picChg>
+        <pc:picChg chg="mod">
+          <ac:chgData name="Rose Joy Angeline Padilla" userId="ecdd412207c6b092" providerId="LiveId" clId="{8A8653A4-EEE4-480C-A831-A23D8E4BA8F6}" dt="2023-06-04T02:15:21.340" v="2627" actId="571"/>
+          <ac:picMkLst>
+            <pc:docMk/>
+            <pc:sldMk cId="3486530727" sldId="258"/>
+            <ac:picMk id="77" creationId="{60029FD9-737C-AE5E-DBD0-D63E71F9927C}"/>
+          </ac:picMkLst>
+        </pc:picChg>
+        <pc:picChg chg="mod">
+          <ac:chgData name="Rose Joy Angeline Padilla" userId="ecdd412207c6b092" providerId="LiveId" clId="{8A8653A4-EEE4-480C-A831-A23D8E4BA8F6}" dt="2023-06-04T02:15:21.340" v="2627" actId="571"/>
+          <ac:picMkLst>
+            <pc:docMk/>
+            <pc:sldMk cId="3486530727" sldId="258"/>
+            <ac:picMk id="79" creationId="{4C712D11-F68B-9B08-62D6-E72A13145CF0}"/>
+          </ac:picMkLst>
+        </pc:picChg>
+        <pc:picChg chg="add mod">
+          <ac:chgData name="Rose Joy Angeline Padilla" userId="ecdd412207c6b092" providerId="LiveId" clId="{8A8653A4-EEE4-480C-A831-A23D8E4BA8F6}" dt="2023-06-04T03:15:25.337" v="3421" actId="1076"/>
+          <ac:picMkLst>
+            <pc:docMk/>
+            <pc:sldMk cId="3486530727" sldId="258"/>
+            <ac:picMk id="1026" creationId="{BEB6A045-C053-5284-E191-186857D9B7D6}"/>
+          </ac:picMkLst>
+        </pc:picChg>
       </pc:sldChg>
     </pc:docChg>
   </pc:docChgLst>
@@ -3978,10 +4426,10 @@
       </p:grpSpPr>
       <p:grpSp>
         <p:nvGrpSpPr>
-          <p:cNvPr id="17" name="Group 16">
-            <a:extLst>
-              <a:ext uri="{FF2B5EF4-FFF2-40B4-BE49-F238E27FC236}">
-                <a16:creationId xmlns:a16="http://schemas.microsoft.com/office/drawing/2014/main" id="{2932514E-B95A-4C18-474E-BB158D2C692C}"/>
+          <p:cNvPr id="6" name="Group 5">
+            <a:extLst>
+              <a:ext uri="{FF2B5EF4-FFF2-40B4-BE49-F238E27FC236}">
+                <a16:creationId xmlns:a16="http://schemas.microsoft.com/office/drawing/2014/main" id="{2B33130B-DD05-BECC-97F2-642A12EF7A0E}"/>
               </a:ext>
             </a:extLst>
           </p:cNvPr>
@@ -4059,8 +4507,8 @@
           </p:blipFill>
           <p:spPr>
             <a:xfrm>
-              <a:off x="2514600" y="361746"/>
-              <a:ext cx="8138160" cy="1214527"/>
+              <a:off x="3092116" y="367555"/>
+              <a:ext cx="7389793" cy="1102842"/>
             </a:xfrm>
             <a:prstGeom prst="rect">
               <a:avLst/>
@@ -4160,42 +4608,42 @@
           </p:spPr>
         </p:pic>
       </p:grpSp>
-      <p:sp>
-        <p:nvSpPr>
-          <p:cNvPr id="26" name="TextBox 25">
-            <a:extLst>
-              <a:ext uri="{FF2B5EF4-FFF2-40B4-BE49-F238E27FC236}">
-                <a16:creationId xmlns:a16="http://schemas.microsoft.com/office/drawing/2014/main" id="{E1F36DEA-5B95-968F-F716-EBBB97DBF400}"/>
-              </a:ext>
-            </a:extLst>
-          </p:cNvPr>
-          <p:cNvSpPr txBox="1"/>
+      <p:pic>
+        <p:nvPicPr>
+          <p:cNvPr id="2" name="Picture 1">
+            <a:extLst>
+              <a:ext uri="{FF2B5EF4-FFF2-40B4-BE49-F238E27FC236}">
+                <a16:creationId xmlns:a16="http://schemas.microsoft.com/office/drawing/2014/main" id="{F78E1811-0171-71AE-C43A-FA3E75E68FEF}"/>
+              </a:ext>
+            </a:extLst>
+          </p:cNvPr>
+          <p:cNvPicPr>
+            <a:picLocks noChangeAspect="1"/>
+          </p:cNvPicPr>
           <p:nvPr/>
-        </p:nvSpPr>
+        </p:nvPicPr>
+        <p:blipFill>
+          <a:blip r:embed="rId6">
+            <a:extLst>
+              <a:ext uri="{28A0092B-C50C-407E-A947-70E740481C1C}">
+                <a14:useLocalDpi xmlns:a14="http://schemas.microsoft.com/office/drawing/2010/main" val="0"/>
+              </a:ext>
+            </a:extLst>
+          </a:blip>
+          <a:stretch>
+            <a:fillRect/>
+          </a:stretch>
+        </p:blipFill>
         <p:spPr>
           <a:xfrm>
-            <a:off x="7315200" y="3244334"/>
-            <a:ext cx="3556000" cy="369332"/>
+            <a:off x="480822" y="2420112"/>
+            <a:ext cx="11234928" cy="2017776"/>
           </a:xfrm>
           <a:prstGeom prst="rect">
             <a:avLst/>
           </a:prstGeom>
-          <a:noFill/>
         </p:spPr>
-        <p:txBody>
-          <a:bodyPr wrap="square" rtlCol="0">
-            <a:spAutoFit/>
-          </a:bodyPr>
-          <a:lstStyle/>
-          <a:p>
-            <a:r>
-              <a:rPr lang="en-US" dirty="0"/>
-              <a:t>Win control over yourself</a:t>
-            </a:r>
-            <a:endParaRPr lang="en-PH" dirty="0"/>
-          </a:p>
-        </p:txBody>
-      </p:sp>
+      </p:pic>
     </p:spTree>
     <p:extLst>
       <p:ext uri="{BB962C8B-B14F-4D97-AF65-F5344CB8AC3E}">
@@ -4384,10 +4832,10 @@
       </p:pic>
       <p:grpSp>
         <p:nvGrpSpPr>
-          <p:cNvPr id="73" name="Group 72">
-            <a:extLst>
-              <a:ext uri="{FF2B5EF4-FFF2-40B4-BE49-F238E27FC236}">
-                <a16:creationId xmlns:a16="http://schemas.microsoft.com/office/drawing/2014/main" id="{3E5B5ADC-CFAE-5F45-70EB-A6BDB89AE105}"/>
+          <p:cNvPr id="18" name="Group 17">
+            <a:extLst>
+              <a:ext uri="{FF2B5EF4-FFF2-40B4-BE49-F238E27FC236}">
+                <a16:creationId xmlns:a16="http://schemas.microsoft.com/office/drawing/2014/main" id="{673EE9E8-D904-A1F1-C9C1-266BB185F666}"/>
               </a:ext>
             </a:extLst>
           </p:cNvPr>
@@ -4396,10 +4844,340 @@
         </p:nvGrpSpPr>
         <p:grpSpPr>
           <a:xfrm>
-            <a:off x="476250" y="-8216"/>
-            <a:ext cx="11330438" cy="2123444"/>
-            <a:chOff x="476250" y="-8216"/>
-            <a:chExt cx="11330438" cy="2017951"/>
+            <a:off x="331717" y="4076557"/>
+            <a:ext cx="11235902" cy="2017951"/>
+            <a:chOff x="331717" y="4076557"/>
+            <a:chExt cx="11235902" cy="2017951"/>
+          </a:xfrm>
+        </p:grpSpPr>
+        <p:pic>
+          <p:nvPicPr>
+            <p:cNvPr id="17" name="Picture 16">
+              <a:extLst>
+                <a:ext uri="{FF2B5EF4-FFF2-40B4-BE49-F238E27FC236}">
+                  <a16:creationId xmlns:a16="http://schemas.microsoft.com/office/drawing/2014/main" id="{30793041-93FD-8982-269D-95F7BD0A3FB7}"/>
+                </a:ext>
+              </a:extLst>
+            </p:cNvPr>
+            <p:cNvPicPr>
+              <a:picLocks noChangeAspect="1"/>
+            </p:cNvPicPr>
+            <p:nvPr/>
+          </p:nvPicPr>
+          <p:blipFill>
+            <a:blip r:embed="rId10"/>
+            <a:stretch>
+              <a:fillRect/>
+            </a:stretch>
+          </p:blipFill>
+          <p:spPr>
+            <a:xfrm>
+              <a:off x="331717" y="4076557"/>
+              <a:ext cx="11235902" cy="2017951"/>
+            </a:xfrm>
+            <a:prstGeom prst="rect">
+              <a:avLst/>
+            </a:prstGeom>
+          </p:spPr>
+        </p:pic>
+        <p:pic>
+          <p:nvPicPr>
+            <p:cNvPr id="2050" name="Picture 2" descr="Life expectancy">
+              <a:extLst>
+                <a:ext uri="{FF2B5EF4-FFF2-40B4-BE49-F238E27FC236}">
+                  <a16:creationId xmlns:a16="http://schemas.microsoft.com/office/drawing/2014/main" id="{C8A0AA91-C594-6201-616C-4E388E0500CF}"/>
+                </a:ext>
+              </a:extLst>
+            </p:cNvPr>
+            <p:cNvPicPr>
+              <a:picLocks noChangeAspect="1" noChangeArrowheads="1"/>
+            </p:cNvPicPr>
+            <p:nvPr/>
+          </p:nvPicPr>
+          <p:blipFill rotWithShape="1">
+            <a:blip r:embed="rId11">
+              <a:grayscl/>
+              <a:extLst>
+                <a:ext uri="{BEBA8EAE-BF5A-486C-A8C5-ECC9F3942E4B}">
+                  <a14:imgProps xmlns:a14="http://schemas.microsoft.com/office/drawing/2010/main">
+                    <a14:imgLayer r:embed="rId12">
+                      <a14:imgEffect>
+                        <a14:artisticPastelsSmooth/>
+                      </a14:imgEffect>
+                    </a14:imgLayer>
+                  </a14:imgProps>
+                </a:ext>
+                <a:ext uri="{28A0092B-C50C-407E-A947-70E740481C1C}">
+                  <a14:useLocalDpi xmlns:a14="http://schemas.microsoft.com/office/drawing/2010/main" val="0"/>
+                </a:ext>
+              </a:extLst>
+            </a:blip>
+            <a:srcRect l="2943" t="17105" r="4898" b="24282"/>
+            <a:stretch/>
+          </p:blipFill>
+          <p:spPr bwMode="auto">
+            <a:xfrm>
+              <a:off x="6188081" y="4291398"/>
+              <a:ext cx="4714887" cy="1512634"/>
+            </a:xfrm>
+            <a:prstGeom prst="rect">
+              <a:avLst/>
+            </a:prstGeom>
+            <a:noFill/>
+            <a:extLst>
+              <a:ext uri="{909E8E84-426E-40DD-AFC4-6F175D3DCCD1}">
+                <a14:hiddenFill xmlns:a14="http://schemas.microsoft.com/office/drawing/2010/main">
+                  <a:solidFill>
+                    <a:srgbClr val="FFFFFF"/>
+                  </a:solidFill>
+                </a14:hiddenFill>
+              </a:ext>
+            </a:extLst>
+          </p:spPr>
+        </p:pic>
+        <p:sp>
+          <p:nvSpPr>
+            <p:cNvPr id="74" name="TextBox 73">
+              <a:extLst>
+                <a:ext uri="{FF2B5EF4-FFF2-40B4-BE49-F238E27FC236}">
+                  <a16:creationId xmlns:a16="http://schemas.microsoft.com/office/drawing/2014/main" id="{0F385419-8445-4148-EBC0-46222A220333}"/>
+                </a:ext>
+              </a:extLst>
+            </p:cNvPr>
+            <p:cNvSpPr txBox="1"/>
+            <p:nvPr/>
+          </p:nvSpPr>
+          <p:spPr>
+            <a:xfrm>
+              <a:off x="1015365" y="4323528"/>
+              <a:ext cx="6231430" cy="1138773"/>
+            </a:xfrm>
+            <a:prstGeom prst="rect">
+              <a:avLst/>
+            </a:prstGeom>
+            <a:noFill/>
+          </p:spPr>
+          <p:txBody>
+            <a:bodyPr wrap="square" rtlCol="0">
+              <a:spAutoFit/>
+            </a:bodyPr>
+            <a:lstStyle/>
+            <a:p>
+              <a:r>
+                <a:rPr lang="en-US" sz="1600" b="0" i="0" dirty="0">
+                  <a:solidFill>
+                    <a:schemeClr val="tx1">
+                      <a:lumMod val="65000"/>
+                      <a:lumOff val="35000"/>
+                    </a:schemeClr>
+                  </a:solidFill>
+                  <a:effectLst/>
+                  <a:latin typeface="Helvetica" panose="020B0604020202020204" pitchFamily="34" charset="0"/>
+                </a:rPr>
+                <a:t>“According to the W.H.O. data published in 2020, </a:t>
+              </a:r>
+            </a:p>
+            <a:p>
+              <a:r>
+                <a:rPr lang="en-US" sz="2000" b="1" i="0" dirty="0">
+                  <a:solidFill>
+                    <a:schemeClr val="tx1">
+                      <a:lumMod val="65000"/>
+                      <a:lumOff val="35000"/>
+                    </a:schemeClr>
+                  </a:solidFill>
+                  <a:effectLst/>
+                  <a:latin typeface="Helvetica" panose="020B0604020202020204" pitchFamily="34" charset="0"/>
+                </a:rPr>
+                <a:t>life expectancy</a:t>
+              </a:r>
+              <a:r>
+                <a:rPr lang="en-US" sz="1600" b="1" i="0" dirty="0">
+                  <a:solidFill>
+                    <a:schemeClr val="tx1">
+                      <a:lumMod val="65000"/>
+                      <a:lumOff val="35000"/>
+                    </a:schemeClr>
+                  </a:solidFill>
+                  <a:effectLst/>
+                  <a:latin typeface="Helvetica" panose="020B0604020202020204" pitchFamily="34" charset="0"/>
+                </a:rPr>
+                <a:t> </a:t>
+              </a:r>
+              <a:r>
+                <a:rPr lang="en-US" sz="1600" b="0" i="0" dirty="0">
+                  <a:solidFill>
+                    <a:schemeClr val="tx1">
+                      <a:lumMod val="65000"/>
+                      <a:lumOff val="35000"/>
+                    </a:schemeClr>
+                  </a:solidFill>
+                  <a:effectLst/>
+                  <a:latin typeface="Helvetica" panose="020B0604020202020204" pitchFamily="34" charset="0"/>
+                </a:rPr>
+                <a:t>in the Philippines is: </a:t>
+              </a:r>
+              <a:r>
+                <a:rPr lang="en-US" sz="1600" b="1" dirty="0">
+                  <a:solidFill>
+                    <a:schemeClr val="tx1">
+                      <a:lumMod val="65000"/>
+                      <a:lumOff val="35000"/>
+                    </a:schemeClr>
+                  </a:solidFill>
+                  <a:latin typeface="Helvetica" panose="020B0604020202020204" pitchFamily="34" charset="0"/>
+                </a:rPr>
+                <a:t>m</a:t>
+              </a:r>
+              <a:r>
+                <a:rPr lang="en-US" sz="1600" b="1" i="0" dirty="0">
+                  <a:solidFill>
+                    <a:schemeClr val="tx1">
+                      <a:lumMod val="65000"/>
+                      <a:lumOff val="35000"/>
+                    </a:schemeClr>
+                  </a:solidFill>
+                  <a:effectLst/>
+                  <a:latin typeface="Helvetica" panose="020B0604020202020204" pitchFamily="34" charset="0"/>
+                </a:rPr>
+                <a:t>ale 67.4, female 73.6 </a:t>
+              </a:r>
+              <a:r>
+                <a:rPr lang="en-US" sz="1600" b="0" i="0" dirty="0">
+                  <a:solidFill>
+                    <a:schemeClr val="tx1">
+                      <a:lumMod val="65000"/>
+                      <a:lumOff val="35000"/>
+                    </a:schemeClr>
+                  </a:solidFill>
+                  <a:effectLst/>
+                  <a:latin typeface="Helvetica" panose="020B0604020202020204" pitchFamily="34" charset="0"/>
+                </a:rPr>
+                <a:t>and </a:t>
+              </a:r>
+              <a:r>
+                <a:rPr lang="en-US" b="1" i="0" dirty="0">
+                  <a:solidFill>
+                    <a:schemeClr val="tx1">
+                      <a:lumMod val="65000"/>
+                      <a:lumOff val="35000"/>
+                    </a:schemeClr>
+                  </a:solidFill>
+                  <a:effectLst/>
+                  <a:latin typeface="Helvetica" panose="020B0604020202020204" pitchFamily="34" charset="0"/>
+                </a:rPr>
+                <a:t>total</a:t>
+              </a:r>
+              <a:r>
+                <a:rPr lang="en-US" sz="1600" b="1" i="0" dirty="0">
+                  <a:solidFill>
+                    <a:schemeClr val="tx1">
+                      <a:lumMod val="65000"/>
+                      <a:lumOff val="35000"/>
+                    </a:schemeClr>
+                  </a:solidFill>
+                  <a:effectLst/>
+                  <a:latin typeface="Helvetica" panose="020B0604020202020204" pitchFamily="34" charset="0"/>
+                </a:rPr>
+                <a:t> life expectancy is </a:t>
+              </a:r>
+              <a:r>
+                <a:rPr lang="en-US" b="1" i="0" dirty="0">
+                  <a:solidFill>
+                    <a:schemeClr val="tx1">
+                      <a:lumMod val="65000"/>
+                      <a:lumOff val="35000"/>
+                    </a:schemeClr>
+                  </a:solidFill>
+                  <a:effectLst/>
+                  <a:latin typeface="Helvetica" panose="020B0604020202020204" pitchFamily="34" charset="0"/>
+                </a:rPr>
+                <a:t>70.4</a:t>
+              </a:r>
+              <a:endParaRPr lang="en-US" sz="1600" b="1" i="0" dirty="0">
+                <a:solidFill>
+                  <a:schemeClr val="tx1">
+                    <a:lumMod val="65000"/>
+                    <a:lumOff val="35000"/>
+                  </a:schemeClr>
+                </a:solidFill>
+                <a:effectLst/>
+                <a:latin typeface="Helvetica" panose="020B0604020202020204" pitchFamily="34" charset="0"/>
+              </a:endParaRPr>
+            </a:p>
+            <a:p>
+              <a:r>
+                <a:rPr lang="en-US" sz="1400" i="1" dirty="0">
+                  <a:solidFill>
+                    <a:schemeClr val="bg1">
+                      <a:lumMod val="50000"/>
+                    </a:schemeClr>
+                  </a:solidFill>
+                  <a:latin typeface="Helvetica" panose="020B0604020202020204" pitchFamily="34" charset="0"/>
+                </a:rPr>
+                <a:t>- www.worldlifeexpectancy.com</a:t>
+              </a:r>
+              <a:endParaRPr lang="en-US" sz="1600" b="1" i="1" dirty="0">
+                <a:solidFill>
+                  <a:schemeClr val="tx1">
+                    <a:lumMod val="65000"/>
+                    <a:lumOff val="35000"/>
+                  </a:schemeClr>
+                </a:solidFill>
+                <a:effectLst/>
+              </a:endParaRPr>
+            </a:p>
+          </p:txBody>
+        </p:sp>
+      </p:grpSp>
+      <p:pic>
+        <p:nvPicPr>
+          <p:cNvPr id="16" name="Picture 15">
+            <a:extLst>
+              <a:ext uri="{FF2B5EF4-FFF2-40B4-BE49-F238E27FC236}">
+                <a16:creationId xmlns:a16="http://schemas.microsoft.com/office/drawing/2014/main" id="{399DFDD8-1685-B1EB-9A0C-D3DBFE1D35F6}"/>
+              </a:ext>
+            </a:extLst>
+          </p:cNvPr>
+          <p:cNvPicPr>
+            <a:picLocks noChangeAspect="1"/>
+          </p:cNvPicPr>
+          <p:nvPr/>
+        </p:nvPicPr>
+        <p:blipFill>
+          <a:blip r:embed="rId10"/>
+          <a:stretch>
+            <a:fillRect/>
+          </a:stretch>
+        </p:blipFill>
+        <p:spPr>
+          <a:xfrm>
+            <a:off x="12361417" y="3732857"/>
+            <a:ext cx="11235902" cy="2017951"/>
+          </a:xfrm>
+          <a:prstGeom prst="rect">
+            <a:avLst/>
+          </a:prstGeom>
+        </p:spPr>
+      </p:pic>
+      <p:grpSp>
+        <p:nvGrpSpPr>
+          <p:cNvPr id="19" name="Group 18">
+            <a:extLst>
+              <a:ext uri="{FF2B5EF4-FFF2-40B4-BE49-F238E27FC236}">
+                <a16:creationId xmlns:a16="http://schemas.microsoft.com/office/drawing/2014/main" id="{314527D1-0893-227F-95B5-9AD653A9E116}"/>
+              </a:ext>
+            </a:extLst>
+          </p:cNvPr>
+          <p:cNvGrpSpPr/>
+          <p:nvPr/>
+        </p:nvGrpSpPr>
+        <p:grpSpPr>
+          <a:xfrm>
+            <a:off x="477393" y="-7754"/>
+            <a:ext cx="11329295" cy="2123444"/>
+            <a:chOff x="477393" y="-7754"/>
+            <a:chExt cx="11329295" cy="2123444"/>
           </a:xfrm>
         </p:grpSpPr>
         <p:pic>
@@ -4417,15 +5195,15 @@
             <p:nvPr/>
           </p:nvPicPr>
           <p:blipFill>
-            <a:blip r:embed="rId10"/>
+            <a:blip r:embed="rId13"/>
             <a:stretch>
               <a:fillRect/>
             </a:stretch>
           </p:blipFill>
           <p:spPr>
             <a:xfrm>
-              <a:off x="508529" y="-8216"/>
-              <a:ext cx="11235902" cy="2017951"/>
+              <a:off x="512139" y="-7754"/>
+              <a:ext cx="11235902" cy="2123444"/>
             </a:xfrm>
             <a:prstGeom prst="rect">
               <a:avLst/>
@@ -4446,8 +5224,8 @@
           </p:nvSpPr>
           <p:spPr>
             <a:xfrm>
-              <a:off x="476250" y="100749"/>
-              <a:ext cx="11237214" cy="400110"/>
+              <a:off x="477393" y="144781"/>
+              <a:ext cx="11237214" cy="421027"/>
             </a:xfrm>
             <a:prstGeom prst="rect">
               <a:avLst/>
@@ -4499,8 +5277,8 @@
           </p:nvGrpSpPr>
           <p:grpSpPr>
             <a:xfrm>
-              <a:off x="5570918" y="463264"/>
-              <a:ext cx="1047877" cy="849983"/>
+              <a:off x="5570918" y="487912"/>
+              <a:ext cx="1047877" cy="894418"/>
               <a:chOff x="4511040" y="1877124"/>
               <a:chExt cx="1264920" cy="914400"/>
             </a:xfrm>
@@ -4520,13 +5298,13 @@
               <p:nvPr/>
             </p:nvPicPr>
             <p:blipFill>
-              <a:blip r:embed="rId11">
+              <a:blip r:embed="rId14">
                 <a:extLst>
                   <a:ext uri="{28A0092B-C50C-407E-A947-70E740481C1C}">
                     <a14:useLocalDpi xmlns:a14="http://schemas.microsoft.com/office/drawing/2010/main" val="0"/>
                   </a:ext>
                   <a:ext uri="{96DAC541-7B7A-43D3-8B79-37D633B846F1}">
-                    <asvg:svgBlip xmlns:asvg="http://schemas.microsoft.com/office/drawing/2016/SVG/main" r:embed="rId12"/>
+                    <asvg:svgBlip xmlns:asvg="http://schemas.microsoft.com/office/drawing/2016/SVG/main" r:embed="rId15"/>
                   </a:ext>
                 </a:extLst>
               </a:blip>
@@ -4559,13 +5337,13 @@
               <p:nvPr/>
             </p:nvPicPr>
             <p:blipFill>
-              <a:blip r:embed="rId13">
+              <a:blip r:embed="rId16">
                 <a:extLst>
                   <a:ext uri="{28A0092B-C50C-407E-A947-70E740481C1C}">
                     <a14:useLocalDpi xmlns:a14="http://schemas.microsoft.com/office/drawing/2010/main" val="0"/>
                   </a:ext>
                   <a:ext uri="{96DAC541-7B7A-43D3-8B79-37D633B846F1}">
-                    <asvg:svgBlip xmlns:asvg="http://schemas.microsoft.com/office/drawing/2016/SVG/main" r:embed="rId14"/>
+                    <asvg:svgBlip xmlns:asvg="http://schemas.microsoft.com/office/drawing/2016/SVG/main" r:embed="rId17"/>
                   </a:ext>
                 </a:extLst>
               </a:blip>
@@ -4584,42 +5362,6 @@
             </p:spPr>
           </p:pic>
         </p:grpSp>
-        <p:pic>
-          <p:nvPicPr>
-            <p:cNvPr id="56" name="Picture 55">
-              <a:extLst>
-                <a:ext uri="{FF2B5EF4-FFF2-40B4-BE49-F238E27FC236}">
-                  <a16:creationId xmlns:a16="http://schemas.microsoft.com/office/drawing/2014/main" id="{F37977D1-2847-C0F7-7541-5C3A37DCA779}"/>
-                </a:ext>
-              </a:extLst>
-            </p:cNvPr>
-            <p:cNvPicPr>
-              <a:picLocks noChangeAspect="1"/>
-            </p:cNvPicPr>
-            <p:nvPr/>
-          </p:nvPicPr>
-          <p:blipFill>
-            <a:blip r:embed="rId15">
-              <a:extLst>
-                <a:ext uri="{28A0092B-C50C-407E-A947-70E740481C1C}">
-                  <a14:useLocalDpi xmlns:a14="http://schemas.microsoft.com/office/drawing/2010/main" val="0"/>
-                </a:ext>
-              </a:extLst>
-            </a:blip>
-            <a:stretch>
-              <a:fillRect/>
-            </a:stretch>
-          </p:blipFill>
-          <p:spPr>
-            <a:xfrm>
-              <a:off x="9010958" y="142926"/>
-              <a:ext cx="1221124" cy="1095959"/>
-            </a:xfrm>
-            <a:prstGeom prst="rect">
-              <a:avLst/>
-            </a:prstGeom>
-          </p:spPr>
-        </p:pic>
         <p:grpSp>
           <p:nvGrpSpPr>
             <p:cNvPr id="59" name="Group 58">
@@ -4634,8 +5376,8 @@
           </p:nvGrpSpPr>
           <p:grpSpPr>
             <a:xfrm>
-              <a:off x="1684471" y="156970"/>
-              <a:ext cx="1418378" cy="1129170"/>
+              <a:off x="1819223" y="365759"/>
+              <a:ext cx="1248012" cy="988045"/>
               <a:chOff x="1320414" y="416559"/>
               <a:chExt cx="1418378" cy="1129170"/>
             </a:xfrm>
@@ -4675,13 +5417,13 @@
                 <p:nvPr/>
               </p:nvPicPr>
               <p:blipFill>
-                <a:blip r:embed="rId16">
+                <a:blip r:embed="rId18">
                   <a:extLst>
                     <a:ext uri="{28A0092B-C50C-407E-A947-70E740481C1C}">
                       <a14:useLocalDpi xmlns:a14="http://schemas.microsoft.com/office/drawing/2010/main" val="0"/>
                     </a:ext>
                     <a:ext uri="{96DAC541-7B7A-43D3-8B79-37D633B846F1}">
-                      <asvg:svgBlip xmlns:asvg="http://schemas.microsoft.com/office/drawing/2016/SVG/main" r:embed="rId17"/>
+                      <asvg:svgBlip xmlns:asvg="http://schemas.microsoft.com/office/drawing/2016/SVG/main" r:embed="rId19"/>
                     </a:ext>
                   </a:extLst>
                 </a:blip>
@@ -4714,13 +5456,13 @@
                 <p:nvPr/>
               </p:nvPicPr>
               <p:blipFill>
-                <a:blip r:embed="rId18">
+                <a:blip r:embed="rId20">
                   <a:extLst>
                     <a:ext uri="{28A0092B-C50C-407E-A947-70E740481C1C}">
                       <a14:useLocalDpi xmlns:a14="http://schemas.microsoft.com/office/drawing/2010/main" val="0"/>
                     </a:ext>
                     <a:ext uri="{96DAC541-7B7A-43D3-8B79-37D633B846F1}">
-                      <asvg:svgBlip xmlns:asvg="http://schemas.microsoft.com/office/drawing/2016/SVG/main" r:embed="rId19"/>
+                      <asvg:svgBlip xmlns:asvg="http://schemas.microsoft.com/office/drawing/2016/SVG/main" r:embed="rId21"/>
                     </a:ext>
                   </a:extLst>
                 </a:blip>
@@ -4754,13 +5496,13 @@
               <p:nvPr/>
             </p:nvPicPr>
             <p:blipFill>
-              <a:blip r:embed="rId20">
+              <a:blip r:embed="rId22">
                 <a:extLst>
                   <a:ext uri="{28A0092B-C50C-407E-A947-70E740481C1C}">
                     <a14:useLocalDpi xmlns:a14="http://schemas.microsoft.com/office/drawing/2010/main" val="0"/>
                   </a:ext>
                   <a:ext uri="{96DAC541-7B7A-43D3-8B79-37D633B846F1}">
-                    <asvg:svgBlip xmlns:asvg="http://schemas.microsoft.com/office/drawing/2016/SVG/main" r:embed="rId21"/>
+                    <asvg:svgBlip xmlns:asvg="http://schemas.microsoft.com/office/drawing/2016/SVG/main" r:embed="rId23"/>
                   </a:ext>
                 </a:extLst>
               </a:blip>
@@ -4793,7 +5535,7 @@
           </p:nvSpPr>
           <p:spPr>
             <a:xfrm>
-              <a:off x="569474" y="1155812"/>
+              <a:off x="569474" y="1218290"/>
               <a:ext cx="11237214" cy="584775"/>
             </a:xfrm>
             <a:prstGeom prst="rect">
@@ -4851,7 +5593,7 @@
                   </a:solidFill>
                   <a:effectLst/>
                 </a:rPr>
-                <a:t>			       RETIREMENT</a:t>
+                <a:t>			      RETIREMENT</a:t>
               </a:r>
             </a:p>
             <a:p>
@@ -4872,7 +5614,7 @@
                     <a:srgbClr val="C00000"/>
                   </a:solidFill>
                 </a:rPr>
-                <a:t> (no income)							        (no income)</a:t>
+                <a:t> (no income)							      (no income)</a:t>
               </a:r>
               <a:endParaRPr lang="en-US" sz="1400" b="0" i="1" dirty="0">
                 <a:solidFill>
@@ -4897,8 +5639,8 @@
           </p:nvSpPr>
           <p:spPr>
             <a:xfrm>
-              <a:off x="1381126" y="633685"/>
-              <a:ext cx="461929" cy="584775"/>
+              <a:off x="1438876" y="667242"/>
+              <a:ext cx="461929" cy="615345"/>
             </a:xfrm>
             <a:prstGeom prst="rect">
               <a:avLst/>
@@ -4947,8 +5689,8 @@
           </p:nvSpPr>
           <p:spPr>
             <a:xfrm>
-              <a:off x="3048030" y="633600"/>
-              <a:ext cx="599416" cy="584775"/>
+              <a:off x="3019043" y="667241"/>
+              <a:ext cx="599416" cy="615345"/>
             </a:xfrm>
             <a:prstGeom prst="rect">
               <a:avLst/>
@@ -4997,8 +5739,8 @@
           </p:nvSpPr>
           <p:spPr>
             <a:xfrm>
-              <a:off x="8565780" y="643087"/>
-              <a:ext cx="601685" cy="584775"/>
+              <a:off x="8569824" y="677134"/>
+              <a:ext cx="601685" cy="615345"/>
             </a:xfrm>
             <a:prstGeom prst="rect">
               <a:avLst/>
@@ -5047,8 +5789,8 @@
           </p:nvSpPr>
           <p:spPr>
             <a:xfrm>
-              <a:off x="10061569" y="643086"/>
-              <a:ext cx="841399" cy="584775"/>
+              <a:off x="10080819" y="677134"/>
+              <a:ext cx="841399" cy="615345"/>
             </a:xfrm>
             <a:prstGeom prst="rect">
               <a:avLst/>
@@ -5083,7 +5825,238 @@
             </a:p>
           </p:txBody>
         </p:sp>
+        <p:pic>
+          <p:nvPicPr>
+            <p:cNvPr id="2054" name="Picture 6" descr="Pension Fund Growth Icon Retirement Plan Vector Stock Illustration ...">
+              <a:extLst>
+                <a:ext uri="{FF2B5EF4-FFF2-40B4-BE49-F238E27FC236}">
+                  <a16:creationId xmlns:a16="http://schemas.microsoft.com/office/drawing/2014/main" id="{227A2379-0EBA-D0CD-66B6-06A8CA7AAF8A}"/>
+                </a:ext>
+              </a:extLst>
+            </p:cNvPr>
+            <p:cNvPicPr>
+              <a:picLocks noChangeAspect="1" noChangeArrowheads="1"/>
+            </p:cNvPicPr>
+            <p:nvPr/>
+          </p:nvPicPr>
+          <p:blipFill rotWithShape="1">
+            <a:blip r:embed="rId24">
+              <a:extLst>
+                <a:ext uri="{28A0092B-C50C-407E-A947-70E740481C1C}">
+                  <a14:useLocalDpi xmlns:a14="http://schemas.microsoft.com/office/drawing/2010/main" val="0"/>
+                </a:ext>
+              </a:extLst>
+            </a:blip>
+            <a:srcRect l="5512" t="24768" b="25018"/>
+            <a:stretch/>
+          </p:blipFill>
+          <p:spPr bwMode="auto">
+            <a:xfrm>
+              <a:off x="9092515" y="667240"/>
+              <a:ext cx="1110264" cy="630369"/>
+            </a:xfrm>
+            <a:prstGeom prst="rect">
+              <a:avLst/>
+            </a:prstGeom>
+            <a:noFill/>
+            <a:extLst>
+              <a:ext uri="{909E8E84-426E-40DD-AFC4-6F175D3DCCD1}">
+                <a14:hiddenFill xmlns:a14="http://schemas.microsoft.com/office/drawing/2010/main">
+                  <a:solidFill>
+                    <a:srgbClr val="FFFFFF"/>
+                  </a:solidFill>
+                </a14:hiddenFill>
+              </a:ext>
+            </a:extLst>
+          </p:spPr>
+        </p:pic>
       </p:grpSp>
+    </p:spTree>
+    <p:extLst>
+      <p:ext uri="{BB962C8B-B14F-4D97-AF65-F5344CB8AC3E}">
+        <p14:creationId xmlns:p14="http://schemas.microsoft.com/office/powerpoint/2010/main" val="900757665"/>
+      </p:ext>
+    </p:extLst>
+  </p:cSld>
+  <p:clrMapOvr>
+    <a:masterClrMapping/>
+  </p:clrMapOvr>
+</p:sld>
+</file>
+
+<file path=ppt/slides/slide3.xml><?xml version="1.0" encoding="utf-8"?>
+<p:sld xmlns:a="http://schemas.openxmlformats.org/drawingml/2006/main" xmlns:r="http://schemas.openxmlformats.org/officeDocument/2006/relationships" xmlns:p="http://schemas.openxmlformats.org/presentationml/2006/main">
+  <p:cSld>
+    <p:spTree>
+      <p:nvGrpSpPr>
+        <p:cNvPr id="1" name=""/>
+        <p:cNvGrpSpPr/>
+        <p:nvPr/>
+      </p:nvGrpSpPr>
+      <p:grpSpPr>
+        <a:xfrm>
+          <a:off x="0" y="0"/>
+          <a:ext cx="0" cy="0"/>
+          <a:chOff x="0" y="0"/>
+          <a:chExt cx="0" cy="0"/>
+        </a:xfrm>
+      </p:grpSpPr>
+      <p:pic>
+        <p:nvPicPr>
+          <p:cNvPr id="48" name="Graphic 47" descr="Lightbulb">
+            <a:extLst>
+              <a:ext uri="{FF2B5EF4-FFF2-40B4-BE49-F238E27FC236}">
+                <a16:creationId xmlns:a16="http://schemas.microsoft.com/office/drawing/2014/main" id="{9960A429-2085-71B2-AC9B-A756F94E851B}"/>
+              </a:ext>
+            </a:extLst>
+          </p:cNvPr>
+          <p:cNvPicPr>
+            <a:picLocks noChangeAspect="1"/>
+          </p:cNvPicPr>
+          <p:nvPr/>
+        </p:nvPicPr>
+        <p:blipFill>
+          <a:blip r:embed="rId2">
+            <a:extLst>
+              <a:ext uri="{28A0092B-C50C-407E-A947-70E740481C1C}">
+                <a14:useLocalDpi xmlns:a14="http://schemas.microsoft.com/office/drawing/2010/main" val="0"/>
+              </a:ext>
+              <a:ext uri="{96DAC541-7B7A-43D3-8B79-37D633B846F1}">
+                <asvg:svgBlip xmlns:asvg="http://schemas.microsoft.com/office/drawing/2016/SVG/main" r:embed="rId3"/>
+              </a:ext>
+            </a:extLst>
+          </a:blip>
+          <a:stretch>
+            <a:fillRect/>
+          </a:stretch>
+        </p:blipFill>
+        <p:spPr>
+          <a:xfrm>
+            <a:off x="13730160" y="293399"/>
+            <a:ext cx="914400" cy="914400"/>
+          </a:xfrm>
+          <a:prstGeom prst="rect">
+            <a:avLst/>
+          </a:prstGeom>
+        </p:spPr>
+      </p:pic>
+      <p:pic>
+        <p:nvPicPr>
+          <p:cNvPr id="50" name="Graphic 49" descr="Bar chart RTL">
+            <a:extLst>
+              <a:ext uri="{FF2B5EF4-FFF2-40B4-BE49-F238E27FC236}">
+                <a16:creationId xmlns:a16="http://schemas.microsoft.com/office/drawing/2014/main" id="{930A53EC-5EBE-86E9-AFC5-6F1741EE1A72}"/>
+              </a:ext>
+            </a:extLst>
+          </p:cNvPr>
+          <p:cNvPicPr>
+            <a:picLocks noChangeAspect="1"/>
+          </p:cNvPicPr>
+          <p:nvPr/>
+        </p:nvPicPr>
+        <p:blipFill>
+          <a:blip r:embed="rId4">
+            <a:extLst>
+              <a:ext uri="{28A0092B-C50C-407E-A947-70E740481C1C}">
+                <a14:useLocalDpi xmlns:a14="http://schemas.microsoft.com/office/drawing/2010/main" val="0"/>
+              </a:ext>
+              <a:ext uri="{96DAC541-7B7A-43D3-8B79-37D633B846F1}">
+                <asvg:svgBlip xmlns:asvg="http://schemas.microsoft.com/office/drawing/2016/SVG/main" r:embed="rId5"/>
+              </a:ext>
+            </a:extLst>
+          </a:blip>
+          <a:stretch>
+            <a:fillRect/>
+          </a:stretch>
+        </p:blipFill>
+        <p:spPr>
+          <a:xfrm>
+            <a:off x="12838366" y="3151682"/>
+            <a:ext cx="1198880" cy="1198880"/>
+          </a:xfrm>
+          <a:prstGeom prst="rect">
+            <a:avLst/>
+          </a:prstGeom>
+        </p:spPr>
+      </p:pic>
+      <p:pic>
+        <p:nvPicPr>
+          <p:cNvPr id="52" name="Graphic 51" descr="Man changing baby">
+            <a:extLst>
+              <a:ext uri="{FF2B5EF4-FFF2-40B4-BE49-F238E27FC236}">
+                <a16:creationId xmlns:a16="http://schemas.microsoft.com/office/drawing/2014/main" id="{1782260A-73F5-3526-70E9-7BC73513DA77}"/>
+              </a:ext>
+            </a:extLst>
+          </p:cNvPr>
+          <p:cNvPicPr>
+            <a:picLocks noChangeAspect="1"/>
+          </p:cNvPicPr>
+          <p:nvPr/>
+        </p:nvPicPr>
+        <p:blipFill>
+          <a:blip r:embed="rId6">
+            <a:extLst>
+              <a:ext uri="{28A0092B-C50C-407E-A947-70E740481C1C}">
+                <a14:useLocalDpi xmlns:a14="http://schemas.microsoft.com/office/drawing/2010/main" val="0"/>
+              </a:ext>
+              <a:ext uri="{96DAC541-7B7A-43D3-8B79-37D633B846F1}">
+                <asvg:svgBlip xmlns:asvg="http://schemas.microsoft.com/office/drawing/2016/SVG/main" r:embed="rId7"/>
+              </a:ext>
+            </a:extLst>
+          </a:blip>
+          <a:stretch>
+            <a:fillRect/>
+          </a:stretch>
+        </p:blipFill>
+        <p:spPr>
+          <a:xfrm>
+            <a:off x="12838366" y="1230163"/>
+            <a:ext cx="914400" cy="914400"/>
+          </a:xfrm>
+          <a:prstGeom prst="rect">
+            <a:avLst/>
+          </a:prstGeom>
+        </p:spPr>
+      </p:pic>
+      <p:pic>
+        <p:nvPicPr>
+          <p:cNvPr id="54" name="Graphic 53" descr="Pie chart">
+            <a:extLst>
+              <a:ext uri="{FF2B5EF4-FFF2-40B4-BE49-F238E27FC236}">
+                <a16:creationId xmlns:a16="http://schemas.microsoft.com/office/drawing/2014/main" id="{A8680BD8-AEF2-8082-5237-CFF2A6C35B5F}"/>
+              </a:ext>
+            </a:extLst>
+          </p:cNvPr>
+          <p:cNvPicPr>
+            <a:picLocks noChangeAspect="1"/>
+          </p:cNvPicPr>
+          <p:nvPr/>
+        </p:nvPicPr>
+        <p:blipFill>
+          <a:blip r:embed="rId8">
+            <a:extLst>
+              <a:ext uri="{28A0092B-C50C-407E-A947-70E740481C1C}">
+                <a14:useLocalDpi xmlns:a14="http://schemas.microsoft.com/office/drawing/2010/main" val="0"/>
+              </a:ext>
+              <a:ext uri="{96DAC541-7B7A-43D3-8B79-37D633B846F1}">
+                <asvg:svgBlip xmlns:asvg="http://schemas.microsoft.com/office/drawing/2016/SVG/main" r:embed="rId9"/>
+              </a:ext>
+            </a:extLst>
+          </a:blip>
+          <a:stretch>
+            <a:fillRect/>
+          </a:stretch>
+        </p:blipFill>
+        <p:spPr>
+          <a:xfrm>
+            <a:off x="12097813" y="2069228"/>
+            <a:ext cx="1082454" cy="1082454"/>
+          </a:xfrm>
+          <a:prstGeom prst="rect">
+            <a:avLst/>
+          </a:prstGeom>
+        </p:spPr>
+      </p:pic>
       <p:grpSp>
         <p:nvGrpSpPr>
           <p:cNvPr id="80" name="Group 79">
@@ -5098,7 +6071,7 @@
         </p:nvGrpSpPr>
         <p:grpSpPr>
           <a:xfrm>
-            <a:off x="332204" y="3008711"/>
+            <a:off x="332204" y="3151682"/>
             <a:ext cx="11234928" cy="2017776"/>
             <a:chOff x="332204" y="3008711"/>
             <a:chExt cx="11234928" cy="2017776"/>
@@ -5159,7 +6132,7 @@
                 <p:nvPr/>
               </p:nvPicPr>
               <p:blipFill>
-                <a:blip r:embed="rId22">
+                <a:blip r:embed="rId10">
                   <a:extLst>
                     <a:ext uri="{28A0092B-C50C-407E-A947-70E740481C1C}">
                       <a14:useLocalDpi xmlns:a14="http://schemas.microsoft.com/office/drawing/2010/main" val="0"/>
@@ -5450,13 +6423,13 @@
             <p:nvPr/>
           </p:nvPicPr>
           <p:blipFill>
-            <a:blip r:embed="rId23">
+            <a:blip r:embed="rId11">
               <a:extLst>
                 <a:ext uri="{28A0092B-C50C-407E-A947-70E740481C1C}">
                   <a14:useLocalDpi xmlns:a14="http://schemas.microsoft.com/office/drawing/2010/main" val="0"/>
                 </a:ext>
                 <a:ext uri="{96DAC541-7B7A-43D3-8B79-37D633B846F1}">
-                  <asvg:svgBlip xmlns:asvg="http://schemas.microsoft.com/office/drawing/2016/SVG/main" r:embed="rId24"/>
+                  <asvg:svgBlip xmlns:asvg="http://schemas.microsoft.com/office/drawing/2016/SVG/main" r:embed="rId12"/>
                 </a:ext>
               </a:extLst>
             </a:blip>
@@ -5489,13 +6462,13 @@
             <p:nvPr/>
           </p:nvPicPr>
           <p:blipFill>
-            <a:blip r:embed="rId25">
+            <a:blip r:embed="rId13">
               <a:extLst>
                 <a:ext uri="{28A0092B-C50C-407E-A947-70E740481C1C}">
                   <a14:useLocalDpi xmlns:a14="http://schemas.microsoft.com/office/drawing/2010/main" val="0"/>
                 </a:ext>
                 <a:ext uri="{96DAC541-7B7A-43D3-8B79-37D633B846F1}">
-                  <asvg:svgBlip xmlns:asvg="http://schemas.microsoft.com/office/drawing/2016/SVG/main" r:embed="rId26"/>
+                  <asvg:svgBlip xmlns:asvg="http://schemas.microsoft.com/office/drawing/2016/SVG/main" r:embed="rId14"/>
                 </a:ext>
               </a:extLst>
             </a:blip>
@@ -5514,198 +6487,12 @@
           </p:spPr>
         </p:pic>
       </p:grpSp>
-    </p:spTree>
-    <p:extLst>
-      <p:ext uri="{BB962C8B-B14F-4D97-AF65-F5344CB8AC3E}">
-        <p14:creationId xmlns:p14="http://schemas.microsoft.com/office/powerpoint/2010/main" val="900757665"/>
-      </p:ext>
-    </p:extLst>
-  </p:cSld>
-  <p:clrMapOvr>
-    <a:masterClrMapping/>
-  </p:clrMapOvr>
-</p:sld>
-</file>
-
-<file path=ppt/slides/slide3.xml><?xml version="1.0" encoding="utf-8"?>
-<p:sld xmlns:a="http://schemas.openxmlformats.org/drawingml/2006/main" xmlns:r="http://schemas.openxmlformats.org/officeDocument/2006/relationships" xmlns:p="http://schemas.openxmlformats.org/presentationml/2006/main">
-  <p:cSld>
-    <p:spTree>
-      <p:nvGrpSpPr>
-        <p:cNvPr id="1" name=""/>
-        <p:cNvGrpSpPr/>
-        <p:nvPr/>
-      </p:nvGrpSpPr>
-      <p:grpSpPr>
-        <a:xfrm>
-          <a:off x="0" y="0"/>
-          <a:ext cx="0" cy="0"/>
-          <a:chOff x="0" y="0"/>
-          <a:chExt cx="0" cy="0"/>
-        </a:xfrm>
-      </p:grpSpPr>
-      <p:pic>
-        <p:nvPicPr>
-          <p:cNvPr id="48" name="Graphic 47" descr="Lightbulb">
-            <a:extLst>
-              <a:ext uri="{FF2B5EF4-FFF2-40B4-BE49-F238E27FC236}">
-                <a16:creationId xmlns:a16="http://schemas.microsoft.com/office/drawing/2014/main" id="{9960A429-2085-71B2-AC9B-A756F94E851B}"/>
-              </a:ext>
-            </a:extLst>
-          </p:cNvPr>
-          <p:cNvPicPr>
-            <a:picLocks noChangeAspect="1"/>
-          </p:cNvPicPr>
-          <p:nvPr/>
-        </p:nvPicPr>
-        <p:blipFill>
-          <a:blip r:embed="rId2">
-            <a:extLst>
-              <a:ext uri="{28A0092B-C50C-407E-A947-70E740481C1C}">
-                <a14:useLocalDpi xmlns:a14="http://schemas.microsoft.com/office/drawing/2010/main" val="0"/>
-              </a:ext>
-              <a:ext uri="{96DAC541-7B7A-43D3-8B79-37D633B846F1}">
-                <asvg:svgBlip xmlns:asvg="http://schemas.microsoft.com/office/drawing/2016/SVG/main" r:embed="rId3"/>
-              </a:ext>
-            </a:extLst>
-          </a:blip>
-          <a:stretch>
-            <a:fillRect/>
-          </a:stretch>
-        </p:blipFill>
-        <p:spPr>
-          <a:xfrm>
-            <a:off x="13730160" y="293399"/>
-            <a:ext cx="914400" cy="914400"/>
-          </a:xfrm>
-          <a:prstGeom prst="rect">
-            <a:avLst/>
-          </a:prstGeom>
-        </p:spPr>
-      </p:pic>
-      <p:pic>
-        <p:nvPicPr>
-          <p:cNvPr id="50" name="Graphic 49" descr="Bar chart RTL">
-            <a:extLst>
-              <a:ext uri="{FF2B5EF4-FFF2-40B4-BE49-F238E27FC236}">
-                <a16:creationId xmlns:a16="http://schemas.microsoft.com/office/drawing/2014/main" id="{930A53EC-5EBE-86E9-AFC5-6F1741EE1A72}"/>
-              </a:ext>
-            </a:extLst>
-          </p:cNvPr>
-          <p:cNvPicPr>
-            <a:picLocks noChangeAspect="1"/>
-          </p:cNvPicPr>
-          <p:nvPr/>
-        </p:nvPicPr>
-        <p:blipFill>
-          <a:blip r:embed="rId4">
-            <a:extLst>
-              <a:ext uri="{28A0092B-C50C-407E-A947-70E740481C1C}">
-                <a14:useLocalDpi xmlns:a14="http://schemas.microsoft.com/office/drawing/2010/main" val="0"/>
-              </a:ext>
-              <a:ext uri="{96DAC541-7B7A-43D3-8B79-37D633B846F1}">
-                <asvg:svgBlip xmlns:asvg="http://schemas.microsoft.com/office/drawing/2016/SVG/main" r:embed="rId5"/>
-              </a:ext>
-            </a:extLst>
-          </a:blip>
-          <a:stretch>
-            <a:fillRect/>
-          </a:stretch>
-        </p:blipFill>
-        <p:spPr>
-          <a:xfrm>
-            <a:off x="12838366" y="3151682"/>
-            <a:ext cx="1198880" cy="1198880"/>
-          </a:xfrm>
-          <a:prstGeom prst="rect">
-            <a:avLst/>
-          </a:prstGeom>
-        </p:spPr>
-      </p:pic>
-      <p:pic>
-        <p:nvPicPr>
-          <p:cNvPr id="52" name="Graphic 51" descr="Man changing baby">
-            <a:extLst>
-              <a:ext uri="{FF2B5EF4-FFF2-40B4-BE49-F238E27FC236}">
-                <a16:creationId xmlns:a16="http://schemas.microsoft.com/office/drawing/2014/main" id="{1782260A-73F5-3526-70E9-7BC73513DA77}"/>
-              </a:ext>
-            </a:extLst>
-          </p:cNvPr>
-          <p:cNvPicPr>
-            <a:picLocks noChangeAspect="1"/>
-          </p:cNvPicPr>
-          <p:nvPr/>
-        </p:nvPicPr>
-        <p:blipFill>
-          <a:blip r:embed="rId6">
-            <a:extLst>
-              <a:ext uri="{28A0092B-C50C-407E-A947-70E740481C1C}">
-                <a14:useLocalDpi xmlns:a14="http://schemas.microsoft.com/office/drawing/2010/main" val="0"/>
-              </a:ext>
-              <a:ext uri="{96DAC541-7B7A-43D3-8B79-37D633B846F1}">
-                <asvg:svgBlip xmlns:asvg="http://schemas.microsoft.com/office/drawing/2016/SVG/main" r:embed="rId7"/>
-              </a:ext>
-            </a:extLst>
-          </a:blip>
-          <a:stretch>
-            <a:fillRect/>
-          </a:stretch>
-        </p:blipFill>
-        <p:spPr>
-          <a:xfrm>
-            <a:off x="12838366" y="1230163"/>
-            <a:ext cx="914400" cy="914400"/>
-          </a:xfrm>
-          <a:prstGeom prst="rect">
-            <a:avLst/>
-          </a:prstGeom>
-        </p:spPr>
-      </p:pic>
-      <p:pic>
-        <p:nvPicPr>
-          <p:cNvPr id="54" name="Graphic 53" descr="Pie chart">
-            <a:extLst>
-              <a:ext uri="{FF2B5EF4-FFF2-40B4-BE49-F238E27FC236}">
-                <a16:creationId xmlns:a16="http://schemas.microsoft.com/office/drawing/2014/main" id="{A8680BD8-AEF2-8082-5237-CFF2A6C35B5F}"/>
-              </a:ext>
-            </a:extLst>
-          </p:cNvPr>
-          <p:cNvPicPr>
-            <a:picLocks noChangeAspect="1"/>
-          </p:cNvPicPr>
-          <p:nvPr/>
-        </p:nvPicPr>
-        <p:blipFill>
-          <a:blip r:embed="rId8">
-            <a:extLst>
-              <a:ext uri="{28A0092B-C50C-407E-A947-70E740481C1C}">
-                <a14:useLocalDpi xmlns:a14="http://schemas.microsoft.com/office/drawing/2010/main" val="0"/>
-              </a:ext>
-              <a:ext uri="{96DAC541-7B7A-43D3-8B79-37D633B846F1}">
-                <asvg:svgBlip xmlns:asvg="http://schemas.microsoft.com/office/drawing/2016/SVG/main" r:embed="rId9"/>
-              </a:ext>
-            </a:extLst>
-          </a:blip>
-          <a:stretch>
-            <a:fillRect/>
-          </a:stretch>
-        </p:blipFill>
-        <p:spPr>
-          <a:xfrm>
-            <a:off x="12097813" y="2069228"/>
-            <a:ext cx="1082454" cy="1082454"/>
-          </a:xfrm>
-          <a:prstGeom prst="rect">
-            <a:avLst/>
-          </a:prstGeom>
-        </p:spPr>
-      </p:pic>
       <p:grpSp>
         <p:nvGrpSpPr>
-          <p:cNvPr id="73" name="Group 72">
-            <a:extLst>
-              <a:ext uri="{FF2B5EF4-FFF2-40B4-BE49-F238E27FC236}">
-                <a16:creationId xmlns:a16="http://schemas.microsoft.com/office/drawing/2014/main" id="{3E5B5ADC-CFAE-5F45-70EB-A6BDB89AE105}"/>
+          <p:cNvPr id="28" name="Group 27">
+            <a:extLst>
+              <a:ext uri="{FF2B5EF4-FFF2-40B4-BE49-F238E27FC236}">
+                <a16:creationId xmlns:a16="http://schemas.microsoft.com/office/drawing/2014/main" id="{800BA599-BFAD-17D6-5463-5AA75A240A76}"/>
               </a:ext>
             </a:extLst>
           </p:cNvPr>
@@ -5714,18 +6501,18 @@
         </p:nvGrpSpPr>
         <p:grpSpPr>
           <a:xfrm>
-            <a:off x="476250" y="-8216"/>
-            <a:ext cx="11330438" cy="2123444"/>
-            <a:chOff x="476250" y="-8216"/>
-            <a:chExt cx="11330438" cy="2017951"/>
+            <a:off x="332204" y="313846"/>
+            <a:ext cx="11235902" cy="2017951"/>
+            <a:chOff x="332204" y="313846"/>
+            <a:chExt cx="11235902" cy="2017951"/>
           </a:xfrm>
         </p:grpSpPr>
         <p:pic>
           <p:nvPicPr>
-            <p:cNvPr id="72" name="Picture 71">
+            <p:cNvPr id="9" name="Picture 8">
               <a:extLst>
                 <a:ext uri="{FF2B5EF4-FFF2-40B4-BE49-F238E27FC236}">
-                  <a16:creationId xmlns:a16="http://schemas.microsoft.com/office/drawing/2014/main" id="{2FCEE5F4-77E2-27C4-6462-898FDE47A0C3}"/>
+                  <a16:creationId xmlns:a16="http://schemas.microsoft.com/office/drawing/2014/main" id="{1DCB7B71-A5D6-D4F2-2F43-834D2C39F4A5}"/>
                 </a:ext>
               </a:extLst>
             </p:cNvPr>
@@ -5735,14 +6522,14 @@
             <p:nvPr/>
           </p:nvPicPr>
           <p:blipFill>
-            <a:blip r:embed="rId10"/>
+            <a:blip r:embed="rId15"/>
             <a:stretch>
               <a:fillRect/>
             </a:stretch>
           </p:blipFill>
           <p:spPr>
             <a:xfrm>
-              <a:off x="508529" y="-8216"/>
+              <a:off x="332204" y="313846"/>
               <a:ext cx="11235902" cy="2017951"/>
             </a:xfrm>
             <a:prstGeom prst="rect">
@@ -5752,10 +6539,10 @@
         </p:pic>
         <p:sp>
           <p:nvSpPr>
-            <p:cNvPr id="4" name="TextBox 3">
+            <p:cNvPr id="14" name="TextBox 13">
               <a:extLst>
                 <a:ext uri="{FF2B5EF4-FFF2-40B4-BE49-F238E27FC236}">
-                  <a16:creationId xmlns:a16="http://schemas.microsoft.com/office/drawing/2014/main" id="{55293C82-9B5F-DC86-5006-7253D2B111DF}"/>
+                  <a16:creationId xmlns:a16="http://schemas.microsoft.com/office/drawing/2014/main" id="{DDE57065-E1A8-659A-461A-B73761C831A7}"/>
                 </a:ext>
               </a:extLst>
             </p:cNvPr>
@@ -5764,355 +6551,8 @@
           </p:nvSpPr>
           <p:spPr>
             <a:xfrm>
-              <a:off x="476250" y="100749"/>
-              <a:ext cx="11237214" cy="400110"/>
-            </a:xfrm>
-            <a:prstGeom prst="rect">
-              <a:avLst/>
-            </a:prstGeom>
-            <a:noFill/>
-          </p:spPr>
-          <p:txBody>
-            <a:bodyPr wrap="square" rtlCol="0">
-              <a:spAutoFit/>
-            </a:bodyPr>
-            <a:lstStyle/>
-            <a:p>
-              <a:pPr algn="ctr"/>
-              <a:r>
-                <a:rPr lang="en-US" sz="2000" b="1" i="1" dirty="0">
-                  <a:solidFill>
-                    <a:schemeClr val="tx1">
-                      <a:lumMod val="65000"/>
-                      <a:lumOff val="35000"/>
-                    </a:schemeClr>
-                  </a:solidFill>
-                  <a:effectLst/>
-                </a:rPr>
-                <a:t>3 MAJOR STAGES OF LIFE</a:t>
-              </a:r>
-              <a:endParaRPr lang="en-US" sz="2000" b="0" i="1" dirty="0">
-                <a:solidFill>
-                  <a:schemeClr val="tx1">
-                    <a:lumMod val="65000"/>
-                    <a:lumOff val="35000"/>
-                  </a:schemeClr>
-                </a:solidFill>
-                <a:effectLst/>
-              </a:endParaRPr>
-            </a:p>
-          </p:txBody>
-        </p:sp>
-        <p:grpSp>
-          <p:nvGrpSpPr>
-            <p:cNvPr id="42" name="Group 41">
-              <a:extLst>
-                <a:ext uri="{FF2B5EF4-FFF2-40B4-BE49-F238E27FC236}">
-                  <a16:creationId xmlns:a16="http://schemas.microsoft.com/office/drawing/2014/main" id="{C7E56B02-81A6-FF26-3EE7-63AE9723E2A4}"/>
-                </a:ext>
-              </a:extLst>
-            </p:cNvPr>
-            <p:cNvGrpSpPr/>
-            <p:nvPr/>
-          </p:nvGrpSpPr>
-          <p:grpSpPr>
-            <a:xfrm>
-              <a:off x="5570918" y="463264"/>
-              <a:ext cx="1047877" cy="849983"/>
-              <a:chOff x="4511040" y="1877124"/>
-              <a:chExt cx="1264920" cy="914400"/>
-            </a:xfrm>
-          </p:grpSpPr>
-          <p:pic>
-            <p:nvPicPr>
-              <p:cNvPr id="39" name="Graphic 38" descr="Office worker">
-                <a:extLst>
-                  <a:ext uri="{FF2B5EF4-FFF2-40B4-BE49-F238E27FC236}">
-                    <a16:creationId xmlns:a16="http://schemas.microsoft.com/office/drawing/2014/main" id="{18339F49-92EF-B92D-176D-83FDA51EA667}"/>
-                  </a:ext>
-                </a:extLst>
-              </p:cNvPr>
-              <p:cNvPicPr>
-                <a:picLocks noChangeAspect="1"/>
-              </p:cNvPicPr>
-              <p:nvPr/>
-            </p:nvPicPr>
-            <p:blipFill>
-              <a:blip r:embed="rId11">
-                <a:extLst>
-                  <a:ext uri="{28A0092B-C50C-407E-A947-70E740481C1C}">
-                    <a14:useLocalDpi xmlns:a14="http://schemas.microsoft.com/office/drawing/2010/main" val="0"/>
-                  </a:ext>
-                  <a:ext uri="{96DAC541-7B7A-43D3-8B79-37D633B846F1}">
-                    <asvg:svgBlip xmlns:asvg="http://schemas.microsoft.com/office/drawing/2016/SVG/main" r:embed="rId12"/>
-                  </a:ext>
-                </a:extLst>
-              </a:blip>
-              <a:stretch>
-                <a:fillRect/>
-              </a:stretch>
-            </p:blipFill>
-            <p:spPr>
-              <a:xfrm>
-                <a:off x="4511040" y="1877124"/>
-                <a:ext cx="914400" cy="914400"/>
-              </a:xfrm>
-              <a:prstGeom prst="rect">
-                <a:avLst/>
-              </a:prstGeom>
-            </p:spPr>
-          </p:pic>
-          <p:pic>
-            <p:nvPicPr>
-              <p:cNvPr id="41" name="Graphic 40" descr="Briefcase">
-                <a:extLst>
-                  <a:ext uri="{FF2B5EF4-FFF2-40B4-BE49-F238E27FC236}">
-                    <a16:creationId xmlns:a16="http://schemas.microsoft.com/office/drawing/2014/main" id="{EED70979-92E4-31CA-B815-56217BDEF4EE}"/>
-                  </a:ext>
-                </a:extLst>
-              </p:cNvPr>
-              <p:cNvPicPr>
-                <a:picLocks noChangeAspect="1"/>
-              </p:cNvPicPr>
-              <p:nvPr/>
-            </p:nvPicPr>
-            <p:blipFill>
-              <a:blip r:embed="rId13">
-                <a:extLst>
-                  <a:ext uri="{28A0092B-C50C-407E-A947-70E740481C1C}">
-                    <a14:useLocalDpi xmlns:a14="http://schemas.microsoft.com/office/drawing/2010/main" val="0"/>
-                  </a:ext>
-                  <a:ext uri="{96DAC541-7B7A-43D3-8B79-37D633B846F1}">
-                    <asvg:svgBlip xmlns:asvg="http://schemas.microsoft.com/office/drawing/2016/SVG/main" r:embed="rId14"/>
-                  </a:ext>
-                </a:extLst>
-              </a:blip>
-              <a:stretch>
-                <a:fillRect/>
-              </a:stretch>
-            </p:blipFill>
-            <p:spPr>
-              <a:xfrm>
-                <a:off x="5256034" y="2230958"/>
-                <a:ext cx="519926" cy="519926"/>
-              </a:xfrm>
-              <a:prstGeom prst="rect">
-                <a:avLst/>
-              </a:prstGeom>
-            </p:spPr>
-          </p:pic>
-        </p:grpSp>
-        <p:pic>
-          <p:nvPicPr>
-            <p:cNvPr id="56" name="Picture 55">
-              <a:extLst>
-                <a:ext uri="{FF2B5EF4-FFF2-40B4-BE49-F238E27FC236}">
-                  <a16:creationId xmlns:a16="http://schemas.microsoft.com/office/drawing/2014/main" id="{F37977D1-2847-C0F7-7541-5C3A37DCA779}"/>
-                </a:ext>
-              </a:extLst>
-            </p:cNvPr>
-            <p:cNvPicPr>
-              <a:picLocks noChangeAspect="1"/>
-            </p:cNvPicPr>
-            <p:nvPr/>
-          </p:nvPicPr>
-          <p:blipFill>
-            <a:blip r:embed="rId15">
-              <a:extLst>
-                <a:ext uri="{28A0092B-C50C-407E-A947-70E740481C1C}">
-                  <a14:useLocalDpi xmlns:a14="http://schemas.microsoft.com/office/drawing/2010/main" val="0"/>
-                </a:ext>
-              </a:extLst>
-            </a:blip>
-            <a:stretch>
-              <a:fillRect/>
-            </a:stretch>
-          </p:blipFill>
-          <p:spPr>
-            <a:xfrm>
-              <a:off x="9010958" y="142926"/>
-              <a:ext cx="1221124" cy="1095959"/>
-            </a:xfrm>
-            <a:prstGeom prst="rect">
-              <a:avLst/>
-            </a:prstGeom>
-          </p:spPr>
-        </p:pic>
-        <p:grpSp>
-          <p:nvGrpSpPr>
-            <p:cNvPr id="59" name="Group 58">
-              <a:extLst>
-                <a:ext uri="{FF2B5EF4-FFF2-40B4-BE49-F238E27FC236}">
-                  <a16:creationId xmlns:a16="http://schemas.microsoft.com/office/drawing/2014/main" id="{6DAE5E8A-CD96-6ADD-BA05-5E9008751A36}"/>
-                </a:ext>
-              </a:extLst>
-            </p:cNvPr>
-            <p:cNvGrpSpPr/>
-            <p:nvPr/>
-          </p:nvGrpSpPr>
-          <p:grpSpPr>
-            <a:xfrm>
-              <a:off x="1684471" y="156970"/>
-              <a:ext cx="1418378" cy="1129170"/>
-              <a:chOff x="1320414" y="416559"/>
-              <a:chExt cx="1418378" cy="1129170"/>
-            </a:xfrm>
-          </p:grpSpPr>
-          <p:grpSp>
-            <p:nvGrpSpPr>
-              <p:cNvPr id="37" name="Group 36">
-                <a:extLst>
-                  <a:ext uri="{FF2B5EF4-FFF2-40B4-BE49-F238E27FC236}">
-                    <a16:creationId xmlns:a16="http://schemas.microsoft.com/office/drawing/2014/main" id="{0116B90B-D058-5059-CC0D-190AD76EDA3A}"/>
-                  </a:ext>
-                </a:extLst>
-              </p:cNvPr>
-              <p:cNvGrpSpPr/>
-              <p:nvPr/>
-            </p:nvGrpSpPr>
-            <p:grpSpPr>
-              <a:xfrm>
-                <a:off x="2044842" y="416559"/>
-                <a:ext cx="693950" cy="1126933"/>
-                <a:chOff x="962130" y="179005"/>
-                <a:chExt cx="924560" cy="1405128"/>
-              </a:xfrm>
-            </p:grpSpPr>
-            <p:pic>
-              <p:nvPicPr>
-                <p:cNvPr id="30" name="Graphic 29" descr="Books">
-                  <a:extLst>
-                    <a:ext uri="{FF2B5EF4-FFF2-40B4-BE49-F238E27FC236}">
-                      <a16:creationId xmlns:a16="http://schemas.microsoft.com/office/drawing/2014/main" id="{5EDC206C-91E3-8E5D-CC6C-41BA5E36D1E7}"/>
-                    </a:ext>
-                  </a:extLst>
-                </p:cNvPr>
-                <p:cNvPicPr>
-                  <a:picLocks noChangeAspect="1"/>
-                </p:cNvPicPr>
-                <p:nvPr/>
-              </p:nvPicPr>
-              <p:blipFill>
-                <a:blip r:embed="rId16">
-                  <a:extLst>
-                    <a:ext uri="{28A0092B-C50C-407E-A947-70E740481C1C}">
-                      <a14:useLocalDpi xmlns:a14="http://schemas.microsoft.com/office/drawing/2010/main" val="0"/>
-                    </a:ext>
-                    <a:ext uri="{96DAC541-7B7A-43D3-8B79-37D633B846F1}">
-                      <asvg:svgBlip xmlns:asvg="http://schemas.microsoft.com/office/drawing/2016/SVG/main" r:embed="rId17"/>
-                    </a:ext>
-                  </a:extLst>
-                </a:blip>
-                <a:stretch>
-                  <a:fillRect/>
-                </a:stretch>
-              </p:blipFill>
-              <p:spPr>
-                <a:xfrm>
-                  <a:off x="972290" y="669733"/>
-                  <a:ext cx="914400" cy="914400"/>
-                </a:xfrm>
-                <a:prstGeom prst="rect">
-                  <a:avLst/>
-                </a:prstGeom>
-              </p:spPr>
-            </p:pic>
-            <p:pic>
-              <p:nvPicPr>
-                <p:cNvPr id="34" name="Graphic 33" descr="Graduation cap">
-                  <a:extLst>
-                    <a:ext uri="{FF2B5EF4-FFF2-40B4-BE49-F238E27FC236}">
-                      <a16:creationId xmlns:a16="http://schemas.microsoft.com/office/drawing/2014/main" id="{22C573B1-DA24-07B6-6E5C-596469B07AC7}"/>
-                    </a:ext>
-                  </a:extLst>
-                </p:cNvPr>
-                <p:cNvPicPr>
-                  <a:picLocks noChangeAspect="1"/>
-                </p:cNvPicPr>
-                <p:nvPr/>
-              </p:nvPicPr>
-              <p:blipFill>
-                <a:blip r:embed="rId18">
-                  <a:extLst>
-                    <a:ext uri="{28A0092B-C50C-407E-A947-70E740481C1C}">
-                      <a14:useLocalDpi xmlns:a14="http://schemas.microsoft.com/office/drawing/2010/main" val="0"/>
-                    </a:ext>
-                    <a:ext uri="{96DAC541-7B7A-43D3-8B79-37D633B846F1}">
-                      <asvg:svgBlip xmlns:asvg="http://schemas.microsoft.com/office/drawing/2016/SVG/main" r:embed="rId19"/>
-                    </a:ext>
-                  </a:extLst>
-                </a:blip>
-                <a:stretch>
-                  <a:fillRect/>
-                </a:stretch>
-              </p:blipFill>
-              <p:spPr>
-                <a:xfrm>
-                  <a:off x="962130" y="179005"/>
-                  <a:ext cx="914400" cy="914400"/>
-                </a:xfrm>
-                <a:prstGeom prst="rect">
-                  <a:avLst/>
-                </a:prstGeom>
-              </p:spPr>
-            </p:pic>
-          </p:grpSp>
-          <p:pic>
-            <p:nvPicPr>
-              <p:cNvPr id="58" name="Graphic 57" descr="Baby crawling">
-                <a:extLst>
-                  <a:ext uri="{FF2B5EF4-FFF2-40B4-BE49-F238E27FC236}">
-                    <a16:creationId xmlns:a16="http://schemas.microsoft.com/office/drawing/2014/main" id="{CE8A0943-F23B-276D-43FC-7187A5F87617}"/>
-                  </a:ext>
-                </a:extLst>
-              </p:cNvPr>
-              <p:cNvPicPr>
-                <a:picLocks noChangeAspect="1"/>
-              </p:cNvPicPr>
-              <p:nvPr/>
-            </p:nvPicPr>
-            <p:blipFill>
-              <a:blip r:embed="rId20">
-                <a:extLst>
-                  <a:ext uri="{28A0092B-C50C-407E-A947-70E740481C1C}">
-                    <a14:useLocalDpi xmlns:a14="http://schemas.microsoft.com/office/drawing/2010/main" val="0"/>
-                  </a:ext>
-                  <a:ext uri="{96DAC541-7B7A-43D3-8B79-37D633B846F1}">
-                    <asvg:svgBlip xmlns:asvg="http://schemas.microsoft.com/office/drawing/2016/SVG/main" r:embed="rId21"/>
-                  </a:ext>
-                </a:extLst>
-              </a:blip>
-              <a:stretch>
-                <a:fillRect/>
-              </a:stretch>
-            </p:blipFill>
-            <p:spPr>
-              <a:xfrm rot="21440613">
-                <a:off x="1320414" y="837336"/>
-                <a:ext cx="708393" cy="708393"/>
-              </a:xfrm>
-              <a:prstGeom prst="rect">
-                <a:avLst/>
-              </a:prstGeom>
-            </p:spPr>
-          </p:pic>
-        </p:grpSp>
-        <p:sp>
-          <p:nvSpPr>
-            <p:cNvPr id="60" name="TextBox 59">
-              <a:extLst>
-                <a:ext uri="{FF2B5EF4-FFF2-40B4-BE49-F238E27FC236}">
-                  <a16:creationId xmlns:a16="http://schemas.microsoft.com/office/drawing/2014/main" id="{85DE82DB-603B-6227-18B8-0798996FDC4D}"/>
-                </a:ext>
-              </a:extLst>
-            </p:cNvPr>
-            <p:cNvSpPr txBox="1"/>
-            <p:nvPr/>
-          </p:nvSpPr>
-          <p:spPr>
-            <a:xfrm>
-              <a:off x="569474" y="1155812"/>
-              <a:ext cx="11237214" cy="584775"/>
+              <a:off x="6651057" y="1232230"/>
+              <a:ext cx="2499361" cy="830997"/>
             </a:xfrm>
             <a:prstGeom prst="rect">
               <a:avLst/>
@@ -6126,7 +6566,7 @@
             <a:lstStyle/>
             <a:p>
               <a:r>
-                <a:rPr lang="en-US" sz="1400" b="1" i="1" dirty="0">
+                <a:rPr lang="en-US" sz="2400" b="1" dirty="0">
                   <a:solidFill>
                     <a:schemeClr val="tx1">
                       <a:lumMod val="65000"/>
@@ -6134,47 +6574,12 @@
                     </a:schemeClr>
                   </a:solidFill>
                 </a:rPr>
-                <a:t>	            </a:t>
-              </a:r>
-              <a:r>
-                <a:rPr lang="en-US" sz="1400" b="1" i="1" dirty="0">
-                  <a:solidFill>
-                    <a:schemeClr val="tx1">
-                      <a:lumMod val="65000"/>
-                      <a:lumOff val="35000"/>
-                    </a:schemeClr>
-                  </a:solidFill>
-                  <a:effectLst/>
-                </a:rPr>
-                <a:t>EDUCATION			  </a:t>
-              </a:r>
-              <a:r>
-                <a:rPr lang="en-US" b="1" i="1" dirty="0">
-                  <a:solidFill>
-                    <a:schemeClr val="accent6">
-                      <a:lumMod val="50000"/>
-                    </a:schemeClr>
-                  </a:solidFill>
-                  <a:effectLst/>
-                </a:rPr>
-                <a:t>WORKING STAGE</a:t>
-              </a:r>
-              <a:r>
-                <a:rPr lang="en-US" sz="1400" b="1" i="1" dirty="0">
-                  <a:solidFill>
-                    <a:schemeClr val="tx1">
-                      <a:lumMod val="65000"/>
-                      <a:lumOff val="35000"/>
-                    </a:schemeClr>
-                  </a:solidFill>
-                  <a:effectLst/>
-                </a:rPr>
-                <a:t>			       RETIREMENT</a:t>
+                <a:t>10 Leading </a:t>
               </a:r>
             </a:p>
             <a:p>
               <a:r>
-                <a:rPr lang="en-US" sz="1400" b="1" i="1" dirty="0">
+                <a:rPr lang="en-US" sz="2400" b="1" dirty="0">
                   <a:solidFill>
                     <a:schemeClr val="tx1">
                       <a:lumMod val="65000"/>
@@ -6182,65 +6587,9 @@
                     </a:schemeClr>
                   </a:solidFill>
                 </a:rPr>
-                <a:t>	           </a:t>
+                <a:t>Causes of Death</a:t>
               </a:r>
-              <a:r>
-                <a:rPr lang="en-US" sz="1400" b="1" i="1" dirty="0">
-                  <a:solidFill>
-                    <a:srgbClr val="C00000"/>
-                  </a:solidFill>
-                </a:rPr>
-                <a:t> (no income)							        (no income)</a:t>
-              </a:r>
-              <a:endParaRPr lang="en-US" sz="1400" b="0" i="1" dirty="0">
-                <a:solidFill>
-                  <a:srgbClr val="C00000"/>
-                </a:solidFill>
-                <a:effectLst/>
-              </a:endParaRPr>
-            </a:p>
-          </p:txBody>
-        </p:sp>
-        <p:sp>
-          <p:nvSpPr>
-            <p:cNvPr id="61" name="TextBox 60">
-              <a:extLst>
-                <a:ext uri="{FF2B5EF4-FFF2-40B4-BE49-F238E27FC236}">
-                  <a16:creationId xmlns:a16="http://schemas.microsoft.com/office/drawing/2014/main" id="{DBB05038-6DBF-9AF0-5AD4-1C196BB3A3EB}"/>
-                </a:ext>
-              </a:extLst>
-            </p:cNvPr>
-            <p:cNvSpPr txBox="1"/>
-            <p:nvPr/>
-          </p:nvSpPr>
-          <p:spPr>
-            <a:xfrm>
-              <a:off x="1381126" y="633685"/>
-              <a:ext cx="461929" cy="584775"/>
-            </a:xfrm>
-            <a:prstGeom prst="rect">
-              <a:avLst/>
-            </a:prstGeom>
-            <a:noFill/>
-          </p:spPr>
-          <p:txBody>
-            <a:bodyPr wrap="square" rtlCol="0">
-              <a:spAutoFit/>
-            </a:bodyPr>
-            <a:lstStyle/>
-            <a:p>
-              <a:r>
-                <a:rPr lang="en-US" sz="3200" b="1" dirty="0">
-                  <a:solidFill>
-                    <a:schemeClr val="tx1">
-                      <a:lumMod val="65000"/>
-                      <a:lumOff val="35000"/>
-                    </a:schemeClr>
-                  </a:solidFill>
-                </a:rPr>
-                <a:t>0</a:t>
-              </a:r>
-              <a:endParaRPr lang="en-PH" sz="3200" b="1" dirty="0">
+              <a:endParaRPr lang="en-PH" sz="2400" b="1" dirty="0">
                 <a:solidFill>
                   <a:schemeClr val="tx1">
                     <a:lumMod val="65000"/>
@@ -6251,183 +6600,12 @@
             </a:p>
           </p:txBody>
         </p:sp>
-        <p:sp>
-          <p:nvSpPr>
-            <p:cNvPr id="62" name="TextBox 61">
+        <p:grpSp>
+          <p:nvGrpSpPr>
+            <p:cNvPr id="18" name="Group 17">
               <a:extLst>
                 <a:ext uri="{FF2B5EF4-FFF2-40B4-BE49-F238E27FC236}">
-                  <a16:creationId xmlns:a16="http://schemas.microsoft.com/office/drawing/2014/main" id="{786A2140-4326-FF7A-6942-09F9F4FA68D1}"/>
-                </a:ext>
-              </a:extLst>
-            </p:cNvPr>
-            <p:cNvSpPr txBox="1"/>
-            <p:nvPr/>
-          </p:nvSpPr>
-          <p:spPr>
-            <a:xfrm>
-              <a:off x="3048030" y="633600"/>
-              <a:ext cx="599416" cy="584775"/>
-            </a:xfrm>
-            <a:prstGeom prst="rect">
-              <a:avLst/>
-            </a:prstGeom>
-            <a:noFill/>
-          </p:spPr>
-          <p:txBody>
-            <a:bodyPr wrap="square" rtlCol="0">
-              <a:spAutoFit/>
-            </a:bodyPr>
-            <a:lstStyle/>
-            <a:p>
-              <a:r>
-                <a:rPr lang="en-US" sz="3200" b="1" dirty="0">
-                  <a:solidFill>
-                    <a:schemeClr val="tx1">
-                      <a:lumMod val="65000"/>
-                      <a:lumOff val="35000"/>
-                    </a:schemeClr>
-                  </a:solidFill>
-                </a:rPr>
-                <a:t>20</a:t>
-              </a:r>
-              <a:endParaRPr lang="en-PH" sz="3200" b="1" dirty="0">
-                <a:solidFill>
-                  <a:schemeClr val="tx1">
-                    <a:lumMod val="65000"/>
-                    <a:lumOff val="35000"/>
-                  </a:schemeClr>
-                </a:solidFill>
-              </a:endParaRPr>
-            </a:p>
-          </p:txBody>
-        </p:sp>
-        <p:sp>
-          <p:nvSpPr>
-            <p:cNvPr id="63" name="TextBox 62">
-              <a:extLst>
-                <a:ext uri="{FF2B5EF4-FFF2-40B4-BE49-F238E27FC236}">
-                  <a16:creationId xmlns:a16="http://schemas.microsoft.com/office/drawing/2014/main" id="{E3354032-9571-8CA1-6755-DADBE53C4C25}"/>
-                </a:ext>
-              </a:extLst>
-            </p:cNvPr>
-            <p:cNvSpPr txBox="1"/>
-            <p:nvPr/>
-          </p:nvSpPr>
-          <p:spPr>
-            <a:xfrm>
-              <a:off x="8565780" y="643087"/>
-              <a:ext cx="601685" cy="584775"/>
-            </a:xfrm>
-            <a:prstGeom prst="rect">
-              <a:avLst/>
-            </a:prstGeom>
-            <a:noFill/>
-          </p:spPr>
-          <p:txBody>
-            <a:bodyPr wrap="square" rtlCol="0">
-              <a:spAutoFit/>
-            </a:bodyPr>
-            <a:lstStyle/>
-            <a:p>
-              <a:r>
-                <a:rPr lang="en-US" sz="3200" b="1" dirty="0">
-                  <a:solidFill>
-                    <a:schemeClr val="tx1">
-                      <a:lumMod val="65000"/>
-                      <a:lumOff val="35000"/>
-                    </a:schemeClr>
-                  </a:solidFill>
-                </a:rPr>
-                <a:t>60</a:t>
-              </a:r>
-              <a:endParaRPr lang="en-PH" sz="3200" b="1" dirty="0">
-                <a:solidFill>
-                  <a:schemeClr val="tx1">
-                    <a:lumMod val="65000"/>
-                    <a:lumOff val="35000"/>
-                  </a:schemeClr>
-                </a:solidFill>
-              </a:endParaRPr>
-            </a:p>
-          </p:txBody>
-        </p:sp>
-        <p:sp>
-          <p:nvSpPr>
-            <p:cNvPr id="66" name="TextBox 65">
-              <a:extLst>
-                <a:ext uri="{FF2B5EF4-FFF2-40B4-BE49-F238E27FC236}">
-                  <a16:creationId xmlns:a16="http://schemas.microsoft.com/office/drawing/2014/main" id="{73EB994D-99F7-8A1B-A79A-1BD6471287A5}"/>
-                </a:ext>
-              </a:extLst>
-            </p:cNvPr>
-            <p:cNvSpPr txBox="1"/>
-            <p:nvPr/>
-          </p:nvSpPr>
-          <p:spPr>
-            <a:xfrm>
-              <a:off x="10061569" y="643086"/>
-              <a:ext cx="841399" cy="584775"/>
-            </a:xfrm>
-            <a:prstGeom prst="rect">
-              <a:avLst/>
-            </a:prstGeom>
-            <a:noFill/>
-          </p:spPr>
-          <p:txBody>
-            <a:bodyPr wrap="square" rtlCol="0">
-              <a:spAutoFit/>
-            </a:bodyPr>
-            <a:lstStyle/>
-            <a:p>
-              <a:r>
-                <a:rPr lang="en-US" sz="3200" b="1" dirty="0">
-                  <a:solidFill>
-                    <a:schemeClr val="tx1">
-                      <a:lumMod val="65000"/>
-                      <a:lumOff val="35000"/>
-                    </a:schemeClr>
-                  </a:solidFill>
-                </a:rPr>
-                <a:t>100</a:t>
-              </a:r>
-              <a:endParaRPr lang="en-PH" sz="3200" b="1" dirty="0">
-                <a:solidFill>
-                  <a:schemeClr val="tx1">
-                    <a:lumMod val="65000"/>
-                    <a:lumOff val="35000"/>
-                  </a:schemeClr>
-                </a:solidFill>
-              </a:endParaRPr>
-            </a:p>
-          </p:txBody>
-        </p:sp>
-      </p:grpSp>
-      <p:grpSp>
-        <p:nvGrpSpPr>
-          <p:cNvPr id="80" name="Group 79">
-            <a:extLst>
-              <a:ext uri="{FF2B5EF4-FFF2-40B4-BE49-F238E27FC236}">
-                <a16:creationId xmlns:a16="http://schemas.microsoft.com/office/drawing/2014/main" id="{EE4AA5E3-0369-4E86-0F28-FFCC0A053BE8}"/>
-              </a:ext>
-            </a:extLst>
-          </p:cNvPr>
-          <p:cNvGrpSpPr/>
-          <p:nvPr/>
-        </p:nvGrpSpPr>
-        <p:grpSpPr>
-          <a:xfrm>
-            <a:off x="332204" y="3112393"/>
-            <a:ext cx="11234928" cy="2017776"/>
-            <a:chOff x="332204" y="3008711"/>
-            <a:chExt cx="11234928" cy="2017776"/>
-          </a:xfrm>
-        </p:grpSpPr>
-        <p:grpSp>
-          <p:nvGrpSpPr>
-            <p:cNvPr id="75" name="Group 74">
-              <a:extLst>
-                <a:ext uri="{FF2B5EF4-FFF2-40B4-BE49-F238E27FC236}">
-                  <a16:creationId xmlns:a16="http://schemas.microsoft.com/office/drawing/2014/main" id="{1AC56FFE-0E44-ACAA-2F09-9CB36B2822AC}"/>
+                  <a16:creationId xmlns:a16="http://schemas.microsoft.com/office/drawing/2014/main" id="{52D6BA2F-B3DA-FC56-0D3D-F4CEC9AC92CA}"/>
                 </a:ext>
               </a:extLst>
             </p:cNvPr>
@@ -6436,129 +6614,18 @@
           </p:nvGrpSpPr>
           <p:grpSpPr>
             <a:xfrm>
-              <a:off x="332204" y="3008711"/>
-              <a:ext cx="11234928" cy="2017776"/>
-              <a:chOff x="332204" y="3008711"/>
-              <a:chExt cx="11234928" cy="2017776"/>
+              <a:off x="1896179" y="632420"/>
+              <a:ext cx="4952655" cy="1323439"/>
+              <a:chOff x="2538333" y="765710"/>
+              <a:chExt cx="4598442" cy="1323439"/>
             </a:xfrm>
           </p:grpSpPr>
-          <p:grpSp>
-            <p:nvGrpSpPr>
-              <p:cNvPr id="68" name="Group 67">
+          <p:sp>
+            <p:nvSpPr>
+              <p:cNvPr id="15" name="TextBox 14">
                 <a:extLst>
                   <a:ext uri="{FF2B5EF4-FFF2-40B4-BE49-F238E27FC236}">
-                    <a16:creationId xmlns:a16="http://schemas.microsoft.com/office/drawing/2014/main" id="{37F85369-EC0C-BFBB-E697-2645F6897737}"/>
-                  </a:ext>
-                </a:extLst>
-              </p:cNvPr>
-              <p:cNvGrpSpPr/>
-              <p:nvPr/>
-            </p:nvGrpSpPr>
-            <p:grpSpPr>
-              <a:xfrm>
-                <a:off x="332204" y="3008711"/>
-                <a:ext cx="11234928" cy="2017776"/>
-                <a:chOff x="302133" y="3184884"/>
-                <a:chExt cx="11234928" cy="2017776"/>
-              </a:xfrm>
-            </p:grpSpPr>
-            <p:pic>
-              <p:nvPicPr>
-                <p:cNvPr id="44" name="Picture 43">
-                  <a:extLst>
-                    <a:ext uri="{FF2B5EF4-FFF2-40B4-BE49-F238E27FC236}">
-                      <a16:creationId xmlns:a16="http://schemas.microsoft.com/office/drawing/2014/main" id="{BEAB5C5C-D88A-F81B-B11A-016EF7831D55}"/>
-                    </a:ext>
-                  </a:extLst>
-                </p:cNvPr>
-                <p:cNvPicPr>
-                  <a:picLocks noChangeAspect="1"/>
-                </p:cNvPicPr>
-                <p:nvPr/>
-              </p:nvPicPr>
-              <p:blipFill>
-                <a:blip r:embed="rId22">
-                  <a:extLst>
-                    <a:ext uri="{28A0092B-C50C-407E-A947-70E740481C1C}">
-                      <a14:useLocalDpi xmlns:a14="http://schemas.microsoft.com/office/drawing/2010/main" val="0"/>
-                    </a:ext>
-                  </a:extLst>
-                </a:blip>
-                <a:stretch>
-                  <a:fillRect/>
-                </a:stretch>
-              </p:blipFill>
-              <p:spPr>
-                <a:xfrm>
-                  <a:off x="302133" y="3184884"/>
-                  <a:ext cx="11234928" cy="2017776"/>
-                </a:xfrm>
-                <a:prstGeom prst="rect">
-                  <a:avLst/>
-                </a:prstGeom>
-              </p:spPr>
-            </p:pic>
-            <p:sp>
-              <p:nvSpPr>
-                <p:cNvPr id="45" name="Rectangle 44">
-                  <a:extLst>
-                    <a:ext uri="{FF2B5EF4-FFF2-40B4-BE49-F238E27FC236}">
-                      <a16:creationId xmlns:a16="http://schemas.microsoft.com/office/drawing/2014/main" id="{194AE3F0-18DC-2F33-3074-BAEDF2EE3988}"/>
-                    </a:ext>
-                  </a:extLst>
-                </p:cNvPr>
-                <p:cNvSpPr/>
-                <p:nvPr/>
-              </p:nvSpPr>
-              <p:spPr>
-                <a:xfrm>
-                  <a:off x="1158240" y="3342319"/>
-                  <a:ext cx="8676640" cy="1498438"/>
-                </a:xfrm>
-                <a:prstGeom prst="rect">
-                  <a:avLst/>
-                </a:prstGeom>
-                <a:solidFill>
-                  <a:schemeClr val="bg1"/>
-                </a:solidFill>
-                <a:ln>
-                  <a:solidFill>
-                    <a:schemeClr val="bg1"/>
-                  </a:solidFill>
-                </a:ln>
-              </p:spPr>
-              <p:style>
-                <a:lnRef idx="2">
-                  <a:schemeClr val="accent1">
-                    <a:shade val="50000"/>
-                  </a:schemeClr>
-                </a:lnRef>
-                <a:fillRef idx="1">
-                  <a:schemeClr val="accent1"/>
-                </a:fillRef>
-                <a:effectRef idx="0">
-                  <a:schemeClr val="accent1"/>
-                </a:effectRef>
-                <a:fontRef idx="minor">
-                  <a:schemeClr val="lt1"/>
-                </a:fontRef>
-              </p:style>
-              <p:txBody>
-                <a:bodyPr rtlCol="0" anchor="ctr"/>
-                <a:lstStyle/>
-                <a:p>
-                  <a:pPr algn="ctr"/>
-                  <a:endParaRPr lang="en-PH"/>
-                </a:p>
-              </p:txBody>
-            </p:sp>
-          </p:grpSp>
-          <p:sp>
-            <p:nvSpPr>
-              <p:cNvPr id="74" name="TextBox 73">
-                <a:extLst>
-                  <a:ext uri="{FF2B5EF4-FFF2-40B4-BE49-F238E27FC236}">
-                    <a16:creationId xmlns:a16="http://schemas.microsoft.com/office/drawing/2014/main" id="{0F385419-8445-4148-EBC0-46222A220333}"/>
+                    <a16:creationId xmlns:a16="http://schemas.microsoft.com/office/drawing/2014/main" id="{04AA899D-E777-3857-2A5D-31DEE4490F6C}"/>
                   </a:ext>
                 </a:extLst>
               </p:cNvPr>
@@ -6567,8 +6634,8 @@
             </p:nvSpPr>
             <p:spPr>
               <a:xfrm>
-                <a:off x="332204" y="3308384"/>
-                <a:ext cx="11234928" cy="1200329"/>
+                <a:off x="2538333" y="765710"/>
+                <a:ext cx="2490270" cy="1323439"/>
               </a:xfrm>
               <a:prstGeom prst="rect">
                 <a:avLst/>
@@ -6581,46 +6648,70 @@
               </a:bodyPr>
               <a:lstStyle/>
               <a:p>
-                <a:pPr algn="ctr"/>
                 <a:r>
-                  <a:rPr lang="en-US" sz="2000" b="1" i="1" dirty="0">
-                    <a:solidFill>
-                      <a:schemeClr val="accent6">
-                        <a:lumMod val="50000"/>
-                      </a:schemeClr>
-                    </a:solidFill>
-                    <a:effectLst/>
-                  </a:rPr>
-                  <a:t>In GOAL SETTING</a:t>
-                </a:r>
-                <a:r>
-                  <a:rPr lang="en-US" sz="2000" b="1" i="1" dirty="0">
+                  <a:rPr lang="en-US" sz="1600" i="1" dirty="0">
                     <a:solidFill>
                       <a:schemeClr val="tx1">
                         <a:lumMod val="65000"/>
                         <a:lumOff val="35000"/>
                       </a:schemeClr>
                     </a:solidFill>
-                    <a:effectLst/>
                   </a:rPr>
-                  <a:t>, </a:t>
+                  <a:t>1.    Coronary Heart Disease</a:t>
                 </a:r>
               </a:p>
               <a:p>
-                <a:pPr algn="ctr"/>
                 <a:r>
-                  <a:rPr lang="en-US" sz="2000" b="1" i="1" dirty="0">
+                  <a:rPr lang="en-US" sz="1600" i="1" dirty="0">
                     <a:solidFill>
                       <a:schemeClr val="tx1">
                         <a:lumMod val="65000"/>
                         <a:lumOff val="35000"/>
                       </a:schemeClr>
                     </a:solidFill>
-                    <a:effectLst/>
                   </a:rPr>
-                  <a:t>be</a:t>
+                  <a:t>2.    Influenza and Pneumonia</a:t>
                 </a:r>
-                <a:endParaRPr lang="en-US" sz="2000" b="1" i="1" dirty="0">
+              </a:p>
+              <a:p>
+                <a:r>
+                  <a:rPr lang="en-US" sz="1600" i="1" dirty="0">
+                    <a:solidFill>
+                      <a:schemeClr val="tx1">
+                        <a:lumMod val="65000"/>
+                        <a:lumOff val="35000"/>
+                      </a:schemeClr>
+                    </a:solidFill>
+                  </a:rPr>
+                  <a:t>3.    Stroke</a:t>
+                </a:r>
+              </a:p>
+              <a:p>
+                <a:r>
+                  <a:rPr lang="en-US" sz="1600" i="1" dirty="0">
+                    <a:solidFill>
+                      <a:schemeClr val="tx1">
+                        <a:lumMod val="65000"/>
+                        <a:lumOff val="35000"/>
+                      </a:schemeClr>
+                    </a:solidFill>
+                  </a:rPr>
+                  <a:t>4.    Kidney Disease</a:t>
+                </a:r>
+              </a:p>
+              <a:p>
+                <a:r>
+                  <a:rPr lang="en-US" sz="1600" i="1" dirty="0">
+                    <a:solidFill>
+                      <a:schemeClr val="tx1">
+                        <a:lumMod val="65000"/>
+                        <a:lumOff val="35000"/>
+                      </a:schemeClr>
+                    </a:solidFill>
+                  </a:rPr>
+                  <a:t>5.    Lung Disease</a:t>
+                </a:r>
+                <a:endParaRPr lang="en-PH" sz="1600" i="1" dirty="0">
                   <a:solidFill>
                     <a:schemeClr val="tx1">
                       <a:lumMod val="65000"/>
@@ -6629,136 +6720,227 @@
                   </a:solidFill>
                 </a:endParaRPr>
               </a:p>
+            </p:txBody>
+          </p:sp>
+          <p:sp>
+            <p:nvSpPr>
+              <p:cNvPr id="17" name="TextBox 16">
+                <a:extLst>
+                  <a:ext uri="{FF2B5EF4-FFF2-40B4-BE49-F238E27FC236}">
+                    <a16:creationId xmlns:a16="http://schemas.microsoft.com/office/drawing/2014/main" id="{7839445B-FB40-C419-0124-0045E617F92B}"/>
+                  </a:ext>
+                </a:extLst>
+              </p:cNvPr>
+              <p:cNvSpPr txBox="1"/>
+              <p:nvPr/>
+            </p:nvSpPr>
+            <p:spPr>
+              <a:xfrm>
+                <a:off x="5093305" y="765710"/>
+                <a:ext cx="2043470" cy="1323439"/>
+              </a:xfrm>
+              <a:prstGeom prst="rect">
+                <a:avLst/>
+              </a:prstGeom>
+              <a:noFill/>
+            </p:spPr>
+            <p:txBody>
+              <a:bodyPr wrap="square" rtlCol="0">
+                <a:spAutoFit/>
+              </a:bodyPr>
+              <a:lstStyle/>
               <a:p>
-                <a:pPr algn="ctr"/>
                 <a:r>
-                  <a:rPr lang="en-US" sz="3200" b="1" dirty="0">
+                  <a:rPr lang="en-US" sz="1600" i="1" dirty="0">
                     <a:solidFill>
-                      <a:srgbClr val="002060"/>
+                      <a:schemeClr val="tx1">
+                        <a:lumMod val="65000"/>
+                        <a:lumOff val="35000"/>
+                      </a:schemeClr>
                     </a:solidFill>
                   </a:rPr>
-                  <a:t>S</a:t>
+                  <a:t>6.    Hypertension</a:t>
                 </a:r>
+              </a:p>
+              <a:p>
                 <a:r>
-                  <a:rPr lang="en-US" sz="2000" b="1" i="1" dirty="0">
+                  <a:rPr lang="en-US" sz="1600" i="1" dirty="0">
                     <a:solidFill>
-                      <a:srgbClr val="002060"/>
+                      <a:schemeClr val="tx1">
+                        <a:lumMod val="65000"/>
+                        <a:lumOff val="35000"/>
+                      </a:schemeClr>
                     </a:solidFill>
                   </a:rPr>
-                  <a:t>pecific</a:t>
+                  <a:t>7.    Diabetes Mellitus</a:t>
                 </a:r>
+              </a:p>
+              <a:p>
                 <a:r>
-                  <a:rPr lang="en-US" sz="2000" b="1" dirty="0">
+                  <a:rPr lang="en-US" sz="1600" i="1" dirty="0">
                     <a:solidFill>
-                      <a:srgbClr val="002060"/>
+                      <a:schemeClr val="tx1">
+                        <a:lumMod val="65000"/>
+                        <a:lumOff val="35000"/>
+                      </a:schemeClr>
                     </a:solidFill>
                   </a:rPr>
-                  <a:t> | </a:t>
+                  <a:t>8.    Tuberculosis</a:t>
                 </a:r>
+              </a:p>
+              <a:p>
                 <a:r>
-                  <a:rPr lang="en-US" sz="3200" b="1" dirty="0">
+                  <a:rPr lang="en-US" sz="1600" i="1" dirty="0">
                     <a:solidFill>
-                      <a:srgbClr val="002060"/>
+                      <a:schemeClr val="tx1">
+                        <a:lumMod val="65000"/>
+                        <a:lumOff val="35000"/>
+                      </a:schemeClr>
                     </a:solidFill>
                   </a:rPr>
-                  <a:t>M</a:t>
+                  <a:t>9.    Breast Cancer</a:t>
                 </a:r>
+              </a:p>
+              <a:p>
                 <a:r>
-                  <a:rPr lang="en-US" sz="2000" b="1" i="1" dirty="0">
+                  <a:rPr lang="en-US" sz="1600" i="1" dirty="0">
                     <a:solidFill>
-                      <a:srgbClr val="002060"/>
+                      <a:schemeClr val="tx1">
+                        <a:lumMod val="65000"/>
+                        <a:lumOff val="35000"/>
+                      </a:schemeClr>
                     </a:solidFill>
                   </a:rPr>
-                  <a:t>easurable</a:t>
+                  <a:t>10.  Prostate Cancer</a:t>
                 </a:r>
-                <a:r>
-                  <a:rPr lang="en-US" sz="2000" b="1" dirty="0">
-                    <a:solidFill>
-                      <a:srgbClr val="002060"/>
-                    </a:solidFill>
-                  </a:rPr>
-                  <a:t> | </a:t>
-                </a:r>
-                <a:r>
-                  <a:rPr lang="en-US" sz="3200" b="1" dirty="0">
-                    <a:solidFill>
-                      <a:srgbClr val="002060"/>
-                    </a:solidFill>
-                  </a:rPr>
-                  <a:t>A</a:t>
-                </a:r>
-                <a:r>
-                  <a:rPr lang="en-US" sz="2000" b="1" i="1" dirty="0">
-                    <a:solidFill>
-                      <a:srgbClr val="002060"/>
-                    </a:solidFill>
-                  </a:rPr>
-                  <a:t>ttainable </a:t>
-                </a:r>
-                <a:r>
-                  <a:rPr lang="en-US" sz="2000" b="1" dirty="0">
-                    <a:solidFill>
-                      <a:srgbClr val="002060"/>
-                    </a:solidFill>
-                  </a:rPr>
-                  <a:t>| </a:t>
-                </a:r>
-                <a:r>
-                  <a:rPr lang="en-US" sz="3200" b="1" dirty="0">
-                    <a:solidFill>
-                      <a:srgbClr val="002060"/>
-                    </a:solidFill>
-                  </a:rPr>
-                  <a:t>R</a:t>
-                </a:r>
-                <a:r>
-                  <a:rPr lang="en-US" sz="2000" b="1" i="1" dirty="0">
-                    <a:solidFill>
-                      <a:srgbClr val="002060"/>
-                    </a:solidFill>
-                  </a:rPr>
-                  <a:t>ealistic </a:t>
-                </a:r>
-                <a:r>
-                  <a:rPr lang="en-US" sz="2000" b="1" dirty="0">
-                    <a:solidFill>
-                      <a:srgbClr val="002060"/>
-                    </a:solidFill>
-                  </a:rPr>
-                  <a:t>| </a:t>
-                </a:r>
-                <a:r>
-                  <a:rPr lang="en-US" sz="3200" b="1" dirty="0">
-                    <a:solidFill>
-                      <a:srgbClr val="002060"/>
-                    </a:solidFill>
-                  </a:rPr>
-                  <a:t>T</a:t>
-                </a:r>
-                <a:r>
-                  <a:rPr lang="en-US" sz="2000" b="1" i="1" dirty="0">
-                    <a:solidFill>
-                      <a:srgbClr val="002060"/>
-                    </a:solidFill>
-                  </a:rPr>
-                  <a:t>ime-bounded</a:t>
-                </a:r>
-                <a:endParaRPr lang="en-US" sz="2000" b="0" i="1" dirty="0">
+                <a:endParaRPr lang="en-PH" sz="1600" i="1" dirty="0">
                   <a:solidFill>
-                    <a:srgbClr val="002060"/>
+                    <a:schemeClr val="tx1">
+                      <a:lumMod val="65000"/>
+                      <a:lumOff val="35000"/>
+                    </a:schemeClr>
                   </a:solidFill>
-                  <a:effectLst/>
                 </a:endParaRPr>
               </a:p>
             </p:txBody>
           </p:sp>
         </p:grpSp>
+        <p:sp>
+          <p:nvSpPr>
+            <p:cNvPr id="25" name="Rectangle 24">
+              <a:extLst>
+                <a:ext uri="{FF2B5EF4-FFF2-40B4-BE49-F238E27FC236}">
+                  <a16:creationId xmlns:a16="http://schemas.microsoft.com/office/drawing/2014/main" id="{FDD9F5A7-24FE-839E-19B1-54A4DEFD95B0}"/>
+                </a:ext>
+              </a:extLst>
+            </p:cNvPr>
+            <p:cNvSpPr/>
+            <p:nvPr/>
+          </p:nvSpPr>
+          <p:spPr>
+            <a:xfrm>
+              <a:off x="8479857" y="411998"/>
+              <a:ext cx="1174282" cy="319522"/>
+            </a:xfrm>
+            <a:prstGeom prst="rect">
+              <a:avLst/>
+            </a:prstGeom>
+            <a:solidFill>
+              <a:schemeClr val="bg1"/>
+            </a:solidFill>
+            <a:ln>
+              <a:solidFill>
+                <a:schemeClr val="bg1"/>
+              </a:solidFill>
+            </a:ln>
+          </p:spPr>
+          <p:style>
+            <a:lnRef idx="2">
+              <a:schemeClr val="accent1">
+                <a:shade val="50000"/>
+              </a:schemeClr>
+            </a:lnRef>
+            <a:fillRef idx="1">
+              <a:schemeClr val="accent1"/>
+            </a:fillRef>
+            <a:effectRef idx="0">
+              <a:schemeClr val="accent1"/>
+            </a:effectRef>
+            <a:fontRef idx="minor">
+              <a:schemeClr val="lt1"/>
+            </a:fontRef>
+          </p:style>
+          <p:txBody>
+            <a:bodyPr rtlCol="0" anchor="ctr"/>
+            <a:lstStyle/>
+            <a:p>
+              <a:pPr algn="ctr"/>
+              <a:endParaRPr lang="en-PH"/>
+            </a:p>
+          </p:txBody>
+        </p:sp>
         <p:pic>
           <p:nvPicPr>
-            <p:cNvPr id="77" name="Graphic 76" descr="Run">
+            <p:cNvPr id="1026" name="Picture 2" descr="萌-表情-文字-贴图-花瓣网|陪你做生活的设计师 | fuck&amp;love by wu">
               <a:extLst>
                 <a:ext uri="{FF2B5EF4-FFF2-40B4-BE49-F238E27FC236}">
-                  <a16:creationId xmlns:a16="http://schemas.microsoft.com/office/drawing/2014/main" id="{60029FD9-737C-AE5E-DBD0-D63E71F9927C}"/>
+                  <a16:creationId xmlns:a16="http://schemas.microsoft.com/office/drawing/2014/main" id="{BEB6A045-C053-5284-E191-186857D9B7D6}"/>
+                </a:ext>
+              </a:extLst>
+            </p:cNvPr>
+            <p:cNvPicPr>
+              <a:picLocks noChangeAspect="1" noChangeArrowheads="1"/>
+            </p:cNvPicPr>
+            <p:nvPr/>
+          </p:nvPicPr>
+          <p:blipFill>
+            <a:blip r:embed="rId16">
+              <a:extLst>
+                <a:ext uri="{BEBA8EAE-BF5A-486C-A8C5-ECC9F3942E4B}">
+                  <a14:imgProps xmlns:a14="http://schemas.microsoft.com/office/drawing/2010/main">
+                    <a14:imgLayer r:embed="rId17">
+                      <a14:imgEffect>
+                        <a14:artisticLineDrawing/>
+                      </a14:imgEffect>
+                    </a14:imgLayer>
+                  </a14:imgProps>
+                </a:ext>
+                <a:ext uri="{28A0092B-C50C-407E-A947-70E740481C1C}">
+                  <a14:useLocalDpi xmlns:a14="http://schemas.microsoft.com/office/drawing/2010/main" val="0"/>
+                </a:ext>
+              </a:extLst>
+            </a:blip>
+            <a:srcRect/>
+            <a:stretch>
+              <a:fillRect/>
+            </a:stretch>
+          </p:blipFill>
+          <p:spPr bwMode="auto">
+            <a:xfrm>
+              <a:off x="8062914" y="411998"/>
+              <a:ext cx="1620391" cy="1620391"/>
+            </a:xfrm>
+            <a:prstGeom prst="rect">
+              <a:avLst/>
+            </a:prstGeom>
+            <a:noFill/>
+            <a:extLst>
+              <a:ext uri="{909E8E84-426E-40DD-AFC4-6F175D3DCCD1}">
+                <a14:hiddenFill xmlns:a14="http://schemas.microsoft.com/office/drawing/2010/main">
+                  <a:solidFill>
+                    <a:srgbClr val="FFFFFF"/>
+                  </a:solidFill>
+                </a14:hiddenFill>
+              </a:ext>
+            </a:extLst>
+          </p:spPr>
+        </p:pic>
+        <p:pic>
+          <p:nvPicPr>
+            <p:cNvPr id="27" name="Graphic 26" descr="Danger">
+              <a:extLst>
+                <a:ext uri="{FF2B5EF4-FFF2-40B4-BE49-F238E27FC236}">
+                  <a16:creationId xmlns:a16="http://schemas.microsoft.com/office/drawing/2014/main" id="{A3328E4F-8376-B37F-EBA2-1A824B471591}"/>
                 </a:ext>
               </a:extLst>
             </p:cNvPr>
@@ -6768,13 +6950,13 @@
             <p:nvPr/>
           </p:nvPicPr>
           <p:blipFill>
-            <a:blip r:embed="rId23">
+            <a:blip r:embed="rId18">
               <a:extLst>
                 <a:ext uri="{28A0092B-C50C-407E-A947-70E740481C1C}">
                   <a14:useLocalDpi xmlns:a14="http://schemas.microsoft.com/office/drawing/2010/main" val="0"/>
                 </a:ext>
                 <a:ext uri="{96DAC541-7B7A-43D3-8B79-37D633B846F1}">
-                  <asvg:svgBlip xmlns:asvg="http://schemas.microsoft.com/office/drawing/2016/SVG/main" r:embed="rId24"/>
+                  <asvg:svgBlip xmlns:asvg="http://schemas.microsoft.com/office/drawing/2016/SVG/main" r:embed="rId19"/>
                 </a:ext>
               </a:extLst>
             </a:blip>
@@ -6784,47 +6966,8 @@
           </p:blipFill>
           <p:spPr>
             <a:xfrm>
-              <a:off x="1937920" y="4012490"/>
-              <a:ext cx="389129" cy="389129"/>
-            </a:xfrm>
-            <a:prstGeom prst="rect">
-              <a:avLst/>
-            </a:prstGeom>
-          </p:spPr>
-        </p:pic>
-        <p:pic>
-          <p:nvPicPr>
-            <p:cNvPr id="79" name="Graphic 78" descr="Flag">
-              <a:extLst>
-                <a:ext uri="{FF2B5EF4-FFF2-40B4-BE49-F238E27FC236}">
-                  <a16:creationId xmlns:a16="http://schemas.microsoft.com/office/drawing/2014/main" id="{4C712D11-F68B-9B08-62D6-E72A13145CF0}"/>
-                </a:ext>
-              </a:extLst>
-            </p:cNvPr>
-            <p:cNvPicPr>
-              <a:picLocks noChangeAspect="1"/>
-            </p:cNvPicPr>
-            <p:nvPr/>
-          </p:nvPicPr>
-          <p:blipFill>
-            <a:blip r:embed="rId25">
-              <a:extLst>
-                <a:ext uri="{28A0092B-C50C-407E-A947-70E740481C1C}">
-                  <a14:useLocalDpi xmlns:a14="http://schemas.microsoft.com/office/drawing/2010/main" val="0"/>
-                </a:ext>
-                <a:ext uri="{96DAC541-7B7A-43D3-8B79-37D633B846F1}">
-                  <asvg:svgBlip xmlns:asvg="http://schemas.microsoft.com/office/drawing/2016/SVG/main" r:embed="rId26"/>
-                </a:ext>
-              </a:extLst>
-            </a:blip>
-            <a:stretch>
-              <a:fillRect/>
-            </a:stretch>
-          </p:blipFill>
-          <p:spPr>
-            <a:xfrm>
-              <a:off x="9535255" y="4012489"/>
-              <a:ext cx="389129" cy="389129"/>
+              <a:off x="9452299" y="1333196"/>
+              <a:ext cx="710692" cy="710692"/>
             </a:xfrm>
             <a:prstGeom prst="rect">
               <a:avLst/>

</xml_diff>

<commit_message>
new file:   allfeatures.html 	modified:   home.html 	modified:   index.html 	modified:   mp1images/carousel pics.pptx
</commit_message>
<xml_diff>
--- a/mp1images/carousel pics.pptx
+++ b/mp1images/carousel pics.pptx
@@ -119,7 +119,7 @@
   <pc:docChgLst>
     <pc:chgData name="Rose Joy Angeline Padilla" userId="ecdd412207c6b092" providerId="LiveId" clId="{8A8653A4-EEE4-480C-A831-A23D8E4BA8F6}"/>
     <pc:docChg chg="undo redo custSel addSld modSld">
-      <pc:chgData name="Rose Joy Angeline Padilla" userId="ecdd412207c6b092" providerId="LiveId" clId="{8A8653A4-EEE4-480C-A831-A23D8E4BA8F6}" dt="2023-06-04T03:35:48.654" v="3591" actId="338"/>
+      <pc:chgData name="Rose Joy Angeline Padilla" userId="ecdd412207c6b092" providerId="LiveId" clId="{8A8653A4-EEE4-480C-A831-A23D8E4BA8F6}" dt="2023-06-04T08:16:35.392" v="3668" actId="114"/>
       <pc:docMkLst>
         <pc:docMk/>
       </pc:docMkLst>
@@ -259,11 +259,19 @@
         </pc:picChg>
       </pc:sldChg>
       <pc:sldChg chg="addSp delSp modSp add mod">
-        <pc:chgData name="Rose Joy Angeline Padilla" userId="ecdd412207c6b092" providerId="LiveId" clId="{8A8653A4-EEE4-480C-A831-A23D8E4BA8F6}" dt="2023-06-04T03:31:16.437" v="3576" actId="164"/>
+        <pc:chgData name="Rose Joy Angeline Padilla" userId="ecdd412207c6b092" providerId="LiveId" clId="{8A8653A4-EEE4-480C-A831-A23D8E4BA8F6}" dt="2023-06-04T08:16:35.392" v="3668" actId="114"/>
         <pc:sldMkLst>
           <pc:docMk/>
           <pc:sldMk cId="900757665" sldId="257"/>
         </pc:sldMkLst>
+        <pc:spChg chg="add mod">
+          <ac:chgData name="Rose Joy Angeline Padilla" userId="ecdd412207c6b092" providerId="LiveId" clId="{8A8653A4-EEE4-480C-A831-A23D8E4BA8F6}" dt="2023-06-04T08:16:35.392" v="3668" actId="114"/>
+          <ac:spMkLst>
+            <pc:docMk/>
+            <pc:sldMk cId="900757665" sldId="257"/>
+            <ac:spMk id="2" creationId="{83FF428A-A878-D6D9-FCB9-2995A5F6EA46}"/>
+          </ac:spMkLst>
+        </pc:spChg>
         <pc:spChg chg="add mod topLvl">
           <ac:chgData name="Rose Joy Angeline Padilla" userId="ecdd412207c6b092" providerId="LiveId" clId="{8A8653A4-EEE4-480C-A831-A23D8E4BA8F6}" dt="2023-06-04T03:31:16.437" v="3576" actId="164"/>
           <ac:spMkLst>
@@ -5871,6 +5879,46 @@
           </p:spPr>
         </p:pic>
       </p:grpSp>
+      <p:sp>
+        <p:nvSpPr>
+          <p:cNvPr id="2" name="TextBox 1">
+            <a:extLst>
+              <a:ext uri="{FF2B5EF4-FFF2-40B4-BE49-F238E27FC236}">
+                <a16:creationId xmlns:a16="http://schemas.microsoft.com/office/drawing/2014/main" id="{83FF428A-A878-D6D9-FCB9-2995A5F6EA46}"/>
+              </a:ext>
+            </a:extLst>
+          </p:cNvPr>
+          <p:cNvSpPr txBox="1"/>
+          <p:nvPr/>
+        </p:nvSpPr>
+        <p:spPr>
+          <a:xfrm>
+            <a:off x="8493784" y="2999937"/>
+            <a:ext cx="5390381" cy="369332"/>
+          </a:xfrm>
+          <a:prstGeom prst="rect">
+            <a:avLst/>
+          </a:prstGeom>
+          <a:noFill/>
+        </p:spPr>
+        <p:txBody>
+          <a:bodyPr wrap="square" rtlCol="0">
+            <a:spAutoFit/>
+          </a:bodyPr>
+          <a:lstStyle/>
+          <a:p>
+            <a:r>
+              <a:rPr lang="en-US" dirty="0"/>
+              <a:t>Remember: </a:t>
+            </a:r>
+            <a:r>
+              <a:rPr lang="en-US" i="1" dirty="0"/>
+              <a:t>INTEGRITY. DISCIPLINE. HUMILITY</a:t>
+            </a:r>
+            <a:endParaRPr lang="en-PH" i="1" dirty="0"/>
+          </a:p>
+        </p:txBody>
+      </p:sp>
     </p:spTree>
     <p:extLst>
       <p:ext uri="{BB962C8B-B14F-4D97-AF65-F5344CB8AC3E}">

</xml_diff>